<commit_message>
Modified slider (last slide) for return statement
</commit_message>
<xml_diff>
--- a/resources/ppt-slides/slider-return.pptx
+++ b/resources/ppt-slides/slider-return.pptx
@@ -12,6 +12,7 @@
     <p:sldId id="305" r:id="rId6"/>
     <p:sldId id="306" r:id="rId7"/>
     <p:sldId id="308" r:id="rId8"/>
+    <p:sldId id="309" r:id="rId9"/>
   </p:sldIdLst>
   <p:sldSz cx="7559675" cy="5040313"/>
   <p:notesSz cx="6858000" cy="9144000"/>
@@ -249,7 +250,7 @@
           <a:p>
             <a:fld id="{964302DC-9F53-934F-AE4D-0F1F197008C1}" type="datetimeFigureOut">
               <a:rPr lang="en-US" smtClean="0"/>
-              <a:t>11/30/23</a:t>
+              <a:t>12/1/23</a:t>
             </a:fld>
             <a:endParaRPr lang="en-US"/>
           </a:p>
@@ -419,7 +420,7 @@
           <a:p>
             <a:fld id="{964302DC-9F53-934F-AE4D-0F1F197008C1}" type="datetimeFigureOut">
               <a:rPr lang="en-US" smtClean="0"/>
-              <a:t>11/30/23</a:t>
+              <a:t>12/1/23</a:t>
             </a:fld>
             <a:endParaRPr lang="en-US"/>
           </a:p>
@@ -599,7 +600,7 @@
           <a:p>
             <a:fld id="{964302DC-9F53-934F-AE4D-0F1F197008C1}" type="datetimeFigureOut">
               <a:rPr lang="en-US" smtClean="0"/>
-              <a:t>11/30/23</a:t>
+              <a:t>12/1/23</a:t>
             </a:fld>
             <a:endParaRPr lang="en-US"/>
           </a:p>
@@ -769,7 +770,7 @@
           <a:p>
             <a:fld id="{964302DC-9F53-934F-AE4D-0F1F197008C1}" type="datetimeFigureOut">
               <a:rPr lang="en-US" smtClean="0"/>
-              <a:t>11/30/23</a:t>
+              <a:t>12/1/23</a:t>
             </a:fld>
             <a:endParaRPr lang="en-US"/>
           </a:p>
@@ -1013,7 +1014,7 @@
           <a:p>
             <a:fld id="{964302DC-9F53-934F-AE4D-0F1F197008C1}" type="datetimeFigureOut">
               <a:rPr lang="en-US" smtClean="0"/>
-              <a:t>11/30/23</a:t>
+              <a:t>12/1/23</a:t>
             </a:fld>
             <a:endParaRPr lang="en-US"/>
           </a:p>
@@ -1245,7 +1246,7 @@
           <a:p>
             <a:fld id="{964302DC-9F53-934F-AE4D-0F1F197008C1}" type="datetimeFigureOut">
               <a:rPr lang="en-US" smtClean="0"/>
-              <a:t>11/30/23</a:t>
+              <a:t>12/1/23</a:t>
             </a:fld>
             <a:endParaRPr lang="en-US"/>
           </a:p>
@@ -1612,7 +1613,7 @@
           <a:p>
             <a:fld id="{964302DC-9F53-934F-AE4D-0F1F197008C1}" type="datetimeFigureOut">
               <a:rPr lang="en-US" smtClean="0"/>
-              <a:t>11/30/23</a:t>
+              <a:t>12/1/23</a:t>
             </a:fld>
             <a:endParaRPr lang="en-US"/>
           </a:p>
@@ -1730,7 +1731,7 @@
           <a:p>
             <a:fld id="{964302DC-9F53-934F-AE4D-0F1F197008C1}" type="datetimeFigureOut">
               <a:rPr lang="en-US" smtClean="0"/>
-              <a:t>11/30/23</a:t>
+              <a:t>12/1/23</a:t>
             </a:fld>
             <a:endParaRPr lang="en-US"/>
           </a:p>
@@ -1825,7 +1826,7 @@
           <a:p>
             <a:fld id="{964302DC-9F53-934F-AE4D-0F1F197008C1}" type="datetimeFigureOut">
               <a:rPr lang="en-US" smtClean="0"/>
-              <a:t>11/30/23</a:t>
+              <a:t>12/1/23</a:t>
             </a:fld>
             <a:endParaRPr lang="en-US"/>
           </a:p>
@@ -2102,7 +2103,7 @@
           <a:p>
             <a:fld id="{964302DC-9F53-934F-AE4D-0F1F197008C1}" type="datetimeFigureOut">
               <a:rPr lang="en-US" smtClean="0"/>
-              <a:t>11/30/23</a:t>
+              <a:t>12/1/23</a:t>
             </a:fld>
             <a:endParaRPr lang="en-US"/>
           </a:p>
@@ -2359,7 +2360,7 @@
           <a:p>
             <a:fld id="{964302DC-9F53-934F-AE4D-0F1F197008C1}" type="datetimeFigureOut">
               <a:rPr lang="en-US" smtClean="0"/>
-              <a:t>11/30/23</a:t>
+              <a:t>12/1/23</a:t>
             </a:fld>
             <a:endParaRPr lang="en-US"/>
           </a:p>
@@ -2572,7 +2573,7 @@
           <a:p>
             <a:fld id="{964302DC-9F53-934F-AE4D-0F1F197008C1}" type="datetimeFigureOut">
               <a:rPr lang="en-US" smtClean="0"/>
-              <a:t>11/30/23</a:t>
+              <a:t>12/1/23</a:t>
             </a:fld>
             <a:endParaRPr lang="en-US"/>
           </a:p>
@@ -6080,70 +6081,100 @@
               <a:custGeom>
                 <a:avLst/>
                 <a:gdLst>
-                  <a:gd name="connsiteX0" fmla="*/ 0 w 7081019"/>
-                  <a:gd name="connsiteY0" fmla="*/ 0 h 2798959"/>
-                  <a:gd name="connsiteX1" fmla="*/ 572919 w 7081019"/>
-                  <a:gd name="connsiteY1" fmla="*/ 0 h 2798959"/>
-                  <a:gd name="connsiteX2" fmla="*/ 1004217 w 7081019"/>
-                  <a:gd name="connsiteY2" fmla="*/ 0 h 2798959"/>
-                  <a:gd name="connsiteX3" fmla="*/ 1789567 w 7081019"/>
-                  <a:gd name="connsiteY3" fmla="*/ 0 h 2798959"/>
-                  <a:gd name="connsiteX4" fmla="*/ 2362485 w 7081019"/>
-                  <a:gd name="connsiteY4" fmla="*/ 0 h 2798959"/>
-                  <a:gd name="connsiteX5" fmla="*/ 2935404 w 7081019"/>
-                  <a:gd name="connsiteY5" fmla="*/ 0 h 2798959"/>
-                  <a:gd name="connsiteX6" fmla="*/ 3720754 w 7081019"/>
-                  <a:gd name="connsiteY6" fmla="*/ 0 h 2798959"/>
-                  <a:gd name="connsiteX7" fmla="*/ 4222862 w 7081019"/>
-                  <a:gd name="connsiteY7" fmla="*/ 0 h 2798959"/>
-                  <a:gd name="connsiteX8" fmla="*/ 5008212 w 7081019"/>
-                  <a:gd name="connsiteY8" fmla="*/ 0 h 2798959"/>
-                  <a:gd name="connsiteX9" fmla="*/ 5793561 w 7081019"/>
-                  <a:gd name="connsiteY9" fmla="*/ 0 h 2798959"/>
-                  <a:gd name="connsiteX10" fmla="*/ 6437290 w 7081019"/>
-                  <a:gd name="connsiteY10" fmla="*/ 0 h 2798959"/>
-                  <a:gd name="connsiteX11" fmla="*/ 7081019 w 7081019"/>
-                  <a:gd name="connsiteY11" fmla="*/ 0 h 2798959"/>
-                  <a:gd name="connsiteX12" fmla="*/ 7081019 w 7081019"/>
-                  <a:gd name="connsiteY12" fmla="*/ 671750 h 2798959"/>
-                  <a:gd name="connsiteX13" fmla="*/ 7081019 w 7081019"/>
-                  <a:gd name="connsiteY13" fmla="*/ 1287521 h 2798959"/>
-                  <a:gd name="connsiteX14" fmla="*/ 7081019 w 7081019"/>
-                  <a:gd name="connsiteY14" fmla="*/ 1987261 h 2798959"/>
-                  <a:gd name="connsiteX15" fmla="*/ 7081019 w 7081019"/>
-                  <a:gd name="connsiteY15" fmla="*/ 2798959 h 2798959"/>
-                  <a:gd name="connsiteX16" fmla="*/ 6437290 w 7081019"/>
-                  <a:gd name="connsiteY16" fmla="*/ 2798959 h 2798959"/>
-                  <a:gd name="connsiteX17" fmla="*/ 5651941 w 7081019"/>
-                  <a:gd name="connsiteY17" fmla="*/ 2798959 h 2798959"/>
-                  <a:gd name="connsiteX18" fmla="*/ 5008212 w 7081019"/>
-                  <a:gd name="connsiteY18" fmla="*/ 2798959 h 2798959"/>
-                  <a:gd name="connsiteX19" fmla="*/ 4576913 w 7081019"/>
-                  <a:gd name="connsiteY19" fmla="*/ 2798959 h 2798959"/>
-                  <a:gd name="connsiteX20" fmla="*/ 4074805 w 7081019"/>
-                  <a:gd name="connsiteY20" fmla="*/ 2798959 h 2798959"/>
-                  <a:gd name="connsiteX21" fmla="*/ 3289455 w 7081019"/>
-                  <a:gd name="connsiteY21" fmla="*/ 2798959 h 2798959"/>
-                  <a:gd name="connsiteX22" fmla="*/ 2645726 w 7081019"/>
-                  <a:gd name="connsiteY22" fmla="*/ 2798959 h 2798959"/>
-                  <a:gd name="connsiteX23" fmla="*/ 2143618 w 7081019"/>
-                  <a:gd name="connsiteY23" fmla="*/ 2798959 h 2798959"/>
-                  <a:gd name="connsiteX24" fmla="*/ 1499889 w 7081019"/>
-                  <a:gd name="connsiteY24" fmla="*/ 2798959 h 2798959"/>
-                  <a:gd name="connsiteX25" fmla="*/ 1068590 w 7081019"/>
-                  <a:gd name="connsiteY25" fmla="*/ 2798959 h 2798959"/>
-                  <a:gd name="connsiteX26" fmla="*/ 637292 w 7081019"/>
-                  <a:gd name="connsiteY26" fmla="*/ 2798959 h 2798959"/>
-                  <a:gd name="connsiteX27" fmla="*/ 0 w 7081019"/>
-                  <a:gd name="connsiteY27" fmla="*/ 2798959 h 2798959"/>
-                  <a:gd name="connsiteX28" fmla="*/ 0 w 7081019"/>
-                  <a:gd name="connsiteY28" fmla="*/ 2155198 h 2798959"/>
-                  <a:gd name="connsiteX29" fmla="*/ 0 w 7081019"/>
-                  <a:gd name="connsiteY29" fmla="*/ 1399480 h 2798959"/>
-                  <a:gd name="connsiteX30" fmla="*/ 0 w 7081019"/>
-                  <a:gd name="connsiteY30" fmla="*/ 727729 h 2798959"/>
-                  <a:gd name="connsiteX31" fmla="*/ 0 w 7081019"/>
-                  <a:gd name="connsiteY31" fmla="*/ 0 h 2798959"/>
+                  <a:gd name="connsiteX0" fmla="*/ 0 w 7081020"/>
+                  <a:gd name="connsiteY0" fmla="*/ 0 h 7575645"/>
+                  <a:gd name="connsiteX1" fmla="*/ 572919 w 7081020"/>
+                  <a:gd name="connsiteY1" fmla="*/ 0 h 7575645"/>
+                  <a:gd name="connsiteX2" fmla="*/ 1004217 w 7081020"/>
+                  <a:gd name="connsiteY2" fmla="*/ 0 h 7575645"/>
+                  <a:gd name="connsiteX3" fmla="*/ 1789567 w 7081020"/>
+                  <a:gd name="connsiteY3" fmla="*/ 0 h 7575645"/>
+                  <a:gd name="connsiteX4" fmla="*/ 2362486 w 7081020"/>
+                  <a:gd name="connsiteY4" fmla="*/ 0 h 7575645"/>
+                  <a:gd name="connsiteX5" fmla="*/ 2935405 w 7081020"/>
+                  <a:gd name="connsiteY5" fmla="*/ 0 h 7575645"/>
+                  <a:gd name="connsiteX6" fmla="*/ 3720754 w 7081020"/>
+                  <a:gd name="connsiteY6" fmla="*/ 0 h 7575645"/>
+                  <a:gd name="connsiteX7" fmla="*/ 4222863 w 7081020"/>
+                  <a:gd name="connsiteY7" fmla="*/ 0 h 7575645"/>
+                  <a:gd name="connsiteX8" fmla="*/ 5008212 w 7081020"/>
+                  <a:gd name="connsiteY8" fmla="*/ 0 h 7575645"/>
+                  <a:gd name="connsiteX9" fmla="*/ 5793562 w 7081020"/>
+                  <a:gd name="connsiteY9" fmla="*/ 0 h 7575645"/>
+                  <a:gd name="connsiteX10" fmla="*/ 6437291 w 7081020"/>
+                  <a:gd name="connsiteY10" fmla="*/ 0 h 7575645"/>
+                  <a:gd name="connsiteX11" fmla="*/ 7081020 w 7081020"/>
+                  <a:gd name="connsiteY11" fmla="*/ 0 h 7575645"/>
+                  <a:gd name="connsiteX12" fmla="*/ 7081020 w 7081020"/>
+                  <a:gd name="connsiteY12" fmla="*/ 612939 h 7575645"/>
+                  <a:gd name="connsiteX13" fmla="*/ 7081020 w 7081020"/>
+                  <a:gd name="connsiteY13" fmla="*/ 1074364 h 7575645"/>
+                  <a:gd name="connsiteX14" fmla="*/ 7081020 w 7081020"/>
+                  <a:gd name="connsiteY14" fmla="*/ 1763059 h 7575645"/>
+                  <a:gd name="connsiteX15" fmla="*/ 7081020 w 7081020"/>
+                  <a:gd name="connsiteY15" fmla="*/ 2451754 h 7575645"/>
+                  <a:gd name="connsiteX16" fmla="*/ 7081020 w 7081020"/>
+                  <a:gd name="connsiteY16" fmla="*/ 3140449 h 7575645"/>
+                  <a:gd name="connsiteX17" fmla="*/ 7081020 w 7081020"/>
+                  <a:gd name="connsiteY17" fmla="*/ 3904901 h 7575645"/>
+                  <a:gd name="connsiteX18" fmla="*/ 7081020 w 7081020"/>
+                  <a:gd name="connsiteY18" fmla="*/ 4669352 h 7575645"/>
+                  <a:gd name="connsiteX19" fmla="*/ 7081020 w 7081020"/>
+                  <a:gd name="connsiteY19" fmla="*/ 5433804 h 7575645"/>
+                  <a:gd name="connsiteX20" fmla="*/ 7081020 w 7081020"/>
+                  <a:gd name="connsiteY20" fmla="*/ 5895229 h 7575645"/>
+                  <a:gd name="connsiteX21" fmla="*/ 7081020 w 7081020"/>
+                  <a:gd name="connsiteY21" fmla="*/ 6432411 h 7575645"/>
+                  <a:gd name="connsiteX22" fmla="*/ 7081020 w 7081020"/>
+                  <a:gd name="connsiteY22" fmla="*/ 7575645 h 7575645"/>
+                  <a:gd name="connsiteX23" fmla="*/ 6508101 w 7081020"/>
+                  <a:gd name="connsiteY23" fmla="*/ 7575645 h 7575645"/>
+                  <a:gd name="connsiteX24" fmla="*/ 5864372 w 7081020"/>
+                  <a:gd name="connsiteY24" fmla="*/ 7575645 h 7575645"/>
+                  <a:gd name="connsiteX25" fmla="*/ 5433074 w 7081020"/>
+                  <a:gd name="connsiteY25" fmla="*/ 7575645 h 7575645"/>
+                  <a:gd name="connsiteX26" fmla="*/ 5001775 w 7081020"/>
+                  <a:gd name="connsiteY26" fmla="*/ 7575645 h 7575645"/>
+                  <a:gd name="connsiteX27" fmla="*/ 4358046 w 7081020"/>
+                  <a:gd name="connsiteY27" fmla="*/ 7575645 h 7575645"/>
+                  <a:gd name="connsiteX28" fmla="*/ 3855937 w 7081020"/>
+                  <a:gd name="connsiteY28" fmla="*/ 7575645 h 7575645"/>
+                  <a:gd name="connsiteX29" fmla="*/ 3141398 w 7081020"/>
+                  <a:gd name="connsiteY29" fmla="*/ 7575645 h 7575645"/>
+                  <a:gd name="connsiteX30" fmla="*/ 2639289 w 7081020"/>
+                  <a:gd name="connsiteY30" fmla="*/ 7575645 h 7575645"/>
+                  <a:gd name="connsiteX31" fmla="*/ 1924750 w 7081020"/>
+                  <a:gd name="connsiteY31" fmla="*/ 7575645 h 7575645"/>
+                  <a:gd name="connsiteX32" fmla="*/ 1493451 w 7081020"/>
+                  <a:gd name="connsiteY32" fmla="*/ 7575645 h 7575645"/>
+                  <a:gd name="connsiteX33" fmla="*/ 778912 w 7081020"/>
+                  <a:gd name="connsiteY33" fmla="*/ 7575645 h 7575645"/>
+                  <a:gd name="connsiteX34" fmla="*/ 0 w 7081020"/>
+                  <a:gd name="connsiteY34" fmla="*/ 7575645 h 7575645"/>
+                  <a:gd name="connsiteX35" fmla="*/ 0 w 7081020"/>
+                  <a:gd name="connsiteY35" fmla="*/ 7114219 h 7575645"/>
+                  <a:gd name="connsiteX36" fmla="*/ 0 w 7081020"/>
+                  <a:gd name="connsiteY36" fmla="*/ 6501281 h 7575645"/>
+                  <a:gd name="connsiteX37" fmla="*/ 0 w 7081020"/>
+                  <a:gd name="connsiteY37" fmla="*/ 5661073 h 7575645"/>
+                  <a:gd name="connsiteX38" fmla="*/ 0 w 7081020"/>
+                  <a:gd name="connsiteY38" fmla="*/ 5123891 h 7575645"/>
+                  <a:gd name="connsiteX39" fmla="*/ 0 w 7081020"/>
+                  <a:gd name="connsiteY39" fmla="*/ 4662465 h 7575645"/>
+                  <a:gd name="connsiteX40" fmla="*/ 0 w 7081020"/>
+                  <a:gd name="connsiteY40" fmla="*/ 4201039 h 7575645"/>
+                  <a:gd name="connsiteX41" fmla="*/ 0 w 7081020"/>
+                  <a:gd name="connsiteY41" fmla="*/ 3436588 h 7575645"/>
+                  <a:gd name="connsiteX42" fmla="*/ 0 w 7081020"/>
+                  <a:gd name="connsiteY42" fmla="*/ 2975162 h 7575645"/>
+                  <a:gd name="connsiteX43" fmla="*/ 0 w 7081020"/>
+                  <a:gd name="connsiteY43" fmla="*/ 2286467 h 7575645"/>
+                  <a:gd name="connsiteX44" fmla="*/ 0 w 7081020"/>
+                  <a:gd name="connsiteY44" fmla="*/ 1749285 h 7575645"/>
+                  <a:gd name="connsiteX45" fmla="*/ 0 w 7081020"/>
+                  <a:gd name="connsiteY45" fmla="*/ 1060590 h 7575645"/>
+                  <a:gd name="connsiteX46" fmla="*/ 0 w 7081020"/>
+                  <a:gd name="connsiteY46" fmla="*/ 0 h 7575645"/>
                 </a:gdLst>
                 <a:ahLst/>
                 <a:cxnLst>
@@ -6243,10 +6274,55 @@
                   <a:cxn ang="0">
                     <a:pos x="connsiteX31" y="connsiteY31"/>
                   </a:cxn>
+                  <a:cxn ang="0">
+                    <a:pos x="connsiteX32" y="connsiteY32"/>
+                  </a:cxn>
+                  <a:cxn ang="0">
+                    <a:pos x="connsiteX33" y="connsiteY33"/>
+                  </a:cxn>
+                  <a:cxn ang="0">
+                    <a:pos x="connsiteX34" y="connsiteY34"/>
+                  </a:cxn>
+                  <a:cxn ang="0">
+                    <a:pos x="connsiteX35" y="connsiteY35"/>
+                  </a:cxn>
+                  <a:cxn ang="0">
+                    <a:pos x="connsiteX36" y="connsiteY36"/>
+                  </a:cxn>
+                  <a:cxn ang="0">
+                    <a:pos x="connsiteX37" y="connsiteY37"/>
+                  </a:cxn>
+                  <a:cxn ang="0">
+                    <a:pos x="connsiteX38" y="connsiteY38"/>
+                  </a:cxn>
+                  <a:cxn ang="0">
+                    <a:pos x="connsiteX39" y="connsiteY39"/>
+                  </a:cxn>
+                  <a:cxn ang="0">
+                    <a:pos x="connsiteX40" y="connsiteY40"/>
+                  </a:cxn>
+                  <a:cxn ang="0">
+                    <a:pos x="connsiteX41" y="connsiteY41"/>
+                  </a:cxn>
+                  <a:cxn ang="0">
+                    <a:pos x="connsiteX42" y="connsiteY42"/>
+                  </a:cxn>
+                  <a:cxn ang="0">
+                    <a:pos x="connsiteX43" y="connsiteY43"/>
+                  </a:cxn>
+                  <a:cxn ang="0">
+                    <a:pos x="connsiteX44" y="connsiteY44"/>
+                  </a:cxn>
+                  <a:cxn ang="0">
+                    <a:pos x="connsiteX45" y="connsiteY45"/>
+                  </a:cxn>
+                  <a:cxn ang="0">
+                    <a:pos x="connsiteX46" y="connsiteY46"/>
+                  </a:cxn>
                 </a:cxnLst>
                 <a:rect l="l" t="t" r="r" b="b"/>
                 <a:pathLst>
-                  <a:path w="7081019" h="2798959" extrusionOk="0">
+                  <a:path w="7081020" h="7575645" extrusionOk="0">
                     <a:moveTo>
                       <a:pt x="0" y="0"/>
                     </a:moveTo>
@@ -6267,142 +6343,217 @@
                     </a:cubicBezTo>
                     <a:cubicBezTo>
                       <a:pt x="1963418" y="-10174"/>
-                      <a:pt x="2247334" y="4892"/>
-                      <a:pt x="2362485" y="0"/>
-                    </a:cubicBezTo>
-                    <a:cubicBezTo>
-                      <a:pt x="2477636" y="-4892"/>
-                      <a:pt x="2735113" y="-20363"/>
-                      <a:pt x="2935404" y="0"/>
-                    </a:cubicBezTo>
-                    <a:cubicBezTo>
-                      <a:pt x="3135695" y="20363"/>
-                      <a:pt x="3432655" y="-33272"/>
+                      <a:pt x="2244829" y="4874"/>
+                      <a:pt x="2362486" y="0"/>
+                    </a:cubicBezTo>
+                    <a:cubicBezTo>
+                      <a:pt x="2480143" y="-4874"/>
+                      <a:pt x="2735114" y="-20363"/>
+                      <a:pt x="2935405" y="0"/>
+                    </a:cubicBezTo>
+                    <a:cubicBezTo>
+                      <a:pt x="3135696" y="20363"/>
+                      <a:pt x="3436871" y="-29544"/>
                       <a:pt x="3720754" y="0"/>
                     </a:cubicBezTo>
                     <a:cubicBezTo>
-                      <a:pt x="4008853" y="33272"/>
-                      <a:pt x="4031799" y="3870"/>
-                      <a:pt x="4222862" y="0"/>
-                    </a:cubicBezTo>
-                    <a:cubicBezTo>
-                      <a:pt x="4413925" y="-3870"/>
-                      <a:pt x="4650926" y="13374"/>
+                      <a:pt x="4004637" y="29544"/>
+                      <a:pt x="4028634" y="1501"/>
+                      <a:pt x="4222863" y="0"/>
+                    </a:cubicBezTo>
+                    <a:cubicBezTo>
+                      <a:pt x="4417092" y="-1501"/>
+                      <a:pt x="4654536" y="13421"/>
                       <a:pt x="5008212" y="0"/>
                     </a:cubicBezTo>
                     <a:cubicBezTo>
-                      <a:pt x="5365498" y="-13374"/>
-                      <a:pt x="5559808" y="-2411"/>
-                      <a:pt x="5793561" y="0"/>
-                    </a:cubicBezTo>
-                    <a:cubicBezTo>
-                      <a:pt x="6027314" y="2411"/>
-                      <a:pt x="6283139" y="-18066"/>
-                      <a:pt x="6437290" y="0"/>
-                    </a:cubicBezTo>
-                    <a:cubicBezTo>
-                      <a:pt x="6591441" y="18066"/>
-                      <a:pt x="6828067" y="20319"/>
-                      <a:pt x="7081019" y="0"/>
-                    </a:cubicBezTo>
-                    <a:cubicBezTo>
-                      <a:pt x="7099078" y="262973"/>
-                      <a:pt x="7066308" y="387833"/>
-                      <a:pt x="7081019" y="671750"/>
-                    </a:cubicBezTo>
-                    <a:cubicBezTo>
-                      <a:pt x="7095731" y="955667"/>
-                      <a:pt x="7084114" y="1005709"/>
-                      <a:pt x="7081019" y="1287521"/>
-                    </a:cubicBezTo>
-                    <a:cubicBezTo>
-                      <a:pt x="7077924" y="1569333"/>
-                      <a:pt x="7063113" y="1692063"/>
-                      <a:pt x="7081019" y="1987261"/>
-                    </a:cubicBezTo>
-                    <a:cubicBezTo>
-                      <a:pt x="7098925" y="2282459"/>
-                      <a:pt x="7082821" y="2622479"/>
-                      <a:pt x="7081019" y="2798959"/>
-                    </a:cubicBezTo>
-                    <a:cubicBezTo>
-                      <a:pt x="6886481" y="2768676"/>
-                      <a:pt x="6567319" y="2787403"/>
-                      <a:pt x="6437290" y="2798959"/>
-                    </a:cubicBezTo>
-                    <a:cubicBezTo>
-                      <a:pt x="6307261" y="2810515"/>
-                      <a:pt x="5834924" y="2787380"/>
-                      <a:pt x="5651941" y="2798959"/>
-                    </a:cubicBezTo>
-                    <a:cubicBezTo>
-                      <a:pt x="5468958" y="2810538"/>
-                      <a:pt x="5166475" y="2815587"/>
-                      <a:pt x="5008212" y="2798959"/>
-                    </a:cubicBezTo>
-                    <a:cubicBezTo>
-                      <a:pt x="4849949" y="2782331"/>
-                      <a:pt x="4725960" y="2806364"/>
-                      <a:pt x="4576913" y="2798959"/>
-                    </a:cubicBezTo>
-                    <a:cubicBezTo>
-                      <a:pt x="4427866" y="2791554"/>
-                      <a:pt x="4206847" y="2783657"/>
-                      <a:pt x="4074805" y="2798959"/>
-                    </a:cubicBezTo>
-                    <a:cubicBezTo>
-                      <a:pt x="3942763" y="2814261"/>
-                      <a:pt x="3472738" y="2799984"/>
-                      <a:pt x="3289455" y="2798959"/>
-                    </a:cubicBezTo>
-                    <a:cubicBezTo>
-                      <a:pt x="3106172" y="2797935"/>
-                      <a:pt x="2801633" y="2814354"/>
-                      <a:pt x="2645726" y="2798959"/>
-                    </a:cubicBezTo>
-                    <a:cubicBezTo>
-                      <a:pt x="2489819" y="2783564"/>
-                      <a:pt x="2377503" y="2809926"/>
-                      <a:pt x="2143618" y="2798959"/>
-                    </a:cubicBezTo>
-                    <a:cubicBezTo>
-                      <a:pt x="1909733" y="2787992"/>
-                      <a:pt x="1661655" y="2815601"/>
-                      <a:pt x="1499889" y="2798959"/>
-                    </a:cubicBezTo>
-                    <a:cubicBezTo>
-                      <a:pt x="1338123" y="2782317"/>
-                      <a:pt x="1193205" y="2784558"/>
-                      <a:pt x="1068590" y="2798959"/>
-                    </a:cubicBezTo>
-                    <a:cubicBezTo>
-                      <a:pt x="943975" y="2813360"/>
-                      <a:pt x="778399" y="2796405"/>
-                      <a:pt x="637292" y="2798959"/>
-                    </a:cubicBezTo>
-                    <a:cubicBezTo>
-                      <a:pt x="496185" y="2801513"/>
-                      <a:pt x="302853" y="2829906"/>
-                      <a:pt x="0" y="2798959"/>
-                    </a:cubicBezTo>
-                    <a:cubicBezTo>
-                      <a:pt x="20875" y="2533545"/>
-                      <a:pt x="-7493" y="2371355"/>
-                      <a:pt x="0" y="2155198"/>
-                    </a:cubicBezTo>
-                    <a:cubicBezTo>
-                      <a:pt x="7493" y="1939041"/>
-                      <a:pt x="-26030" y="1765505"/>
-                      <a:pt x="0" y="1399480"/>
-                    </a:cubicBezTo>
-                    <a:cubicBezTo>
-                      <a:pt x="26030" y="1033455"/>
-                      <a:pt x="-22852" y="1028795"/>
-                      <a:pt x="0" y="727729"/>
-                    </a:cubicBezTo>
-                    <a:cubicBezTo>
-                      <a:pt x="22852" y="426663"/>
-                      <a:pt x="35068" y="204228"/>
+                      <a:pt x="5361888" y="-13421"/>
+                      <a:pt x="5558134" y="-3460"/>
+                      <a:pt x="5793562" y="0"/>
+                    </a:cubicBezTo>
+                    <a:cubicBezTo>
+                      <a:pt x="6028990" y="3460"/>
+                      <a:pt x="6283140" y="-18066"/>
+                      <a:pt x="6437291" y="0"/>
+                    </a:cubicBezTo>
+                    <a:cubicBezTo>
+                      <a:pt x="6591442" y="18066"/>
+                      <a:pt x="6828068" y="20319"/>
+                      <a:pt x="7081020" y="0"/>
+                    </a:cubicBezTo>
+                    <a:cubicBezTo>
+                      <a:pt x="7089417" y="184368"/>
+                      <a:pt x="7096678" y="373874"/>
+                      <a:pt x="7081020" y="612939"/>
+                    </a:cubicBezTo>
+                    <a:cubicBezTo>
+                      <a:pt x="7065362" y="852004"/>
+                      <a:pt x="7102064" y="892791"/>
+                      <a:pt x="7081020" y="1074364"/>
+                    </a:cubicBezTo>
+                    <a:cubicBezTo>
+                      <a:pt x="7059976" y="1255937"/>
+                      <a:pt x="7062752" y="1490254"/>
+                      <a:pt x="7081020" y="1763059"/>
+                    </a:cubicBezTo>
+                    <a:cubicBezTo>
+                      <a:pt x="7099288" y="2035864"/>
+                      <a:pt x="7081293" y="2145271"/>
+                      <a:pt x="7081020" y="2451754"/>
+                    </a:cubicBezTo>
+                    <a:cubicBezTo>
+                      <a:pt x="7080747" y="2758238"/>
+                      <a:pt x="7058623" y="2830290"/>
+                      <a:pt x="7081020" y="3140449"/>
+                    </a:cubicBezTo>
+                    <a:cubicBezTo>
+                      <a:pt x="7103417" y="3450608"/>
+                      <a:pt x="7052547" y="3524664"/>
+                      <a:pt x="7081020" y="3904901"/>
+                    </a:cubicBezTo>
+                    <a:cubicBezTo>
+                      <a:pt x="7109493" y="4285138"/>
+                      <a:pt x="7110654" y="4312070"/>
+                      <a:pt x="7081020" y="4669352"/>
+                    </a:cubicBezTo>
+                    <a:cubicBezTo>
+                      <a:pt x="7051386" y="5026634"/>
+                      <a:pt x="7112948" y="5124932"/>
+                      <a:pt x="7081020" y="5433804"/>
+                    </a:cubicBezTo>
+                    <a:cubicBezTo>
+                      <a:pt x="7049092" y="5742676"/>
+                      <a:pt x="7095698" y="5713497"/>
+                      <a:pt x="7081020" y="5895229"/>
+                    </a:cubicBezTo>
+                    <a:cubicBezTo>
+                      <a:pt x="7066342" y="6076961"/>
+                      <a:pt x="7079631" y="6193665"/>
+                      <a:pt x="7081020" y="6432411"/>
+                    </a:cubicBezTo>
+                    <a:cubicBezTo>
+                      <a:pt x="7082409" y="6671157"/>
+                      <a:pt x="7044852" y="7023802"/>
+                      <a:pt x="7081020" y="7575645"/>
+                    </a:cubicBezTo>
+                    <a:cubicBezTo>
+                      <a:pt x="6954770" y="7569373"/>
+                      <a:pt x="6779392" y="7557580"/>
+                      <a:pt x="6508101" y="7575645"/>
+                    </a:cubicBezTo>
+                    <a:cubicBezTo>
+                      <a:pt x="6236810" y="7593710"/>
+                      <a:pt x="6026138" y="7592287"/>
+                      <a:pt x="5864372" y="7575645"/>
+                    </a:cubicBezTo>
+                    <a:cubicBezTo>
+                      <a:pt x="5702606" y="7559003"/>
+                      <a:pt x="5551602" y="7596243"/>
+                      <a:pt x="5433074" y="7575645"/>
+                    </a:cubicBezTo>
+                    <a:cubicBezTo>
+                      <a:pt x="5314546" y="7555047"/>
+                      <a:pt x="5146991" y="7576746"/>
+                      <a:pt x="5001775" y="7575645"/>
+                    </a:cubicBezTo>
+                    <a:cubicBezTo>
+                      <a:pt x="4856559" y="7574544"/>
+                      <a:pt x="4630755" y="7573329"/>
+                      <a:pt x="4358046" y="7575645"/>
+                    </a:cubicBezTo>
+                    <a:cubicBezTo>
+                      <a:pt x="4085337" y="7577961"/>
+                      <a:pt x="3967138" y="7589413"/>
+                      <a:pt x="3855937" y="7575645"/>
+                    </a:cubicBezTo>
+                    <a:cubicBezTo>
+                      <a:pt x="3744736" y="7561877"/>
+                      <a:pt x="3452305" y="7579803"/>
+                      <a:pt x="3141398" y="7575645"/>
+                    </a:cubicBezTo>
+                    <a:cubicBezTo>
+                      <a:pt x="2830491" y="7571487"/>
+                      <a:pt x="2779193" y="7570459"/>
+                      <a:pt x="2639289" y="7575645"/>
+                    </a:cubicBezTo>
+                    <a:cubicBezTo>
+                      <a:pt x="2499385" y="7580831"/>
+                      <a:pt x="2173760" y="7540817"/>
+                      <a:pt x="1924750" y="7575645"/>
+                    </a:cubicBezTo>
+                    <a:cubicBezTo>
+                      <a:pt x="1675740" y="7610473"/>
+                      <a:pt x="1667255" y="7580555"/>
+                      <a:pt x="1493451" y="7575645"/>
+                    </a:cubicBezTo>
+                    <a:cubicBezTo>
+                      <a:pt x="1319647" y="7570735"/>
+                      <a:pt x="928836" y="7610082"/>
+                      <a:pt x="778912" y="7575645"/>
+                    </a:cubicBezTo>
+                    <a:cubicBezTo>
+                      <a:pt x="628988" y="7541208"/>
+                      <a:pt x="182251" y="7573999"/>
+                      <a:pt x="0" y="7575645"/>
+                    </a:cubicBezTo>
+                    <a:cubicBezTo>
+                      <a:pt x="15150" y="7404508"/>
+                      <a:pt x="16519" y="7234218"/>
+                      <a:pt x="0" y="7114219"/>
+                    </a:cubicBezTo>
+                    <a:cubicBezTo>
+                      <a:pt x="-16519" y="6994220"/>
+                      <a:pt x="3143" y="6651195"/>
+                      <a:pt x="0" y="6501281"/>
+                    </a:cubicBezTo>
+                    <a:cubicBezTo>
+                      <a:pt x="-3143" y="6351367"/>
+                      <a:pt x="-1130" y="5936226"/>
+                      <a:pt x="0" y="5661073"/>
+                    </a:cubicBezTo>
+                    <a:cubicBezTo>
+                      <a:pt x="1130" y="5385920"/>
+                      <a:pt x="24834" y="5275609"/>
+                      <a:pt x="0" y="5123891"/>
+                    </a:cubicBezTo>
+                    <a:cubicBezTo>
+                      <a:pt x="-24834" y="4972173"/>
+                      <a:pt x="10680" y="4837647"/>
+                      <a:pt x="0" y="4662465"/>
+                    </a:cubicBezTo>
+                    <a:cubicBezTo>
+                      <a:pt x="-10680" y="4487283"/>
+                      <a:pt x="8768" y="4387963"/>
+                      <a:pt x="0" y="4201039"/>
+                    </a:cubicBezTo>
+                    <a:cubicBezTo>
+                      <a:pt x="-8768" y="4014115"/>
+                      <a:pt x="-35882" y="3810863"/>
+                      <a:pt x="0" y="3436588"/>
+                    </a:cubicBezTo>
+                    <a:cubicBezTo>
+                      <a:pt x="35882" y="3062313"/>
+                      <a:pt x="-14742" y="3160854"/>
+                      <a:pt x="0" y="2975162"/>
+                    </a:cubicBezTo>
+                    <a:cubicBezTo>
+                      <a:pt x="14742" y="2789470"/>
+                      <a:pt x="-14294" y="2476161"/>
+                      <a:pt x="0" y="2286467"/>
+                    </a:cubicBezTo>
+                    <a:cubicBezTo>
+                      <a:pt x="14294" y="2096773"/>
+                      <a:pt x="-10436" y="1867438"/>
+                      <a:pt x="0" y="1749285"/>
+                    </a:cubicBezTo>
+                    <a:cubicBezTo>
+                      <a:pt x="10436" y="1631132"/>
+                      <a:pt x="4070" y="1352035"/>
+                      <a:pt x="0" y="1060590"/>
+                    </a:cubicBezTo>
+                    <a:cubicBezTo>
+                      <a:pt x="-4070" y="769145"/>
+                      <a:pt x="-22406" y="255159"/>
                       <a:pt x="0" y="0"/>
                     </a:cubicBezTo>
                     <a:close/>
@@ -6494,44 +6645,60 @@
               <a:custGeom>
                 <a:avLst/>
                 <a:gdLst>
-                  <a:gd name="connsiteX0" fmla="*/ 0 w 3984158"/>
-                  <a:gd name="connsiteY0" fmla="*/ 0 h 1483208"/>
-                  <a:gd name="connsiteX1" fmla="*/ 624185 w 3984158"/>
-                  <a:gd name="connsiteY1" fmla="*/ 0 h 1483208"/>
-                  <a:gd name="connsiteX2" fmla="*/ 1168686 w 3984158"/>
-                  <a:gd name="connsiteY2" fmla="*/ 0 h 1483208"/>
-                  <a:gd name="connsiteX3" fmla="*/ 1912396 w 3984158"/>
-                  <a:gd name="connsiteY3" fmla="*/ 0 h 1483208"/>
-                  <a:gd name="connsiteX4" fmla="*/ 2536581 w 3984158"/>
-                  <a:gd name="connsiteY4" fmla="*/ 0 h 1483208"/>
-                  <a:gd name="connsiteX5" fmla="*/ 3160765 w 3984158"/>
-                  <a:gd name="connsiteY5" fmla="*/ 0 h 1483208"/>
-                  <a:gd name="connsiteX6" fmla="*/ 3984158 w 3984158"/>
-                  <a:gd name="connsiteY6" fmla="*/ 0 h 1483208"/>
-                  <a:gd name="connsiteX7" fmla="*/ 3984158 w 3984158"/>
-                  <a:gd name="connsiteY7" fmla="*/ 464739 h 1483208"/>
-                  <a:gd name="connsiteX8" fmla="*/ 3984158 w 3984158"/>
-                  <a:gd name="connsiteY8" fmla="*/ 959141 h 1483208"/>
-                  <a:gd name="connsiteX9" fmla="*/ 3984158 w 3984158"/>
-                  <a:gd name="connsiteY9" fmla="*/ 1483208 h 1483208"/>
-                  <a:gd name="connsiteX10" fmla="*/ 3399815 w 3984158"/>
-                  <a:gd name="connsiteY10" fmla="*/ 1483208 h 1483208"/>
-                  <a:gd name="connsiteX11" fmla="*/ 2735788 w 3984158"/>
-                  <a:gd name="connsiteY11" fmla="*/ 1483208 h 1483208"/>
-                  <a:gd name="connsiteX12" fmla="*/ 2111604 w 3984158"/>
-                  <a:gd name="connsiteY12" fmla="*/ 1483208 h 1483208"/>
-                  <a:gd name="connsiteX13" fmla="*/ 1367894 w 3984158"/>
-                  <a:gd name="connsiteY13" fmla="*/ 1483208 h 1483208"/>
-                  <a:gd name="connsiteX14" fmla="*/ 624185 w 3984158"/>
-                  <a:gd name="connsiteY14" fmla="*/ 1483208 h 1483208"/>
-                  <a:gd name="connsiteX15" fmla="*/ 0 w 3984158"/>
-                  <a:gd name="connsiteY15" fmla="*/ 1483208 h 1483208"/>
-                  <a:gd name="connsiteX16" fmla="*/ 0 w 3984158"/>
-                  <a:gd name="connsiteY16" fmla="*/ 988805 h 1483208"/>
-                  <a:gd name="connsiteX17" fmla="*/ 0 w 3984158"/>
-                  <a:gd name="connsiteY17" fmla="*/ 509235 h 1483208"/>
-                  <a:gd name="connsiteX18" fmla="*/ 0 w 3984158"/>
-                  <a:gd name="connsiteY18" fmla="*/ 0 h 1483208"/>
+                  <a:gd name="connsiteX0" fmla="*/ 0 w 6685443"/>
+                  <a:gd name="connsiteY0" fmla="*/ 0 h 1815499"/>
+                  <a:gd name="connsiteX1" fmla="*/ 601690 w 6685443"/>
+                  <a:gd name="connsiteY1" fmla="*/ 0 h 1815499"/>
+                  <a:gd name="connsiteX2" fmla="*/ 1069671 w 6685443"/>
+                  <a:gd name="connsiteY2" fmla="*/ 0 h 1815499"/>
+                  <a:gd name="connsiteX3" fmla="*/ 1871924 w 6685443"/>
+                  <a:gd name="connsiteY3" fmla="*/ 0 h 1815499"/>
+                  <a:gd name="connsiteX4" fmla="*/ 2473614 w 6685443"/>
+                  <a:gd name="connsiteY4" fmla="*/ 0 h 1815499"/>
+                  <a:gd name="connsiteX5" fmla="*/ 3075304 w 6685443"/>
+                  <a:gd name="connsiteY5" fmla="*/ 0 h 1815499"/>
+                  <a:gd name="connsiteX6" fmla="*/ 3877557 w 6685443"/>
+                  <a:gd name="connsiteY6" fmla="*/ 0 h 1815499"/>
+                  <a:gd name="connsiteX7" fmla="*/ 4412392 w 6685443"/>
+                  <a:gd name="connsiteY7" fmla="*/ 0 h 1815499"/>
+                  <a:gd name="connsiteX8" fmla="*/ 5214646 w 6685443"/>
+                  <a:gd name="connsiteY8" fmla="*/ 0 h 1815499"/>
+                  <a:gd name="connsiteX9" fmla="*/ 6016899 w 6685443"/>
+                  <a:gd name="connsiteY9" fmla="*/ 0 h 1815499"/>
+                  <a:gd name="connsiteX10" fmla="*/ 6685443 w 6685443"/>
+                  <a:gd name="connsiteY10" fmla="*/ 0 h 1815499"/>
+                  <a:gd name="connsiteX11" fmla="*/ 6685443 w 6685443"/>
+                  <a:gd name="connsiteY11" fmla="*/ 641476 h 1815499"/>
+                  <a:gd name="connsiteX12" fmla="*/ 6685443 w 6685443"/>
+                  <a:gd name="connsiteY12" fmla="*/ 1264798 h 1815499"/>
+                  <a:gd name="connsiteX13" fmla="*/ 6685443 w 6685443"/>
+                  <a:gd name="connsiteY13" fmla="*/ 1815499 h 1815499"/>
+                  <a:gd name="connsiteX14" fmla="*/ 6016899 w 6685443"/>
+                  <a:gd name="connsiteY14" fmla="*/ 1815499 h 1815499"/>
+                  <a:gd name="connsiteX15" fmla="*/ 5482063 w 6685443"/>
+                  <a:gd name="connsiteY15" fmla="*/ 1815499 h 1815499"/>
+                  <a:gd name="connsiteX16" fmla="*/ 4813519 w 6685443"/>
+                  <a:gd name="connsiteY16" fmla="*/ 1815499 h 1815499"/>
+                  <a:gd name="connsiteX17" fmla="*/ 4011266 w 6685443"/>
+                  <a:gd name="connsiteY17" fmla="*/ 1815499 h 1815499"/>
+                  <a:gd name="connsiteX18" fmla="*/ 3342722 w 6685443"/>
+                  <a:gd name="connsiteY18" fmla="*/ 1815499 h 1815499"/>
+                  <a:gd name="connsiteX19" fmla="*/ 2874740 w 6685443"/>
+                  <a:gd name="connsiteY19" fmla="*/ 1815499 h 1815499"/>
+                  <a:gd name="connsiteX20" fmla="*/ 2339905 w 6685443"/>
+                  <a:gd name="connsiteY20" fmla="*/ 1815499 h 1815499"/>
+                  <a:gd name="connsiteX21" fmla="*/ 1537652 w 6685443"/>
+                  <a:gd name="connsiteY21" fmla="*/ 1815499 h 1815499"/>
+                  <a:gd name="connsiteX22" fmla="*/ 869108 w 6685443"/>
+                  <a:gd name="connsiteY22" fmla="*/ 1815499 h 1815499"/>
+                  <a:gd name="connsiteX23" fmla="*/ 0 w 6685443"/>
+                  <a:gd name="connsiteY23" fmla="*/ 1815499 h 1815499"/>
+                  <a:gd name="connsiteX24" fmla="*/ 0 w 6685443"/>
+                  <a:gd name="connsiteY24" fmla="*/ 1210333 h 1815499"/>
+                  <a:gd name="connsiteX25" fmla="*/ 0 w 6685443"/>
+                  <a:gd name="connsiteY25" fmla="*/ 659631 h 1815499"/>
+                  <a:gd name="connsiteX26" fmla="*/ 0 w 6685443"/>
+                  <a:gd name="connsiteY26" fmla="*/ 0 h 1815499"/>
                 </a:gdLst>
                 <a:ahLst/>
                 <a:cxnLst>
@@ -6592,101 +6759,165 @@
                   <a:cxn ang="0">
                     <a:pos x="connsiteX18" y="connsiteY18"/>
                   </a:cxn>
+                  <a:cxn ang="0">
+                    <a:pos x="connsiteX19" y="connsiteY19"/>
+                  </a:cxn>
+                  <a:cxn ang="0">
+                    <a:pos x="connsiteX20" y="connsiteY20"/>
+                  </a:cxn>
+                  <a:cxn ang="0">
+                    <a:pos x="connsiteX21" y="connsiteY21"/>
+                  </a:cxn>
+                  <a:cxn ang="0">
+                    <a:pos x="connsiteX22" y="connsiteY22"/>
+                  </a:cxn>
+                  <a:cxn ang="0">
+                    <a:pos x="connsiteX23" y="connsiteY23"/>
+                  </a:cxn>
+                  <a:cxn ang="0">
+                    <a:pos x="connsiteX24" y="connsiteY24"/>
+                  </a:cxn>
+                  <a:cxn ang="0">
+                    <a:pos x="connsiteX25" y="connsiteY25"/>
+                  </a:cxn>
+                  <a:cxn ang="0">
+                    <a:pos x="connsiteX26" y="connsiteY26"/>
+                  </a:cxn>
                 </a:cxnLst>
                 <a:rect l="l" t="t" r="r" b="b"/>
                 <a:pathLst>
-                  <a:path w="3984158" h="1483208" extrusionOk="0">
+                  <a:path w="6685443" h="1815499" extrusionOk="0">
                     <a:moveTo>
                       <a:pt x="0" y="0"/>
                     </a:moveTo>
                     <a:cubicBezTo>
-                      <a:pt x="183423" y="18876"/>
-                      <a:pt x="387432" y="11885"/>
-                      <a:pt x="624185" y="0"/>
-                    </a:cubicBezTo>
-                    <a:cubicBezTo>
-                      <a:pt x="860939" y="-11885"/>
-                      <a:pt x="1054606" y="-18463"/>
-                      <a:pt x="1168686" y="0"/>
-                    </a:cubicBezTo>
-                    <a:cubicBezTo>
-                      <a:pt x="1282766" y="18463"/>
-                      <a:pt x="1693901" y="35828"/>
-                      <a:pt x="1912396" y="0"/>
-                    </a:cubicBezTo>
-                    <a:cubicBezTo>
-                      <a:pt x="2130891" y="-35828"/>
-                      <a:pt x="2399161" y="-14960"/>
-                      <a:pt x="2536581" y="0"/>
-                    </a:cubicBezTo>
-                    <a:cubicBezTo>
-                      <a:pt x="2674002" y="14960"/>
-                      <a:pt x="2930878" y="25357"/>
-                      <a:pt x="3160765" y="0"/>
-                    </a:cubicBezTo>
-                    <a:cubicBezTo>
-                      <a:pt x="3390652" y="-25357"/>
-                      <a:pt x="3618233" y="22549"/>
-                      <a:pt x="3984158" y="0"/>
-                    </a:cubicBezTo>
-                    <a:cubicBezTo>
-                      <a:pt x="3984038" y="195374"/>
-                      <a:pt x="3982039" y="245726"/>
-                      <a:pt x="3984158" y="464739"/>
-                    </a:cubicBezTo>
-                    <a:cubicBezTo>
-                      <a:pt x="3986277" y="683752"/>
-                      <a:pt x="3968175" y="738445"/>
-                      <a:pt x="3984158" y="959141"/>
-                    </a:cubicBezTo>
-                    <a:cubicBezTo>
-                      <a:pt x="4000141" y="1179837"/>
-                      <a:pt x="4006929" y="1289598"/>
-                      <a:pt x="3984158" y="1483208"/>
-                    </a:cubicBezTo>
-                    <a:cubicBezTo>
-                      <a:pt x="3803422" y="1507410"/>
-                      <a:pt x="3621945" y="1507539"/>
-                      <a:pt x="3399815" y="1483208"/>
-                    </a:cubicBezTo>
-                    <a:cubicBezTo>
-                      <a:pt x="3177685" y="1458877"/>
-                      <a:pt x="2949391" y="1453742"/>
-                      <a:pt x="2735788" y="1483208"/>
-                    </a:cubicBezTo>
-                    <a:cubicBezTo>
-                      <a:pt x="2522185" y="1512674"/>
-                      <a:pt x="2346462" y="1470132"/>
-                      <a:pt x="2111604" y="1483208"/>
-                    </a:cubicBezTo>
-                    <a:cubicBezTo>
-                      <a:pt x="1876746" y="1496284"/>
-                      <a:pt x="1574870" y="1492723"/>
-                      <a:pt x="1367894" y="1483208"/>
-                    </a:cubicBezTo>
-                    <a:cubicBezTo>
-                      <a:pt x="1160918" y="1473694"/>
-                      <a:pt x="788357" y="1457438"/>
-                      <a:pt x="624185" y="1483208"/>
-                    </a:cubicBezTo>
-                    <a:cubicBezTo>
-                      <a:pt x="460013" y="1508978"/>
-                      <a:pt x="282889" y="1481339"/>
-                      <a:pt x="0" y="1483208"/>
-                    </a:cubicBezTo>
-                    <a:cubicBezTo>
-                      <a:pt x="24368" y="1316907"/>
-                      <a:pt x="-24567" y="1129752"/>
-                      <a:pt x="0" y="988805"/>
-                    </a:cubicBezTo>
-                    <a:cubicBezTo>
-                      <a:pt x="24567" y="847858"/>
-                      <a:pt x="2696" y="683175"/>
-                      <a:pt x="0" y="509235"/>
-                    </a:cubicBezTo>
-                    <a:cubicBezTo>
-                      <a:pt x="-2696" y="335295"/>
-                      <a:pt x="22160" y="109840"/>
+                      <a:pt x="197687" y="5421"/>
+                      <a:pt x="392637" y="-27165"/>
+                      <a:pt x="601690" y="0"/>
+                    </a:cubicBezTo>
+                    <a:cubicBezTo>
+                      <a:pt x="810743" y="27165"/>
+                      <a:pt x="967174" y="20034"/>
+                      <a:pt x="1069671" y="0"/>
+                    </a:cubicBezTo>
+                    <a:cubicBezTo>
+                      <a:pt x="1172168" y="-20034"/>
+                      <a:pt x="1481114" y="26288"/>
+                      <a:pt x="1871924" y="0"/>
+                    </a:cubicBezTo>
+                    <a:cubicBezTo>
+                      <a:pt x="2262734" y="-26288"/>
+                      <a:pt x="2275646" y="9816"/>
+                      <a:pt x="2473614" y="0"/>
+                    </a:cubicBezTo>
+                    <a:cubicBezTo>
+                      <a:pt x="2671582" y="-9816"/>
+                      <a:pt x="2837715" y="-16866"/>
+                      <a:pt x="3075304" y="0"/>
+                    </a:cubicBezTo>
+                    <a:cubicBezTo>
+                      <a:pt x="3312893" y="16866"/>
+                      <a:pt x="3565082" y="13656"/>
+                      <a:pt x="3877557" y="0"/>
+                    </a:cubicBezTo>
+                    <a:cubicBezTo>
+                      <a:pt x="4190032" y="-13656"/>
+                      <a:pt x="4275680" y="23045"/>
+                      <a:pt x="4412392" y="0"/>
+                    </a:cubicBezTo>
+                    <a:cubicBezTo>
+                      <a:pt x="4549105" y="-23045"/>
+                      <a:pt x="4974381" y="13533"/>
+                      <a:pt x="5214646" y="0"/>
+                    </a:cubicBezTo>
+                    <a:cubicBezTo>
+                      <a:pt x="5454911" y="-13533"/>
+                      <a:pt x="5621382" y="6072"/>
+                      <a:pt x="6016899" y="0"/>
+                    </a:cubicBezTo>
+                    <a:cubicBezTo>
+                      <a:pt x="6412416" y="-6072"/>
+                      <a:pt x="6368099" y="-22480"/>
+                      <a:pt x="6685443" y="0"/>
+                    </a:cubicBezTo>
+                    <a:cubicBezTo>
+                      <a:pt x="6675060" y="141143"/>
+                      <a:pt x="6688790" y="422707"/>
+                      <a:pt x="6685443" y="641476"/>
+                    </a:cubicBezTo>
+                    <a:cubicBezTo>
+                      <a:pt x="6682096" y="860245"/>
+                      <a:pt x="6676921" y="1110529"/>
+                      <a:pt x="6685443" y="1264798"/>
+                    </a:cubicBezTo>
+                    <a:cubicBezTo>
+                      <a:pt x="6693965" y="1419067"/>
+                      <a:pt x="6712438" y="1626237"/>
+                      <a:pt x="6685443" y="1815499"/>
+                    </a:cubicBezTo>
+                    <a:cubicBezTo>
+                      <a:pt x="6531485" y="1826631"/>
+                      <a:pt x="6258288" y="1826162"/>
+                      <a:pt x="6016899" y="1815499"/>
+                    </a:cubicBezTo>
+                    <a:cubicBezTo>
+                      <a:pt x="5775510" y="1804836"/>
+                      <a:pt x="5635687" y="1808580"/>
+                      <a:pt x="5482063" y="1815499"/>
+                    </a:cubicBezTo>
+                    <a:cubicBezTo>
+                      <a:pt x="5328439" y="1822418"/>
+                      <a:pt x="4969533" y="1798322"/>
+                      <a:pt x="4813519" y="1815499"/>
+                    </a:cubicBezTo>
+                    <a:cubicBezTo>
+                      <a:pt x="4657505" y="1832676"/>
+                      <a:pt x="4277484" y="1797792"/>
+                      <a:pt x="4011266" y="1815499"/>
+                    </a:cubicBezTo>
+                    <a:cubicBezTo>
+                      <a:pt x="3745048" y="1833206"/>
+                      <a:pt x="3503887" y="1798854"/>
+                      <a:pt x="3342722" y="1815499"/>
+                    </a:cubicBezTo>
+                    <a:cubicBezTo>
+                      <a:pt x="3181557" y="1832144"/>
+                      <a:pt x="3094655" y="1808958"/>
+                      <a:pt x="2874740" y="1815499"/>
+                    </a:cubicBezTo>
+                    <a:cubicBezTo>
+                      <a:pt x="2654825" y="1822040"/>
+                      <a:pt x="2552356" y="1810430"/>
+                      <a:pt x="2339905" y="1815499"/>
+                    </a:cubicBezTo>
+                    <a:cubicBezTo>
+                      <a:pt x="2127454" y="1820568"/>
+                      <a:pt x="1825409" y="1807327"/>
+                      <a:pt x="1537652" y="1815499"/>
+                    </a:cubicBezTo>
+                    <a:cubicBezTo>
+                      <a:pt x="1249895" y="1823671"/>
+                      <a:pt x="1086879" y="1834794"/>
+                      <a:pt x="869108" y="1815499"/>
+                    </a:cubicBezTo>
+                    <a:cubicBezTo>
+                      <a:pt x="651337" y="1796204"/>
+                      <a:pt x="264417" y="1828267"/>
+                      <a:pt x="0" y="1815499"/>
+                    </a:cubicBezTo>
+                    <a:cubicBezTo>
+                      <a:pt x="8313" y="1520428"/>
+                      <a:pt x="-1936" y="1449694"/>
+                      <a:pt x="0" y="1210333"/>
+                    </a:cubicBezTo>
+                    <a:cubicBezTo>
+                      <a:pt x="1936" y="970972"/>
+                      <a:pt x="16209" y="905402"/>
+                      <a:pt x="0" y="659631"/>
+                    </a:cubicBezTo>
+                    <a:cubicBezTo>
+                      <a:pt x="-16209" y="413860"/>
+                      <a:pt x="-15680" y="309233"/>
                       <a:pt x="0" y="0"/>
                     </a:cubicBezTo>
                     <a:close/>
@@ -6963,19 +7194,19 @@
                 <a:avLst/>
                 <a:gdLst>
                   <a:gd name="connsiteX0" fmla="*/ 0 w 854294"/>
-                  <a:gd name="connsiteY0" fmla="*/ 0 h 307776"/>
+                  <a:gd name="connsiteY0" fmla="*/ 0 h 307777"/>
                   <a:gd name="connsiteX1" fmla="*/ 418604 w 854294"/>
-                  <a:gd name="connsiteY1" fmla="*/ 0 h 307776"/>
+                  <a:gd name="connsiteY1" fmla="*/ 0 h 307777"/>
                   <a:gd name="connsiteX2" fmla="*/ 854294 w 854294"/>
-                  <a:gd name="connsiteY2" fmla="*/ 0 h 307776"/>
+                  <a:gd name="connsiteY2" fmla="*/ 0 h 307777"/>
                   <a:gd name="connsiteX3" fmla="*/ 854294 w 854294"/>
-                  <a:gd name="connsiteY3" fmla="*/ 307776 h 307776"/>
+                  <a:gd name="connsiteY3" fmla="*/ 307777 h 307777"/>
                   <a:gd name="connsiteX4" fmla="*/ 427147 w 854294"/>
-                  <a:gd name="connsiteY4" fmla="*/ 307776 h 307776"/>
+                  <a:gd name="connsiteY4" fmla="*/ 307777 h 307777"/>
                   <a:gd name="connsiteX5" fmla="*/ 0 w 854294"/>
-                  <a:gd name="connsiteY5" fmla="*/ 307776 h 307776"/>
+                  <a:gd name="connsiteY5" fmla="*/ 307777 h 307777"/>
                   <a:gd name="connsiteX6" fmla="*/ 0 w 854294"/>
-                  <a:gd name="connsiteY6" fmla="*/ 0 h 307776"/>
+                  <a:gd name="connsiteY6" fmla="*/ 0 h 307777"/>
                 </a:gdLst>
                 <a:ahLst/>
                 <a:cxnLst>
@@ -7003,7 +7234,7 @@
                 </a:cxnLst>
                 <a:rect l="l" t="t" r="r" b="b"/>
                 <a:pathLst>
-                  <a:path w="854294" h="307776" extrusionOk="0">
+                  <a:path w="854294" h="307777" extrusionOk="0">
                     <a:moveTo>
                       <a:pt x="0" y="0"/>
                     </a:moveTo>
@@ -7018,23 +7249,23 @@
                       <a:pt x="854294" y="0"/>
                     </a:cubicBezTo>
                     <a:cubicBezTo>
-                      <a:pt x="863207" y="67219"/>
-                      <a:pt x="869389" y="222409"/>
-                      <a:pt x="854294" y="307776"/>
-                    </a:cubicBezTo>
-                    <a:cubicBezTo>
-                      <a:pt x="762963" y="302805"/>
-                      <a:pt x="592541" y="323159"/>
-                      <a:pt x="427147" y="307776"/>
-                    </a:cubicBezTo>
-                    <a:cubicBezTo>
-                      <a:pt x="261753" y="292393"/>
-                      <a:pt x="133192" y="320591"/>
-                      <a:pt x="0" y="307776"/>
-                    </a:cubicBezTo>
-                    <a:cubicBezTo>
-                      <a:pt x="-11315" y="167405"/>
-                      <a:pt x="-8831" y="148978"/>
+                      <a:pt x="843460" y="62246"/>
+                      <a:pt x="843276" y="219189"/>
+                      <a:pt x="854294" y="307777"/>
+                    </a:cubicBezTo>
+                    <a:cubicBezTo>
+                      <a:pt x="762963" y="302806"/>
+                      <a:pt x="592541" y="323160"/>
+                      <a:pt x="427147" y="307777"/>
+                    </a:cubicBezTo>
+                    <a:cubicBezTo>
+                      <a:pt x="261753" y="292394"/>
+                      <a:pt x="133192" y="320592"/>
+                      <a:pt x="0" y="307777"/>
+                    </a:cubicBezTo>
+                    <a:cubicBezTo>
+                      <a:pt x="9866" y="171271"/>
+                      <a:pt x="-8953" y="65853"/>
                       <a:pt x="0" y="0"/>
                     </a:cubicBezTo>
                     <a:close/>
@@ -20622,6 +20853,2435 @@
 </p:sld>
 </file>
 
+<file path=ppt/slides/slide8.xml><?xml version="1.0" encoding="utf-8"?>
+<p:sld xmlns:a="http://schemas.openxmlformats.org/drawingml/2006/main" xmlns:r="http://schemas.openxmlformats.org/officeDocument/2006/relationships" xmlns:p="http://schemas.openxmlformats.org/presentationml/2006/main">
+  <p:cSld>
+    <p:bg>
+      <p:bgPr>
+        <a:blipFill dpi="0" rotWithShape="1">
+          <a:blip r:embed="rId2">
+            <a:lum/>
+          </a:blip>
+          <a:srcRect/>
+          <a:stretch>
+            <a:fillRect/>
+          </a:stretch>
+        </a:blipFill>
+        <a:effectLst/>
+      </p:bgPr>
+    </p:bg>
+    <p:spTree>
+      <p:nvGrpSpPr>
+        <p:cNvPr id="1" name=""/>
+        <p:cNvGrpSpPr/>
+        <p:nvPr/>
+      </p:nvGrpSpPr>
+      <p:grpSpPr>
+        <a:xfrm>
+          <a:off x="0" y="0"/>
+          <a:ext cx="0" cy="0"/>
+          <a:chOff x="0" y="0"/>
+          <a:chExt cx="0" cy="0"/>
+        </a:xfrm>
+      </p:grpSpPr>
+      <p:grpSp>
+        <p:nvGrpSpPr>
+          <p:cNvPr id="12" name="Group 11">
+            <a:extLst>
+              <a:ext uri="{FF2B5EF4-FFF2-40B4-BE49-F238E27FC236}">
+                <a16:creationId xmlns:a16="http://schemas.microsoft.com/office/drawing/2014/main" id="{F79D1400-153A-0626-FCB1-82473C4A95BC}"/>
+              </a:ext>
+            </a:extLst>
+          </p:cNvPr>
+          <p:cNvGrpSpPr/>
+          <p:nvPr/>
+        </p:nvGrpSpPr>
+        <p:grpSpPr>
+          <a:xfrm>
+            <a:off x="229043" y="30592"/>
+            <a:ext cx="7101587" cy="4786579"/>
+            <a:chOff x="231271" y="-3073076"/>
+            <a:chExt cx="7101587" cy="4786579"/>
+          </a:xfrm>
+        </p:grpSpPr>
+        <p:sp>
+          <p:nvSpPr>
+            <p:cNvPr id="16" name="TextBox 15">
+              <a:extLst>
+                <a:ext uri="{FF2B5EF4-FFF2-40B4-BE49-F238E27FC236}">
+                  <a16:creationId xmlns:a16="http://schemas.microsoft.com/office/drawing/2014/main" id="{579D6D41-105C-FB51-AC96-A544404112E8}"/>
+                </a:ext>
+              </a:extLst>
+            </p:cNvPr>
+            <p:cNvSpPr txBox="1"/>
+            <p:nvPr/>
+          </p:nvSpPr>
+          <p:spPr>
+            <a:xfrm>
+              <a:off x="2253693" y="-2438525"/>
+              <a:ext cx="5046276" cy="2492990"/>
+            </a:xfrm>
+            <a:prstGeom prst="rect">
+              <a:avLst/>
+            </a:prstGeom>
+            <a:noFill/>
+          </p:spPr>
+          <p:txBody>
+            <a:bodyPr wrap="square" rtlCol="0">
+              <a:spAutoFit/>
+            </a:bodyPr>
+            <a:lstStyle/>
+            <a:p>
+              <a:pPr marL="228600" indent="-228600" rtl="0">
+                <a:buFont typeface="+mj-lt"/>
+                <a:buAutoNum type="arabicPeriod"/>
+              </a:pPr>
+              <a:r>
+                <a:rPr lang="en-AU" sz="1200" dirty="0">
+                  <a:solidFill>
+                    <a:schemeClr val="bg1">
+                      <a:lumMod val="65000"/>
+                    </a:schemeClr>
+                  </a:solidFill>
+                </a:rPr>
+                <a:t>int main() {</a:t>
+              </a:r>
+            </a:p>
+            <a:p>
+              <a:pPr marL="228600" indent="-228600" rtl="0">
+                <a:buFont typeface="+mj-lt"/>
+                <a:buAutoNum type="arabicPeriod"/>
+              </a:pPr>
+              <a:r>
+                <a:rPr lang="en-AU" sz="1200" dirty="0">
+                  <a:solidFill>
+                    <a:schemeClr val="bg1">
+                      <a:lumMod val="65000"/>
+                    </a:schemeClr>
+                  </a:solidFill>
+                </a:rPr>
+                <a:t>    </a:t>
+              </a:r>
+              <a:r>
+                <a:rPr lang="en-AU" sz="1200" dirty="0" err="1">
+                  <a:solidFill>
+                    <a:schemeClr val="bg1">
+                      <a:lumMod val="65000"/>
+                    </a:schemeClr>
+                  </a:solidFill>
+                </a:rPr>
+                <a:t>write_line</a:t>
+              </a:r>
+              <a:r>
+                <a:rPr lang="en-AU" sz="1200" dirty="0">
+                  <a:solidFill>
+                    <a:schemeClr val="bg1">
+                      <a:lumMod val="65000"/>
+                    </a:schemeClr>
+                  </a:solidFill>
+                </a:rPr>
+                <a:t>("Calling </a:t>
+              </a:r>
+              <a:r>
+                <a:rPr lang="en-AU" sz="1200" dirty="0" err="1">
+                  <a:solidFill>
+                    <a:schemeClr val="bg1">
+                      <a:lumMod val="65000"/>
+                    </a:schemeClr>
+                  </a:solidFill>
+                </a:rPr>
+                <a:t>test_return</a:t>
+              </a:r>
+              <a:r>
+                <a:rPr lang="en-AU" sz="1200" dirty="0">
+                  <a:solidFill>
+                    <a:schemeClr val="bg1">
+                      <a:lumMod val="65000"/>
+                    </a:schemeClr>
+                  </a:solidFill>
+                </a:rPr>
+                <a:t> - the value " + </a:t>
+              </a:r>
+              <a:r>
+                <a:rPr lang="en-AU" sz="1200" dirty="0" err="1">
+                  <a:solidFill>
+                    <a:schemeClr val="bg1">
+                      <a:lumMod val="65000"/>
+                    </a:schemeClr>
+                  </a:solidFill>
+                </a:rPr>
+                <a:t>to_string</a:t>
+              </a:r>
+              <a:r>
+                <a:rPr lang="en-AU" sz="1200" dirty="0">
+                  <a:solidFill>
+                    <a:schemeClr val="bg1">
+                      <a:lumMod val="65000"/>
+                    </a:schemeClr>
+                  </a:solidFill>
+                </a:rPr>
+                <a:t>(</a:t>
+              </a:r>
+              <a:r>
+                <a:rPr lang="en-AU" sz="1200" dirty="0" err="1">
+                  <a:solidFill>
+                    <a:schemeClr val="bg1">
+                      <a:lumMod val="65000"/>
+                    </a:schemeClr>
+                  </a:solidFill>
+                </a:rPr>
+                <a:t>test_return</a:t>
+              </a:r>
+              <a:r>
+                <a:rPr lang="en-AU" sz="1200" dirty="0">
+                  <a:solidFill>
+                    <a:schemeClr val="bg1">
+                      <a:lumMod val="65000"/>
+                    </a:schemeClr>
+                  </a:solidFill>
+                </a:rPr>
+                <a:t>()) + " is returned\n");</a:t>
+              </a:r>
+            </a:p>
+            <a:p>
+              <a:pPr marL="228600" indent="-228600" rtl="0">
+                <a:buFont typeface="+mj-lt"/>
+                <a:buAutoNum type="arabicPeriod"/>
+              </a:pPr>
+              <a:r>
+                <a:rPr lang="en-AU" sz="1200" dirty="0">
+                  <a:solidFill>
+                    <a:schemeClr val="bg1">
+                      <a:lumMod val="65000"/>
+                    </a:schemeClr>
+                  </a:solidFill>
+                </a:rPr>
+                <a:t>    return 0;</a:t>
+              </a:r>
+            </a:p>
+            <a:p>
+              <a:pPr marL="228600" indent="-228600" rtl="0">
+                <a:buFont typeface="+mj-lt"/>
+                <a:buAutoNum type="arabicPeriod"/>
+              </a:pPr>
+              <a:r>
+                <a:rPr lang="en-AU" sz="1200" dirty="0">
+                  <a:solidFill>
+                    <a:schemeClr val="bg1">
+                      <a:lumMod val="65000"/>
+                    </a:schemeClr>
+                  </a:solidFill>
+                </a:rPr>
+                <a:t>}</a:t>
+              </a:r>
+              <a:br>
+                <a:rPr lang="en-AU" sz="1200" dirty="0">
+                  <a:solidFill>
+                    <a:schemeClr val="bg1">
+                      <a:lumMod val="65000"/>
+                    </a:schemeClr>
+                  </a:solidFill>
+                </a:rPr>
+              </a:br>
+              <a:endParaRPr lang="en-AU" sz="1200" dirty="0">
+                <a:solidFill>
+                  <a:schemeClr val="bg1">
+                    <a:lumMod val="65000"/>
+                  </a:schemeClr>
+                </a:solidFill>
+              </a:endParaRPr>
+            </a:p>
+            <a:p>
+              <a:pPr marL="228600" indent="-228600" rtl="0">
+                <a:buFont typeface="+mj-lt"/>
+                <a:buAutoNum type="arabicPeriod"/>
+              </a:pPr>
+              <a:r>
+                <a:rPr lang="en-AU" sz="1200" dirty="0">
+                  <a:solidFill>
+                    <a:schemeClr val="bg1">
+                      <a:lumMod val="65000"/>
+                    </a:schemeClr>
+                  </a:solidFill>
+                </a:rPr>
+                <a:t>int </a:t>
+              </a:r>
+              <a:r>
+                <a:rPr lang="en-AU" sz="1200" dirty="0" err="1">
+                  <a:solidFill>
+                    <a:schemeClr val="bg1">
+                      <a:lumMod val="65000"/>
+                    </a:schemeClr>
+                  </a:solidFill>
+                </a:rPr>
+                <a:t>test_return</a:t>
+              </a:r>
+              <a:r>
+                <a:rPr lang="en-AU" sz="1200" dirty="0">
+                  <a:solidFill>
+                    <a:schemeClr val="bg1">
+                      <a:lumMod val="65000"/>
+                    </a:schemeClr>
+                  </a:solidFill>
+                </a:rPr>
+                <a:t>() </a:t>
+              </a:r>
+            </a:p>
+            <a:p>
+              <a:pPr marL="228600" indent="-228600" rtl="0">
+                <a:buFont typeface="+mj-lt"/>
+                <a:buAutoNum type="arabicPeriod"/>
+              </a:pPr>
+              <a:r>
+                <a:rPr lang="en-AU" sz="1200" dirty="0">
+                  <a:solidFill>
+                    <a:schemeClr val="bg1">
+                      <a:lumMod val="65000"/>
+                    </a:schemeClr>
+                  </a:solidFill>
+                </a:rPr>
+                <a:t>{</a:t>
+              </a:r>
+            </a:p>
+            <a:p>
+              <a:pPr marL="228600" indent="-228600" rtl="0">
+                <a:buFont typeface="+mj-lt"/>
+                <a:buAutoNum type="arabicPeriod"/>
+              </a:pPr>
+              <a:r>
+                <a:rPr lang="en-AU" sz="1200" dirty="0">
+                  <a:solidFill>
+                    <a:schemeClr val="bg1">
+                      <a:lumMod val="65000"/>
+                    </a:schemeClr>
+                  </a:solidFill>
+                </a:rPr>
+                <a:t>    </a:t>
+              </a:r>
+              <a:r>
+                <a:rPr lang="en-AU" sz="1200" dirty="0" err="1">
+                  <a:solidFill>
+                    <a:schemeClr val="bg1">
+                      <a:lumMod val="65000"/>
+                    </a:schemeClr>
+                  </a:solidFill>
+                </a:rPr>
+                <a:t>write_line</a:t>
+              </a:r>
+              <a:r>
+                <a:rPr lang="en-AU" sz="1200" dirty="0">
+                  <a:solidFill>
+                    <a:schemeClr val="bg1">
+                      <a:lumMod val="65000"/>
+                    </a:schemeClr>
+                  </a:solidFill>
+                </a:rPr>
+                <a:t>("test-return started");</a:t>
+              </a:r>
+            </a:p>
+            <a:p>
+              <a:pPr marL="228600" indent="-228600" rtl="0">
+                <a:buFont typeface="+mj-lt"/>
+                <a:buAutoNum type="arabicPeriod"/>
+              </a:pPr>
+              <a:r>
+                <a:rPr lang="en-AU" sz="1200" dirty="0">
+                  <a:solidFill>
+                    <a:schemeClr val="bg1">
+                      <a:lumMod val="65000"/>
+                    </a:schemeClr>
+                  </a:solidFill>
+                </a:rPr>
+                <a:t>    return 3;</a:t>
+              </a:r>
+            </a:p>
+            <a:p>
+              <a:pPr marL="228600" indent="-228600" rtl="0">
+                <a:buFont typeface="+mj-lt"/>
+                <a:buAutoNum type="arabicPeriod"/>
+              </a:pPr>
+              <a:r>
+                <a:rPr lang="en-AU" sz="1200" dirty="0">
+                  <a:solidFill>
+                    <a:schemeClr val="bg1">
+                      <a:lumMod val="65000"/>
+                    </a:schemeClr>
+                  </a:solidFill>
+                </a:rPr>
+                <a:t>    </a:t>
+              </a:r>
+              <a:r>
+                <a:rPr lang="en-AU" sz="1200" dirty="0" err="1">
+                  <a:solidFill>
+                    <a:schemeClr val="bg1">
+                      <a:lumMod val="65000"/>
+                    </a:schemeClr>
+                  </a:solidFill>
+                </a:rPr>
+                <a:t>write_line</a:t>
+              </a:r>
+              <a:r>
+                <a:rPr lang="en-AU" sz="1200" dirty="0">
+                  <a:solidFill>
+                    <a:schemeClr val="bg1">
+                      <a:lumMod val="65000"/>
+                    </a:schemeClr>
+                  </a:solidFill>
+                </a:rPr>
+                <a:t>("Cannot be run as code returned above!");</a:t>
+              </a:r>
+            </a:p>
+            <a:p>
+              <a:pPr marL="228600" indent="-228600" rtl="0">
+                <a:buFont typeface="+mj-lt"/>
+                <a:buAutoNum type="arabicPeriod"/>
+              </a:pPr>
+              <a:r>
+                <a:rPr lang="en-AU" sz="1200" dirty="0">
+                  <a:solidFill>
+                    <a:schemeClr val="bg1">
+                      <a:lumMod val="65000"/>
+                    </a:schemeClr>
+                  </a:solidFill>
+                </a:rPr>
+                <a:t>}</a:t>
+              </a:r>
+            </a:p>
+            <a:p>
+              <a:pPr rtl="0"/>
+              <a:endParaRPr lang="en-AU" sz="1200" dirty="0">
+                <a:solidFill>
+                  <a:schemeClr val="bg1">
+                    <a:lumMod val="65000"/>
+                  </a:schemeClr>
+                </a:solidFill>
+              </a:endParaRPr>
+            </a:p>
+          </p:txBody>
+        </p:sp>
+        <p:grpSp>
+          <p:nvGrpSpPr>
+            <p:cNvPr id="37" name="Group 36">
+              <a:extLst>
+                <a:ext uri="{FF2B5EF4-FFF2-40B4-BE49-F238E27FC236}">
+                  <a16:creationId xmlns:a16="http://schemas.microsoft.com/office/drawing/2014/main" id="{2DBCA10F-924D-E145-7FF6-9A1953DEE281}"/>
+                </a:ext>
+              </a:extLst>
+            </p:cNvPr>
+            <p:cNvGrpSpPr/>
+            <p:nvPr/>
+          </p:nvGrpSpPr>
+          <p:grpSpPr>
+            <a:xfrm>
+              <a:off x="231271" y="917189"/>
+              <a:ext cx="1274409" cy="625877"/>
+              <a:chOff x="1357821" y="4757683"/>
+              <a:chExt cx="1274409" cy="625877"/>
+            </a:xfrm>
+          </p:grpSpPr>
+          <p:pic>
+            <p:nvPicPr>
+              <p:cNvPr id="13" name="Picture 12" descr="A black square with white lines&#10;&#10;Description automatically generated">
+                <a:extLst>
+                  <a:ext uri="{FF2B5EF4-FFF2-40B4-BE49-F238E27FC236}">
+                    <a16:creationId xmlns:a16="http://schemas.microsoft.com/office/drawing/2014/main" id="{9975BC6B-61F7-6B1E-178A-EB5A5CF8412C}"/>
+                  </a:ext>
+                </a:extLst>
+              </p:cNvPr>
+              <p:cNvPicPr>
+                <a:picLocks noChangeAspect="1"/>
+              </p:cNvPicPr>
+              <p:nvPr/>
+            </p:nvPicPr>
+            <p:blipFill>
+              <a:blip r:embed="rId3">
+                <a:alphaModFix/>
+              </a:blip>
+              <a:stretch>
+                <a:fillRect/>
+              </a:stretch>
+            </p:blipFill>
+            <p:spPr>
+              <a:xfrm>
+                <a:off x="1950895" y="4757683"/>
+                <a:ext cx="681335" cy="625877"/>
+              </a:xfrm>
+              <a:prstGeom prst="rect">
+                <a:avLst/>
+              </a:prstGeom>
+            </p:spPr>
+          </p:pic>
+          <p:sp>
+            <p:nvSpPr>
+              <p:cNvPr id="18" name="TextBox 17">
+                <a:extLst>
+                  <a:ext uri="{FF2B5EF4-FFF2-40B4-BE49-F238E27FC236}">
+                    <a16:creationId xmlns:a16="http://schemas.microsoft.com/office/drawing/2014/main" id="{21E6B770-730F-7A2F-0BCC-DFD2371C6F55}"/>
+                  </a:ext>
+                </a:extLst>
+              </p:cNvPr>
+              <p:cNvSpPr txBox="1"/>
+              <p:nvPr/>
+            </p:nvSpPr>
+            <p:spPr>
+              <a:xfrm>
+                <a:off x="1357821" y="4843378"/>
+                <a:ext cx="554960" cy="369332"/>
+              </a:xfrm>
+              <a:prstGeom prst="rect">
+                <a:avLst/>
+              </a:prstGeom>
+              <a:noFill/>
+            </p:spPr>
+            <p:txBody>
+              <a:bodyPr wrap="none" rtlCol="0">
+                <a:spAutoFit/>
+              </a:bodyPr>
+              <a:lstStyle/>
+              <a:p>
+                <a:r>
+                  <a:rPr lang="en-US" dirty="0">
+                    <a:latin typeface="Gaegu" pitchFamily="2" charset="0"/>
+                  </a:rPr>
+                  <a:t>CPU</a:t>
+                </a:r>
+              </a:p>
+            </p:txBody>
+          </p:sp>
+        </p:grpSp>
+        <p:sp>
+          <p:nvSpPr>
+            <p:cNvPr id="2" name="TextBox 1">
+              <a:extLst>
+                <a:ext uri="{FF2B5EF4-FFF2-40B4-BE49-F238E27FC236}">
+                  <a16:creationId xmlns:a16="http://schemas.microsoft.com/office/drawing/2014/main" id="{7896A7BA-08CF-32E6-6836-EBE01A61209D}"/>
+                </a:ext>
+              </a:extLst>
+            </p:cNvPr>
+            <p:cNvSpPr txBox="1"/>
+            <p:nvPr/>
+          </p:nvSpPr>
+          <p:spPr>
+            <a:xfrm>
+              <a:off x="487351" y="-2737564"/>
+              <a:ext cx="1119217" cy="369332"/>
+            </a:xfrm>
+            <a:prstGeom prst="rect">
+              <a:avLst/>
+            </a:prstGeom>
+            <a:noFill/>
+          </p:spPr>
+          <p:txBody>
+            <a:bodyPr wrap="none" rtlCol="0">
+              <a:spAutoFit/>
+            </a:bodyPr>
+            <a:lstStyle/>
+            <a:p>
+              <a:r>
+                <a:rPr lang="en-US" dirty="0">
+                  <a:latin typeface="Gaegu" pitchFamily="2" charset="0"/>
+                </a:rPr>
+                <a:t>The Stack</a:t>
+              </a:r>
+            </a:p>
+          </p:txBody>
+        </p:sp>
+        <p:grpSp>
+          <p:nvGrpSpPr>
+            <p:cNvPr id="52" name="Group 51">
+              <a:extLst>
+                <a:ext uri="{FF2B5EF4-FFF2-40B4-BE49-F238E27FC236}">
+                  <a16:creationId xmlns:a16="http://schemas.microsoft.com/office/drawing/2014/main" id="{31F76148-6180-4659-D4A7-BBA4F34A68D0}"/>
+                </a:ext>
+              </a:extLst>
+            </p:cNvPr>
+            <p:cNvGrpSpPr/>
+            <p:nvPr/>
+          </p:nvGrpSpPr>
+          <p:grpSpPr>
+            <a:xfrm>
+              <a:off x="239330" y="-2710089"/>
+              <a:ext cx="7081019" cy="2798959"/>
+              <a:chOff x="239327" y="257382"/>
+              <a:chExt cx="7081020" cy="7575645"/>
+            </a:xfrm>
+          </p:grpSpPr>
+          <p:cxnSp>
+            <p:nvCxnSpPr>
+              <p:cNvPr id="5" name="Straight Connector 4">
+                <a:extLst>
+                  <a:ext uri="{FF2B5EF4-FFF2-40B4-BE49-F238E27FC236}">
+                    <a16:creationId xmlns:a16="http://schemas.microsoft.com/office/drawing/2014/main" id="{34E695AC-7393-02EF-35F2-A6C76AC72756}"/>
+                  </a:ext>
+                </a:extLst>
+              </p:cNvPr>
+              <p:cNvCxnSpPr>
+                <a:cxnSpLocks/>
+              </p:cNvCxnSpPr>
+              <p:nvPr/>
+            </p:nvCxnSpPr>
+            <p:spPr>
+              <a:xfrm flipH="1">
+                <a:off x="2208417" y="257382"/>
+                <a:ext cx="28004" cy="7575645"/>
+              </a:xfrm>
+              <a:prstGeom prst="line">
+                <a:avLst/>
+              </a:prstGeom>
+              <a:ln w="15875">
+                <a:solidFill>
+                  <a:schemeClr val="tx1">
+                    <a:lumMod val="50000"/>
+                    <a:lumOff val="50000"/>
+                  </a:schemeClr>
+                </a:solidFill>
+                <a:prstDash val="dashDot"/>
+              </a:ln>
+            </p:spPr>
+            <p:style>
+              <a:lnRef idx="1">
+                <a:schemeClr val="accent1"/>
+              </a:lnRef>
+              <a:fillRef idx="0">
+                <a:schemeClr val="accent1"/>
+              </a:fillRef>
+              <a:effectRef idx="0">
+                <a:schemeClr val="accent1"/>
+              </a:effectRef>
+              <a:fontRef idx="minor">
+                <a:schemeClr val="tx1"/>
+              </a:fontRef>
+            </p:style>
+          </p:cxnSp>
+          <p:sp>
+            <p:nvSpPr>
+              <p:cNvPr id="21" name="Rectangle 20">
+                <a:extLst>
+                  <a:ext uri="{FF2B5EF4-FFF2-40B4-BE49-F238E27FC236}">
+                    <a16:creationId xmlns:a16="http://schemas.microsoft.com/office/drawing/2014/main" id="{99972E63-2ADF-1620-345A-182BFBAF91AF}"/>
+                  </a:ext>
+                </a:extLst>
+              </p:cNvPr>
+              <p:cNvSpPr/>
+              <p:nvPr/>
+            </p:nvSpPr>
+            <p:spPr>
+              <a:xfrm>
+                <a:off x="239327" y="257382"/>
+                <a:ext cx="7081020" cy="7575645"/>
+              </a:xfrm>
+              <a:custGeom>
+                <a:avLst/>
+                <a:gdLst>
+                  <a:gd name="connsiteX0" fmla="*/ 0 w 7081020"/>
+                  <a:gd name="connsiteY0" fmla="*/ 0 h 7575645"/>
+                  <a:gd name="connsiteX1" fmla="*/ 572919 w 7081020"/>
+                  <a:gd name="connsiteY1" fmla="*/ 0 h 7575645"/>
+                  <a:gd name="connsiteX2" fmla="*/ 1004217 w 7081020"/>
+                  <a:gd name="connsiteY2" fmla="*/ 0 h 7575645"/>
+                  <a:gd name="connsiteX3" fmla="*/ 1789567 w 7081020"/>
+                  <a:gd name="connsiteY3" fmla="*/ 0 h 7575645"/>
+                  <a:gd name="connsiteX4" fmla="*/ 2362486 w 7081020"/>
+                  <a:gd name="connsiteY4" fmla="*/ 0 h 7575645"/>
+                  <a:gd name="connsiteX5" fmla="*/ 2935405 w 7081020"/>
+                  <a:gd name="connsiteY5" fmla="*/ 0 h 7575645"/>
+                  <a:gd name="connsiteX6" fmla="*/ 3720754 w 7081020"/>
+                  <a:gd name="connsiteY6" fmla="*/ 0 h 7575645"/>
+                  <a:gd name="connsiteX7" fmla="*/ 4222863 w 7081020"/>
+                  <a:gd name="connsiteY7" fmla="*/ 0 h 7575645"/>
+                  <a:gd name="connsiteX8" fmla="*/ 5008212 w 7081020"/>
+                  <a:gd name="connsiteY8" fmla="*/ 0 h 7575645"/>
+                  <a:gd name="connsiteX9" fmla="*/ 5793562 w 7081020"/>
+                  <a:gd name="connsiteY9" fmla="*/ 0 h 7575645"/>
+                  <a:gd name="connsiteX10" fmla="*/ 6437291 w 7081020"/>
+                  <a:gd name="connsiteY10" fmla="*/ 0 h 7575645"/>
+                  <a:gd name="connsiteX11" fmla="*/ 7081020 w 7081020"/>
+                  <a:gd name="connsiteY11" fmla="*/ 0 h 7575645"/>
+                  <a:gd name="connsiteX12" fmla="*/ 7081020 w 7081020"/>
+                  <a:gd name="connsiteY12" fmla="*/ 612939 h 7575645"/>
+                  <a:gd name="connsiteX13" fmla="*/ 7081020 w 7081020"/>
+                  <a:gd name="connsiteY13" fmla="*/ 1074364 h 7575645"/>
+                  <a:gd name="connsiteX14" fmla="*/ 7081020 w 7081020"/>
+                  <a:gd name="connsiteY14" fmla="*/ 1763059 h 7575645"/>
+                  <a:gd name="connsiteX15" fmla="*/ 7081020 w 7081020"/>
+                  <a:gd name="connsiteY15" fmla="*/ 2451754 h 7575645"/>
+                  <a:gd name="connsiteX16" fmla="*/ 7081020 w 7081020"/>
+                  <a:gd name="connsiteY16" fmla="*/ 3140449 h 7575645"/>
+                  <a:gd name="connsiteX17" fmla="*/ 7081020 w 7081020"/>
+                  <a:gd name="connsiteY17" fmla="*/ 3904901 h 7575645"/>
+                  <a:gd name="connsiteX18" fmla="*/ 7081020 w 7081020"/>
+                  <a:gd name="connsiteY18" fmla="*/ 4669352 h 7575645"/>
+                  <a:gd name="connsiteX19" fmla="*/ 7081020 w 7081020"/>
+                  <a:gd name="connsiteY19" fmla="*/ 5433804 h 7575645"/>
+                  <a:gd name="connsiteX20" fmla="*/ 7081020 w 7081020"/>
+                  <a:gd name="connsiteY20" fmla="*/ 5895229 h 7575645"/>
+                  <a:gd name="connsiteX21" fmla="*/ 7081020 w 7081020"/>
+                  <a:gd name="connsiteY21" fmla="*/ 6432411 h 7575645"/>
+                  <a:gd name="connsiteX22" fmla="*/ 7081020 w 7081020"/>
+                  <a:gd name="connsiteY22" fmla="*/ 7575645 h 7575645"/>
+                  <a:gd name="connsiteX23" fmla="*/ 6508101 w 7081020"/>
+                  <a:gd name="connsiteY23" fmla="*/ 7575645 h 7575645"/>
+                  <a:gd name="connsiteX24" fmla="*/ 5864372 w 7081020"/>
+                  <a:gd name="connsiteY24" fmla="*/ 7575645 h 7575645"/>
+                  <a:gd name="connsiteX25" fmla="*/ 5433074 w 7081020"/>
+                  <a:gd name="connsiteY25" fmla="*/ 7575645 h 7575645"/>
+                  <a:gd name="connsiteX26" fmla="*/ 5001775 w 7081020"/>
+                  <a:gd name="connsiteY26" fmla="*/ 7575645 h 7575645"/>
+                  <a:gd name="connsiteX27" fmla="*/ 4358046 w 7081020"/>
+                  <a:gd name="connsiteY27" fmla="*/ 7575645 h 7575645"/>
+                  <a:gd name="connsiteX28" fmla="*/ 3855937 w 7081020"/>
+                  <a:gd name="connsiteY28" fmla="*/ 7575645 h 7575645"/>
+                  <a:gd name="connsiteX29" fmla="*/ 3141398 w 7081020"/>
+                  <a:gd name="connsiteY29" fmla="*/ 7575645 h 7575645"/>
+                  <a:gd name="connsiteX30" fmla="*/ 2639289 w 7081020"/>
+                  <a:gd name="connsiteY30" fmla="*/ 7575645 h 7575645"/>
+                  <a:gd name="connsiteX31" fmla="*/ 1924750 w 7081020"/>
+                  <a:gd name="connsiteY31" fmla="*/ 7575645 h 7575645"/>
+                  <a:gd name="connsiteX32" fmla="*/ 1493451 w 7081020"/>
+                  <a:gd name="connsiteY32" fmla="*/ 7575645 h 7575645"/>
+                  <a:gd name="connsiteX33" fmla="*/ 778912 w 7081020"/>
+                  <a:gd name="connsiteY33" fmla="*/ 7575645 h 7575645"/>
+                  <a:gd name="connsiteX34" fmla="*/ 0 w 7081020"/>
+                  <a:gd name="connsiteY34" fmla="*/ 7575645 h 7575645"/>
+                  <a:gd name="connsiteX35" fmla="*/ 0 w 7081020"/>
+                  <a:gd name="connsiteY35" fmla="*/ 7114219 h 7575645"/>
+                  <a:gd name="connsiteX36" fmla="*/ 0 w 7081020"/>
+                  <a:gd name="connsiteY36" fmla="*/ 6501281 h 7575645"/>
+                  <a:gd name="connsiteX37" fmla="*/ 0 w 7081020"/>
+                  <a:gd name="connsiteY37" fmla="*/ 5661073 h 7575645"/>
+                  <a:gd name="connsiteX38" fmla="*/ 0 w 7081020"/>
+                  <a:gd name="connsiteY38" fmla="*/ 5123891 h 7575645"/>
+                  <a:gd name="connsiteX39" fmla="*/ 0 w 7081020"/>
+                  <a:gd name="connsiteY39" fmla="*/ 4662465 h 7575645"/>
+                  <a:gd name="connsiteX40" fmla="*/ 0 w 7081020"/>
+                  <a:gd name="connsiteY40" fmla="*/ 4201039 h 7575645"/>
+                  <a:gd name="connsiteX41" fmla="*/ 0 w 7081020"/>
+                  <a:gd name="connsiteY41" fmla="*/ 3436588 h 7575645"/>
+                  <a:gd name="connsiteX42" fmla="*/ 0 w 7081020"/>
+                  <a:gd name="connsiteY42" fmla="*/ 2975162 h 7575645"/>
+                  <a:gd name="connsiteX43" fmla="*/ 0 w 7081020"/>
+                  <a:gd name="connsiteY43" fmla="*/ 2286467 h 7575645"/>
+                  <a:gd name="connsiteX44" fmla="*/ 0 w 7081020"/>
+                  <a:gd name="connsiteY44" fmla="*/ 1749285 h 7575645"/>
+                  <a:gd name="connsiteX45" fmla="*/ 0 w 7081020"/>
+                  <a:gd name="connsiteY45" fmla="*/ 1060590 h 7575645"/>
+                  <a:gd name="connsiteX46" fmla="*/ 0 w 7081020"/>
+                  <a:gd name="connsiteY46" fmla="*/ 0 h 7575645"/>
+                </a:gdLst>
+                <a:ahLst/>
+                <a:cxnLst>
+                  <a:cxn ang="0">
+                    <a:pos x="connsiteX0" y="connsiteY0"/>
+                  </a:cxn>
+                  <a:cxn ang="0">
+                    <a:pos x="connsiteX1" y="connsiteY1"/>
+                  </a:cxn>
+                  <a:cxn ang="0">
+                    <a:pos x="connsiteX2" y="connsiteY2"/>
+                  </a:cxn>
+                  <a:cxn ang="0">
+                    <a:pos x="connsiteX3" y="connsiteY3"/>
+                  </a:cxn>
+                  <a:cxn ang="0">
+                    <a:pos x="connsiteX4" y="connsiteY4"/>
+                  </a:cxn>
+                  <a:cxn ang="0">
+                    <a:pos x="connsiteX5" y="connsiteY5"/>
+                  </a:cxn>
+                  <a:cxn ang="0">
+                    <a:pos x="connsiteX6" y="connsiteY6"/>
+                  </a:cxn>
+                  <a:cxn ang="0">
+                    <a:pos x="connsiteX7" y="connsiteY7"/>
+                  </a:cxn>
+                  <a:cxn ang="0">
+                    <a:pos x="connsiteX8" y="connsiteY8"/>
+                  </a:cxn>
+                  <a:cxn ang="0">
+                    <a:pos x="connsiteX9" y="connsiteY9"/>
+                  </a:cxn>
+                  <a:cxn ang="0">
+                    <a:pos x="connsiteX10" y="connsiteY10"/>
+                  </a:cxn>
+                  <a:cxn ang="0">
+                    <a:pos x="connsiteX11" y="connsiteY11"/>
+                  </a:cxn>
+                  <a:cxn ang="0">
+                    <a:pos x="connsiteX12" y="connsiteY12"/>
+                  </a:cxn>
+                  <a:cxn ang="0">
+                    <a:pos x="connsiteX13" y="connsiteY13"/>
+                  </a:cxn>
+                  <a:cxn ang="0">
+                    <a:pos x="connsiteX14" y="connsiteY14"/>
+                  </a:cxn>
+                  <a:cxn ang="0">
+                    <a:pos x="connsiteX15" y="connsiteY15"/>
+                  </a:cxn>
+                  <a:cxn ang="0">
+                    <a:pos x="connsiteX16" y="connsiteY16"/>
+                  </a:cxn>
+                  <a:cxn ang="0">
+                    <a:pos x="connsiteX17" y="connsiteY17"/>
+                  </a:cxn>
+                  <a:cxn ang="0">
+                    <a:pos x="connsiteX18" y="connsiteY18"/>
+                  </a:cxn>
+                  <a:cxn ang="0">
+                    <a:pos x="connsiteX19" y="connsiteY19"/>
+                  </a:cxn>
+                  <a:cxn ang="0">
+                    <a:pos x="connsiteX20" y="connsiteY20"/>
+                  </a:cxn>
+                  <a:cxn ang="0">
+                    <a:pos x="connsiteX21" y="connsiteY21"/>
+                  </a:cxn>
+                  <a:cxn ang="0">
+                    <a:pos x="connsiteX22" y="connsiteY22"/>
+                  </a:cxn>
+                  <a:cxn ang="0">
+                    <a:pos x="connsiteX23" y="connsiteY23"/>
+                  </a:cxn>
+                  <a:cxn ang="0">
+                    <a:pos x="connsiteX24" y="connsiteY24"/>
+                  </a:cxn>
+                  <a:cxn ang="0">
+                    <a:pos x="connsiteX25" y="connsiteY25"/>
+                  </a:cxn>
+                  <a:cxn ang="0">
+                    <a:pos x="connsiteX26" y="connsiteY26"/>
+                  </a:cxn>
+                  <a:cxn ang="0">
+                    <a:pos x="connsiteX27" y="connsiteY27"/>
+                  </a:cxn>
+                  <a:cxn ang="0">
+                    <a:pos x="connsiteX28" y="connsiteY28"/>
+                  </a:cxn>
+                  <a:cxn ang="0">
+                    <a:pos x="connsiteX29" y="connsiteY29"/>
+                  </a:cxn>
+                  <a:cxn ang="0">
+                    <a:pos x="connsiteX30" y="connsiteY30"/>
+                  </a:cxn>
+                  <a:cxn ang="0">
+                    <a:pos x="connsiteX31" y="connsiteY31"/>
+                  </a:cxn>
+                  <a:cxn ang="0">
+                    <a:pos x="connsiteX32" y="connsiteY32"/>
+                  </a:cxn>
+                  <a:cxn ang="0">
+                    <a:pos x="connsiteX33" y="connsiteY33"/>
+                  </a:cxn>
+                  <a:cxn ang="0">
+                    <a:pos x="connsiteX34" y="connsiteY34"/>
+                  </a:cxn>
+                  <a:cxn ang="0">
+                    <a:pos x="connsiteX35" y="connsiteY35"/>
+                  </a:cxn>
+                  <a:cxn ang="0">
+                    <a:pos x="connsiteX36" y="connsiteY36"/>
+                  </a:cxn>
+                  <a:cxn ang="0">
+                    <a:pos x="connsiteX37" y="connsiteY37"/>
+                  </a:cxn>
+                  <a:cxn ang="0">
+                    <a:pos x="connsiteX38" y="connsiteY38"/>
+                  </a:cxn>
+                  <a:cxn ang="0">
+                    <a:pos x="connsiteX39" y="connsiteY39"/>
+                  </a:cxn>
+                  <a:cxn ang="0">
+                    <a:pos x="connsiteX40" y="connsiteY40"/>
+                  </a:cxn>
+                  <a:cxn ang="0">
+                    <a:pos x="connsiteX41" y="connsiteY41"/>
+                  </a:cxn>
+                  <a:cxn ang="0">
+                    <a:pos x="connsiteX42" y="connsiteY42"/>
+                  </a:cxn>
+                  <a:cxn ang="0">
+                    <a:pos x="connsiteX43" y="connsiteY43"/>
+                  </a:cxn>
+                  <a:cxn ang="0">
+                    <a:pos x="connsiteX44" y="connsiteY44"/>
+                  </a:cxn>
+                  <a:cxn ang="0">
+                    <a:pos x="connsiteX45" y="connsiteY45"/>
+                  </a:cxn>
+                  <a:cxn ang="0">
+                    <a:pos x="connsiteX46" y="connsiteY46"/>
+                  </a:cxn>
+                </a:cxnLst>
+                <a:rect l="l" t="t" r="r" b="b"/>
+                <a:pathLst>
+                  <a:path w="7081020" h="7575645" extrusionOk="0">
+                    <a:moveTo>
+                      <a:pt x="0" y="0"/>
+                    </a:moveTo>
+                    <a:cubicBezTo>
+                      <a:pt x="210263" y="22018"/>
+                      <a:pt x="413341" y="21500"/>
+                      <a:pt x="572919" y="0"/>
+                    </a:cubicBezTo>
+                    <a:cubicBezTo>
+                      <a:pt x="732497" y="-21500"/>
+                      <a:pt x="792396" y="690"/>
+                      <a:pt x="1004217" y="0"/>
+                    </a:cubicBezTo>
+                    <a:cubicBezTo>
+                      <a:pt x="1216038" y="-690"/>
+                      <a:pt x="1615716" y="10174"/>
+                      <a:pt x="1789567" y="0"/>
+                    </a:cubicBezTo>
+                    <a:cubicBezTo>
+                      <a:pt x="1963418" y="-10174"/>
+                      <a:pt x="2244829" y="4874"/>
+                      <a:pt x="2362486" y="0"/>
+                    </a:cubicBezTo>
+                    <a:cubicBezTo>
+                      <a:pt x="2480143" y="-4874"/>
+                      <a:pt x="2735114" y="-20363"/>
+                      <a:pt x="2935405" y="0"/>
+                    </a:cubicBezTo>
+                    <a:cubicBezTo>
+                      <a:pt x="3135696" y="20363"/>
+                      <a:pt x="3436871" y="-29544"/>
+                      <a:pt x="3720754" y="0"/>
+                    </a:cubicBezTo>
+                    <a:cubicBezTo>
+                      <a:pt x="4004637" y="29544"/>
+                      <a:pt x="4028634" y="1501"/>
+                      <a:pt x="4222863" y="0"/>
+                    </a:cubicBezTo>
+                    <a:cubicBezTo>
+                      <a:pt x="4417092" y="-1501"/>
+                      <a:pt x="4654536" y="13421"/>
+                      <a:pt x="5008212" y="0"/>
+                    </a:cubicBezTo>
+                    <a:cubicBezTo>
+                      <a:pt x="5361888" y="-13421"/>
+                      <a:pt x="5558134" y="-3460"/>
+                      <a:pt x="5793562" y="0"/>
+                    </a:cubicBezTo>
+                    <a:cubicBezTo>
+                      <a:pt x="6028990" y="3460"/>
+                      <a:pt x="6283140" y="-18066"/>
+                      <a:pt x="6437291" y="0"/>
+                    </a:cubicBezTo>
+                    <a:cubicBezTo>
+                      <a:pt x="6591442" y="18066"/>
+                      <a:pt x="6828068" y="20319"/>
+                      <a:pt x="7081020" y="0"/>
+                    </a:cubicBezTo>
+                    <a:cubicBezTo>
+                      <a:pt x="7089417" y="184368"/>
+                      <a:pt x="7096678" y="373874"/>
+                      <a:pt x="7081020" y="612939"/>
+                    </a:cubicBezTo>
+                    <a:cubicBezTo>
+                      <a:pt x="7065362" y="852004"/>
+                      <a:pt x="7102064" y="892791"/>
+                      <a:pt x="7081020" y="1074364"/>
+                    </a:cubicBezTo>
+                    <a:cubicBezTo>
+                      <a:pt x="7059976" y="1255937"/>
+                      <a:pt x="7062752" y="1490254"/>
+                      <a:pt x="7081020" y="1763059"/>
+                    </a:cubicBezTo>
+                    <a:cubicBezTo>
+                      <a:pt x="7099288" y="2035864"/>
+                      <a:pt x="7081293" y="2145271"/>
+                      <a:pt x="7081020" y="2451754"/>
+                    </a:cubicBezTo>
+                    <a:cubicBezTo>
+                      <a:pt x="7080747" y="2758238"/>
+                      <a:pt x="7058623" y="2830290"/>
+                      <a:pt x="7081020" y="3140449"/>
+                    </a:cubicBezTo>
+                    <a:cubicBezTo>
+                      <a:pt x="7103417" y="3450608"/>
+                      <a:pt x="7052547" y="3524664"/>
+                      <a:pt x="7081020" y="3904901"/>
+                    </a:cubicBezTo>
+                    <a:cubicBezTo>
+                      <a:pt x="7109493" y="4285138"/>
+                      <a:pt x="7110654" y="4312070"/>
+                      <a:pt x="7081020" y="4669352"/>
+                    </a:cubicBezTo>
+                    <a:cubicBezTo>
+                      <a:pt x="7051386" y="5026634"/>
+                      <a:pt x="7112948" y="5124932"/>
+                      <a:pt x="7081020" y="5433804"/>
+                    </a:cubicBezTo>
+                    <a:cubicBezTo>
+                      <a:pt x="7049092" y="5742676"/>
+                      <a:pt x="7095698" y="5713497"/>
+                      <a:pt x="7081020" y="5895229"/>
+                    </a:cubicBezTo>
+                    <a:cubicBezTo>
+                      <a:pt x="7066342" y="6076961"/>
+                      <a:pt x="7079631" y="6193665"/>
+                      <a:pt x="7081020" y="6432411"/>
+                    </a:cubicBezTo>
+                    <a:cubicBezTo>
+                      <a:pt x="7082409" y="6671157"/>
+                      <a:pt x="7044852" y="7023802"/>
+                      <a:pt x="7081020" y="7575645"/>
+                    </a:cubicBezTo>
+                    <a:cubicBezTo>
+                      <a:pt x="6954770" y="7569373"/>
+                      <a:pt x="6779392" y="7557580"/>
+                      <a:pt x="6508101" y="7575645"/>
+                    </a:cubicBezTo>
+                    <a:cubicBezTo>
+                      <a:pt x="6236810" y="7593710"/>
+                      <a:pt x="6026138" y="7592287"/>
+                      <a:pt x="5864372" y="7575645"/>
+                    </a:cubicBezTo>
+                    <a:cubicBezTo>
+                      <a:pt x="5702606" y="7559003"/>
+                      <a:pt x="5551602" y="7596243"/>
+                      <a:pt x="5433074" y="7575645"/>
+                    </a:cubicBezTo>
+                    <a:cubicBezTo>
+                      <a:pt x="5314546" y="7555047"/>
+                      <a:pt x="5146991" y="7576746"/>
+                      <a:pt x="5001775" y="7575645"/>
+                    </a:cubicBezTo>
+                    <a:cubicBezTo>
+                      <a:pt x="4856559" y="7574544"/>
+                      <a:pt x="4630755" y="7573329"/>
+                      <a:pt x="4358046" y="7575645"/>
+                    </a:cubicBezTo>
+                    <a:cubicBezTo>
+                      <a:pt x="4085337" y="7577961"/>
+                      <a:pt x="3967138" y="7589413"/>
+                      <a:pt x="3855937" y="7575645"/>
+                    </a:cubicBezTo>
+                    <a:cubicBezTo>
+                      <a:pt x="3744736" y="7561877"/>
+                      <a:pt x="3452305" y="7579803"/>
+                      <a:pt x="3141398" y="7575645"/>
+                    </a:cubicBezTo>
+                    <a:cubicBezTo>
+                      <a:pt x="2830491" y="7571487"/>
+                      <a:pt x="2779193" y="7570459"/>
+                      <a:pt x="2639289" y="7575645"/>
+                    </a:cubicBezTo>
+                    <a:cubicBezTo>
+                      <a:pt x="2499385" y="7580831"/>
+                      <a:pt x="2173760" y="7540817"/>
+                      <a:pt x="1924750" y="7575645"/>
+                    </a:cubicBezTo>
+                    <a:cubicBezTo>
+                      <a:pt x="1675740" y="7610473"/>
+                      <a:pt x="1667255" y="7580555"/>
+                      <a:pt x="1493451" y="7575645"/>
+                    </a:cubicBezTo>
+                    <a:cubicBezTo>
+                      <a:pt x="1319647" y="7570735"/>
+                      <a:pt x="928836" y="7610082"/>
+                      <a:pt x="778912" y="7575645"/>
+                    </a:cubicBezTo>
+                    <a:cubicBezTo>
+                      <a:pt x="628988" y="7541208"/>
+                      <a:pt x="182251" y="7573999"/>
+                      <a:pt x="0" y="7575645"/>
+                    </a:cubicBezTo>
+                    <a:cubicBezTo>
+                      <a:pt x="15150" y="7404508"/>
+                      <a:pt x="16519" y="7234218"/>
+                      <a:pt x="0" y="7114219"/>
+                    </a:cubicBezTo>
+                    <a:cubicBezTo>
+                      <a:pt x="-16519" y="6994220"/>
+                      <a:pt x="3143" y="6651195"/>
+                      <a:pt x="0" y="6501281"/>
+                    </a:cubicBezTo>
+                    <a:cubicBezTo>
+                      <a:pt x="-3143" y="6351367"/>
+                      <a:pt x="-1130" y="5936226"/>
+                      <a:pt x="0" y="5661073"/>
+                    </a:cubicBezTo>
+                    <a:cubicBezTo>
+                      <a:pt x="1130" y="5385920"/>
+                      <a:pt x="24834" y="5275609"/>
+                      <a:pt x="0" y="5123891"/>
+                    </a:cubicBezTo>
+                    <a:cubicBezTo>
+                      <a:pt x="-24834" y="4972173"/>
+                      <a:pt x="10680" y="4837647"/>
+                      <a:pt x="0" y="4662465"/>
+                    </a:cubicBezTo>
+                    <a:cubicBezTo>
+                      <a:pt x="-10680" y="4487283"/>
+                      <a:pt x="8768" y="4387963"/>
+                      <a:pt x="0" y="4201039"/>
+                    </a:cubicBezTo>
+                    <a:cubicBezTo>
+                      <a:pt x="-8768" y="4014115"/>
+                      <a:pt x="-35882" y="3810863"/>
+                      <a:pt x="0" y="3436588"/>
+                    </a:cubicBezTo>
+                    <a:cubicBezTo>
+                      <a:pt x="35882" y="3062313"/>
+                      <a:pt x="-14742" y="3160854"/>
+                      <a:pt x="0" y="2975162"/>
+                    </a:cubicBezTo>
+                    <a:cubicBezTo>
+                      <a:pt x="14742" y="2789470"/>
+                      <a:pt x="-14294" y="2476161"/>
+                      <a:pt x="0" y="2286467"/>
+                    </a:cubicBezTo>
+                    <a:cubicBezTo>
+                      <a:pt x="14294" y="2096773"/>
+                      <a:pt x="-10436" y="1867438"/>
+                      <a:pt x="0" y="1749285"/>
+                    </a:cubicBezTo>
+                    <a:cubicBezTo>
+                      <a:pt x="10436" y="1631132"/>
+                      <a:pt x="4070" y="1352035"/>
+                      <a:pt x="0" y="1060590"/>
+                    </a:cubicBezTo>
+                    <a:cubicBezTo>
+                      <a:pt x="-4070" y="769145"/>
+                      <a:pt x="-22406" y="255159"/>
+                      <a:pt x="0" y="0"/>
+                    </a:cubicBezTo>
+                    <a:close/>
+                  </a:path>
+                </a:pathLst>
+              </a:custGeom>
+              <a:noFill/>
+              <a:ln w="25400">
+                <a:solidFill>
+                  <a:schemeClr val="tx1"/>
+                </a:solidFill>
+                <a:extLst>
+                  <a:ext uri="{C807C97D-BFC1-408E-A445-0C87EB9F89A2}">
+                    <ask:lineSketchStyleProps xmlns:ask="http://schemas.microsoft.com/office/drawing/2018/sketchyshapes" sd="1219033472">
+                      <a:prstGeom prst="rect">
+                        <a:avLst/>
+                      </a:prstGeom>
+                      <ask:type>
+                        <ask:lineSketchFreehand/>
+                      </ask:type>
+                    </ask:lineSketchStyleProps>
+                  </a:ext>
+                </a:extLst>
+              </a:ln>
+            </p:spPr>
+            <p:style>
+              <a:lnRef idx="2">
+                <a:schemeClr val="accent1">
+                  <a:shade val="15000"/>
+                </a:schemeClr>
+              </a:lnRef>
+              <a:fillRef idx="1">
+                <a:schemeClr val="accent1"/>
+              </a:fillRef>
+              <a:effectRef idx="0">
+                <a:schemeClr val="accent1"/>
+              </a:effectRef>
+              <a:fontRef idx="minor">
+                <a:schemeClr val="lt1"/>
+              </a:fontRef>
+            </p:style>
+            <p:txBody>
+              <a:bodyPr rtlCol="0" anchor="ctr"/>
+              <a:lstStyle/>
+              <a:p>
+                <a:pPr algn="ctr"/>
+                <a:endParaRPr lang="en-US" sz="2229"/>
+              </a:p>
+            </p:txBody>
+          </p:sp>
+        </p:grpSp>
+        <p:grpSp>
+          <p:nvGrpSpPr>
+            <p:cNvPr id="44" name="Group 43">
+              <a:extLst>
+                <a:ext uri="{FF2B5EF4-FFF2-40B4-BE49-F238E27FC236}">
+                  <a16:creationId xmlns:a16="http://schemas.microsoft.com/office/drawing/2014/main" id="{57041239-5E19-1885-DBBA-360623883237}"/>
+                </a:ext>
+              </a:extLst>
+            </p:cNvPr>
+            <p:cNvGrpSpPr/>
+            <p:nvPr/>
+          </p:nvGrpSpPr>
+          <p:grpSpPr>
+            <a:xfrm>
+              <a:off x="3336640" y="180531"/>
+              <a:ext cx="3996218" cy="1532972"/>
+              <a:chOff x="4993885" y="4429523"/>
+              <a:chExt cx="6705679" cy="1876412"/>
+            </a:xfrm>
+          </p:grpSpPr>
+          <p:sp>
+            <p:nvSpPr>
+              <p:cNvPr id="3" name="Rectangle 2">
+                <a:extLst>
+                  <a:ext uri="{FF2B5EF4-FFF2-40B4-BE49-F238E27FC236}">
+                    <a16:creationId xmlns:a16="http://schemas.microsoft.com/office/drawing/2014/main" id="{F87659A1-007A-5A1A-3C43-D31914FA600E}"/>
+                  </a:ext>
+                </a:extLst>
+              </p:cNvPr>
+              <p:cNvSpPr/>
+              <p:nvPr/>
+            </p:nvSpPr>
+            <p:spPr>
+              <a:xfrm>
+                <a:off x="4993886" y="4490436"/>
+                <a:ext cx="6685443" cy="1815499"/>
+              </a:xfrm>
+              <a:custGeom>
+                <a:avLst/>
+                <a:gdLst>
+                  <a:gd name="connsiteX0" fmla="*/ 0 w 6685443"/>
+                  <a:gd name="connsiteY0" fmla="*/ 0 h 1815499"/>
+                  <a:gd name="connsiteX1" fmla="*/ 601690 w 6685443"/>
+                  <a:gd name="connsiteY1" fmla="*/ 0 h 1815499"/>
+                  <a:gd name="connsiteX2" fmla="*/ 1069671 w 6685443"/>
+                  <a:gd name="connsiteY2" fmla="*/ 0 h 1815499"/>
+                  <a:gd name="connsiteX3" fmla="*/ 1871924 w 6685443"/>
+                  <a:gd name="connsiteY3" fmla="*/ 0 h 1815499"/>
+                  <a:gd name="connsiteX4" fmla="*/ 2473614 w 6685443"/>
+                  <a:gd name="connsiteY4" fmla="*/ 0 h 1815499"/>
+                  <a:gd name="connsiteX5" fmla="*/ 3075304 w 6685443"/>
+                  <a:gd name="connsiteY5" fmla="*/ 0 h 1815499"/>
+                  <a:gd name="connsiteX6" fmla="*/ 3877557 w 6685443"/>
+                  <a:gd name="connsiteY6" fmla="*/ 0 h 1815499"/>
+                  <a:gd name="connsiteX7" fmla="*/ 4412392 w 6685443"/>
+                  <a:gd name="connsiteY7" fmla="*/ 0 h 1815499"/>
+                  <a:gd name="connsiteX8" fmla="*/ 5214646 w 6685443"/>
+                  <a:gd name="connsiteY8" fmla="*/ 0 h 1815499"/>
+                  <a:gd name="connsiteX9" fmla="*/ 6016899 w 6685443"/>
+                  <a:gd name="connsiteY9" fmla="*/ 0 h 1815499"/>
+                  <a:gd name="connsiteX10" fmla="*/ 6685443 w 6685443"/>
+                  <a:gd name="connsiteY10" fmla="*/ 0 h 1815499"/>
+                  <a:gd name="connsiteX11" fmla="*/ 6685443 w 6685443"/>
+                  <a:gd name="connsiteY11" fmla="*/ 641476 h 1815499"/>
+                  <a:gd name="connsiteX12" fmla="*/ 6685443 w 6685443"/>
+                  <a:gd name="connsiteY12" fmla="*/ 1264798 h 1815499"/>
+                  <a:gd name="connsiteX13" fmla="*/ 6685443 w 6685443"/>
+                  <a:gd name="connsiteY13" fmla="*/ 1815499 h 1815499"/>
+                  <a:gd name="connsiteX14" fmla="*/ 6016899 w 6685443"/>
+                  <a:gd name="connsiteY14" fmla="*/ 1815499 h 1815499"/>
+                  <a:gd name="connsiteX15" fmla="*/ 5482063 w 6685443"/>
+                  <a:gd name="connsiteY15" fmla="*/ 1815499 h 1815499"/>
+                  <a:gd name="connsiteX16" fmla="*/ 4813519 w 6685443"/>
+                  <a:gd name="connsiteY16" fmla="*/ 1815499 h 1815499"/>
+                  <a:gd name="connsiteX17" fmla="*/ 4011266 w 6685443"/>
+                  <a:gd name="connsiteY17" fmla="*/ 1815499 h 1815499"/>
+                  <a:gd name="connsiteX18" fmla="*/ 3342722 w 6685443"/>
+                  <a:gd name="connsiteY18" fmla="*/ 1815499 h 1815499"/>
+                  <a:gd name="connsiteX19" fmla="*/ 2874740 w 6685443"/>
+                  <a:gd name="connsiteY19" fmla="*/ 1815499 h 1815499"/>
+                  <a:gd name="connsiteX20" fmla="*/ 2339905 w 6685443"/>
+                  <a:gd name="connsiteY20" fmla="*/ 1815499 h 1815499"/>
+                  <a:gd name="connsiteX21" fmla="*/ 1537652 w 6685443"/>
+                  <a:gd name="connsiteY21" fmla="*/ 1815499 h 1815499"/>
+                  <a:gd name="connsiteX22" fmla="*/ 869108 w 6685443"/>
+                  <a:gd name="connsiteY22" fmla="*/ 1815499 h 1815499"/>
+                  <a:gd name="connsiteX23" fmla="*/ 0 w 6685443"/>
+                  <a:gd name="connsiteY23" fmla="*/ 1815499 h 1815499"/>
+                  <a:gd name="connsiteX24" fmla="*/ 0 w 6685443"/>
+                  <a:gd name="connsiteY24" fmla="*/ 1210333 h 1815499"/>
+                  <a:gd name="connsiteX25" fmla="*/ 0 w 6685443"/>
+                  <a:gd name="connsiteY25" fmla="*/ 659631 h 1815499"/>
+                  <a:gd name="connsiteX26" fmla="*/ 0 w 6685443"/>
+                  <a:gd name="connsiteY26" fmla="*/ 0 h 1815499"/>
+                </a:gdLst>
+                <a:ahLst/>
+                <a:cxnLst>
+                  <a:cxn ang="0">
+                    <a:pos x="connsiteX0" y="connsiteY0"/>
+                  </a:cxn>
+                  <a:cxn ang="0">
+                    <a:pos x="connsiteX1" y="connsiteY1"/>
+                  </a:cxn>
+                  <a:cxn ang="0">
+                    <a:pos x="connsiteX2" y="connsiteY2"/>
+                  </a:cxn>
+                  <a:cxn ang="0">
+                    <a:pos x="connsiteX3" y="connsiteY3"/>
+                  </a:cxn>
+                  <a:cxn ang="0">
+                    <a:pos x="connsiteX4" y="connsiteY4"/>
+                  </a:cxn>
+                  <a:cxn ang="0">
+                    <a:pos x="connsiteX5" y="connsiteY5"/>
+                  </a:cxn>
+                  <a:cxn ang="0">
+                    <a:pos x="connsiteX6" y="connsiteY6"/>
+                  </a:cxn>
+                  <a:cxn ang="0">
+                    <a:pos x="connsiteX7" y="connsiteY7"/>
+                  </a:cxn>
+                  <a:cxn ang="0">
+                    <a:pos x="connsiteX8" y="connsiteY8"/>
+                  </a:cxn>
+                  <a:cxn ang="0">
+                    <a:pos x="connsiteX9" y="connsiteY9"/>
+                  </a:cxn>
+                  <a:cxn ang="0">
+                    <a:pos x="connsiteX10" y="connsiteY10"/>
+                  </a:cxn>
+                  <a:cxn ang="0">
+                    <a:pos x="connsiteX11" y="connsiteY11"/>
+                  </a:cxn>
+                  <a:cxn ang="0">
+                    <a:pos x="connsiteX12" y="connsiteY12"/>
+                  </a:cxn>
+                  <a:cxn ang="0">
+                    <a:pos x="connsiteX13" y="connsiteY13"/>
+                  </a:cxn>
+                  <a:cxn ang="0">
+                    <a:pos x="connsiteX14" y="connsiteY14"/>
+                  </a:cxn>
+                  <a:cxn ang="0">
+                    <a:pos x="connsiteX15" y="connsiteY15"/>
+                  </a:cxn>
+                  <a:cxn ang="0">
+                    <a:pos x="connsiteX16" y="connsiteY16"/>
+                  </a:cxn>
+                  <a:cxn ang="0">
+                    <a:pos x="connsiteX17" y="connsiteY17"/>
+                  </a:cxn>
+                  <a:cxn ang="0">
+                    <a:pos x="connsiteX18" y="connsiteY18"/>
+                  </a:cxn>
+                  <a:cxn ang="0">
+                    <a:pos x="connsiteX19" y="connsiteY19"/>
+                  </a:cxn>
+                  <a:cxn ang="0">
+                    <a:pos x="connsiteX20" y="connsiteY20"/>
+                  </a:cxn>
+                  <a:cxn ang="0">
+                    <a:pos x="connsiteX21" y="connsiteY21"/>
+                  </a:cxn>
+                  <a:cxn ang="0">
+                    <a:pos x="connsiteX22" y="connsiteY22"/>
+                  </a:cxn>
+                  <a:cxn ang="0">
+                    <a:pos x="connsiteX23" y="connsiteY23"/>
+                  </a:cxn>
+                  <a:cxn ang="0">
+                    <a:pos x="connsiteX24" y="connsiteY24"/>
+                  </a:cxn>
+                  <a:cxn ang="0">
+                    <a:pos x="connsiteX25" y="connsiteY25"/>
+                  </a:cxn>
+                  <a:cxn ang="0">
+                    <a:pos x="connsiteX26" y="connsiteY26"/>
+                  </a:cxn>
+                </a:cxnLst>
+                <a:rect l="l" t="t" r="r" b="b"/>
+                <a:pathLst>
+                  <a:path w="6685443" h="1815499" extrusionOk="0">
+                    <a:moveTo>
+                      <a:pt x="0" y="0"/>
+                    </a:moveTo>
+                    <a:cubicBezTo>
+                      <a:pt x="197687" y="5421"/>
+                      <a:pt x="392637" y="-27165"/>
+                      <a:pt x="601690" y="0"/>
+                    </a:cubicBezTo>
+                    <a:cubicBezTo>
+                      <a:pt x="810743" y="27165"/>
+                      <a:pt x="967174" y="20034"/>
+                      <a:pt x="1069671" y="0"/>
+                    </a:cubicBezTo>
+                    <a:cubicBezTo>
+                      <a:pt x="1172168" y="-20034"/>
+                      <a:pt x="1481114" y="26288"/>
+                      <a:pt x="1871924" y="0"/>
+                    </a:cubicBezTo>
+                    <a:cubicBezTo>
+                      <a:pt x="2262734" y="-26288"/>
+                      <a:pt x="2275646" y="9816"/>
+                      <a:pt x="2473614" y="0"/>
+                    </a:cubicBezTo>
+                    <a:cubicBezTo>
+                      <a:pt x="2671582" y="-9816"/>
+                      <a:pt x="2837715" y="-16866"/>
+                      <a:pt x="3075304" y="0"/>
+                    </a:cubicBezTo>
+                    <a:cubicBezTo>
+                      <a:pt x="3312893" y="16866"/>
+                      <a:pt x="3565082" y="13656"/>
+                      <a:pt x="3877557" y="0"/>
+                    </a:cubicBezTo>
+                    <a:cubicBezTo>
+                      <a:pt x="4190032" y="-13656"/>
+                      <a:pt x="4275680" y="23045"/>
+                      <a:pt x="4412392" y="0"/>
+                    </a:cubicBezTo>
+                    <a:cubicBezTo>
+                      <a:pt x="4549105" y="-23045"/>
+                      <a:pt x="4974381" y="13533"/>
+                      <a:pt x="5214646" y="0"/>
+                    </a:cubicBezTo>
+                    <a:cubicBezTo>
+                      <a:pt x="5454911" y="-13533"/>
+                      <a:pt x="5621382" y="6072"/>
+                      <a:pt x="6016899" y="0"/>
+                    </a:cubicBezTo>
+                    <a:cubicBezTo>
+                      <a:pt x="6412416" y="-6072"/>
+                      <a:pt x="6368099" y="-22480"/>
+                      <a:pt x="6685443" y="0"/>
+                    </a:cubicBezTo>
+                    <a:cubicBezTo>
+                      <a:pt x="6675060" y="141143"/>
+                      <a:pt x="6688790" y="422707"/>
+                      <a:pt x="6685443" y="641476"/>
+                    </a:cubicBezTo>
+                    <a:cubicBezTo>
+                      <a:pt x="6682096" y="860245"/>
+                      <a:pt x="6676921" y="1110529"/>
+                      <a:pt x="6685443" y="1264798"/>
+                    </a:cubicBezTo>
+                    <a:cubicBezTo>
+                      <a:pt x="6693965" y="1419067"/>
+                      <a:pt x="6712438" y="1626237"/>
+                      <a:pt x="6685443" y="1815499"/>
+                    </a:cubicBezTo>
+                    <a:cubicBezTo>
+                      <a:pt x="6531485" y="1826631"/>
+                      <a:pt x="6258288" y="1826162"/>
+                      <a:pt x="6016899" y="1815499"/>
+                    </a:cubicBezTo>
+                    <a:cubicBezTo>
+                      <a:pt x="5775510" y="1804836"/>
+                      <a:pt x="5635687" y="1808580"/>
+                      <a:pt x="5482063" y="1815499"/>
+                    </a:cubicBezTo>
+                    <a:cubicBezTo>
+                      <a:pt x="5328439" y="1822418"/>
+                      <a:pt x="4969533" y="1798322"/>
+                      <a:pt x="4813519" y="1815499"/>
+                    </a:cubicBezTo>
+                    <a:cubicBezTo>
+                      <a:pt x="4657505" y="1832676"/>
+                      <a:pt x="4277484" y="1797792"/>
+                      <a:pt x="4011266" y="1815499"/>
+                    </a:cubicBezTo>
+                    <a:cubicBezTo>
+                      <a:pt x="3745048" y="1833206"/>
+                      <a:pt x="3503887" y="1798854"/>
+                      <a:pt x="3342722" y="1815499"/>
+                    </a:cubicBezTo>
+                    <a:cubicBezTo>
+                      <a:pt x="3181557" y="1832144"/>
+                      <a:pt x="3094655" y="1808958"/>
+                      <a:pt x="2874740" y="1815499"/>
+                    </a:cubicBezTo>
+                    <a:cubicBezTo>
+                      <a:pt x="2654825" y="1822040"/>
+                      <a:pt x="2552356" y="1810430"/>
+                      <a:pt x="2339905" y="1815499"/>
+                    </a:cubicBezTo>
+                    <a:cubicBezTo>
+                      <a:pt x="2127454" y="1820568"/>
+                      <a:pt x="1825409" y="1807327"/>
+                      <a:pt x="1537652" y="1815499"/>
+                    </a:cubicBezTo>
+                    <a:cubicBezTo>
+                      <a:pt x="1249895" y="1823671"/>
+                      <a:pt x="1086879" y="1834794"/>
+                      <a:pt x="869108" y="1815499"/>
+                    </a:cubicBezTo>
+                    <a:cubicBezTo>
+                      <a:pt x="651337" y="1796204"/>
+                      <a:pt x="264417" y="1828267"/>
+                      <a:pt x="0" y="1815499"/>
+                    </a:cubicBezTo>
+                    <a:cubicBezTo>
+                      <a:pt x="8313" y="1520428"/>
+                      <a:pt x="-1936" y="1449694"/>
+                      <a:pt x="0" y="1210333"/>
+                    </a:cubicBezTo>
+                    <a:cubicBezTo>
+                      <a:pt x="1936" y="970972"/>
+                      <a:pt x="16209" y="905402"/>
+                      <a:pt x="0" y="659631"/>
+                    </a:cubicBezTo>
+                    <a:cubicBezTo>
+                      <a:pt x="-16209" y="413860"/>
+                      <a:pt x="-15680" y="309233"/>
+                      <a:pt x="0" y="0"/>
+                    </a:cubicBezTo>
+                    <a:close/>
+                  </a:path>
+                </a:pathLst>
+              </a:custGeom>
+              <a:noFill/>
+              <a:ln w="25400">
+                <a:solidFill>
+                  <a:schemeClr val="tx1"/>
+                </a:solidFill>
+                <a:extLst>
+                  <a:ext uri="{C807C97D-BFC1-408E-A445-0C87EB9F89A2}">
+                    <ask:lineSketchStyleProps xmlns:ask="http://schemas.microsoft.com/office/drawing/2018/sketchyshapes" sd="1219033472">
+                      <a:prstGeom prst="rect">
+                        <a:avLst/>
+                      </a:prstGeom>
+                      <ask:type>
+                        <ask:lineSketchFreehand/>
+                      </ask:type>
+                    </ask:lineSketchStyleProps>
+                  </a:ext>
+                </a:extLst>
+              </a:ln>
+            </p:spPr>
+            <p:style>
+              <a:lnRef idx="2">
+                <a:schemeClr val="accent1">
+                  <a:shade val="15000"/>
+                </a:schemeClr>
+              </a:lnRef>
+              <a:fillRef idx="1">
+                <a:schemeClr val="accent1"/>
+              </a:fillRef>
+              <a:effectRef idx="0">
+                <a:schemeClr val="accent1"/>
+              </a:effectRef>
+              <a:fontRef idx="minor">
+                <a:schemeClr val="lt1"/>
+              </a:fontRef>
+            </p:style>
+            <p:txBody>
+              <a:bodyPr rtlCol="0" anchor="ctr"/>
+              <a:lstStyle/>
+              <a:p>
+                <a:pPr algn="ctr"/>
+                <a:endParaRPr lang="en-US" sz="2229">
+                  <a:solidFill>
+                    <a:schemeClr val="tx1"/>
+                  </a:solidFill>
+                </a:endParaRPr>
+              </a:p>
+            </p:txBody>
+          </p:sp>
+          <p:cxnSp>
+            <p:nvCxnSpPr>
+              <p:cNvPr id="26" name="Straight Connector 25">
+                <a:extLst>
+                  <a:ext uri="{FF2B5EF4-FFF2-40B4-BE49-F238E27FC236}">
+                    <a16:creationId xmlns:a16="http://schemas.microsoft.com/office/drawing/2014/main" id="{D66AC27D-B429-2C64-1CB1-4E16FBF1C232}"/>
+                  </a:ext>
+                </a:extLst>
+              </p:cNvPr>
+              <p:cNvCxnSpPr>
+                <a:cxnSpLocks/>
+              </p:cNvCxnSpPr>
+              <p:nvPr/>
+            </p:nvCxnSpPr>
+            <p:spPr>
+              <a:xfrm flipH="1">
+                <a:off x="4993885" y="4799489"/>
+                <a:ext cx="6705679" cy="17685"/>
+              </a:xfrm>
+              <a:prstGeom prst="line">
+                <a:avLst/>
+              </a:prstGeom>
+              <a:ln w="25400">
+                <a:solidFill>
+                  <a:schemeClr val="tx1"/>
+                </a:solidFill>
+              </a:ln>
+            </p:spPr>
+            <p:style>
+              <a:lnRef idx="1">
+                <a:schemeClr val="accent1"/>
+              </a:lnRef>
+              <a:fillRef idx="0">
+                <a:schemeClr val="accent1"/>
+              </a:fillRef>
+              <a:effectRef idx="0">
+                <a:schemeClr val="accent1"/>
+              </a:effectRef>
+              <a:fontRef idx="minor">
+                <a:schemeClr val="tx1"/>
+              </a:fontRef>
+            </p:style>
+          </p:cxnSp>
+          <p:sp>
+            <p:nvSpPr>
+              <p:cNvPr id="31" name="TextBox 30">
+                <a:extLst>
+                  <a:ext uri="{FF2B5EF4-FFF2-40B4-BE49-F238E27FC236}">
+                    <a16:creationId xmlns:a16="http://schemas.microsoft.com/office/drawing/2014/main" id="{A3B4A587-7240-6AD2-F254-3221EEE6D709}"/>
+                  </a:ext>
+                </a:extLst>
+              </p:cNvPr>
+              <p:cNvSpPr txBox="1"/>
+              <p:nvPr/>
+            </p:nvSpPr>
+            <p:spPr>
+              <a:xfrm>
+                <a:off x="5830910" y="4429523"/>
+                <a:ext cx="1689764" cy="452075"/>
+              </a:xfrm>
+              <a:prstGeom prst="rect">
+                <a:avLst/>
+              </a:prstGeom>
+              <a:noFill/>
+            </p:spPr>
+            <p:txBody>
+              <a:bodyPr wrap="none" rtlCol="0">
+                <a:spAutoFit/>
+              </a:bodyPr>
+              <a:lstStyle/>
+              <a:p>
+                <a:r>
+                  <a:rPr lang="en-US" dirty="0">
+                    <a:latin typeface="Gaegu" pitchFamily="2" charset="0"/>
+                  </a:rPr>
+                  <a:t>Terminal</a:t>
+                </a:r>
+              </a:p>
+            </p:txBody>
+          </p:sp>
+        </p:grpSp>
+        <p:sp>
+          <p:nvSpPr>
+            <p:cNvPr id="58" name="Rectangle 57">
+              <a:extLst>
+                <a:ext uri="{FF2B5EF4-FFF2-40B4-BE49-F238E27FC236}">
+                  <a16:creationId xmlns:a16="http://schemas.microsoft.com/office/drawing/2014/main" id="{185C1771-9148-68B9-A280-04E3AC16818D}"/>
+                </a:ext>
+              </a:extLst>
+            </p:cNvPr>
+            <p:cNvSpPr/>
+            <p:nvPr/>
+          </p:nvSpPr>
+          <p:spPr>
+            <a:xfrm>
+              <a:off x="1949880" y="721827"/>
+              <a:ext cx="286544" cy="35418"/>
+            </a:xfrm>
+            <a:prstGeom prst="rect">
+              <a:avLst/>
+            </a:prstGeom>
+            <a:noFill/>
+            <a:ln>
+              <a:noFill/>
+            </a:ln>
+          </p:spPr>
+          <p:style>
+            <a:lnRef idx="2">
+              <a:schemeClr val="accent1">
+                <a:shade val="15000"/>
+              </a:schemeClr>
+            </a:lnRef>
+            <a:fillRef idx="1">
+              <a:schemeClr val="accent1"/>
+            </a:fillRef>
+            <a:effectRef idx="0">
+              <a:schemeClr val="accent1"/>
+            </a:effectRef>
+            <a:fontRef idx="minor">
+              <a:schemeClr val="lt1"/>
+            </a:fontRef>
+          </p:style>
+          <p:txBody>
+            <a:bodyPr rtlCol="0" anchor="ctr"/>
+            <a:lstStyle/>
+            <a:p>
+              <a:pPr algn="ctr"/>
+              <a:endParaRPr lang="en-US"/>
+            </a:p>
+          </p:txBody>
+        </p:sp>
+        <p:grpSp>
+          <p:nvGrpSpPr>
+            <p:cNvPr id="14" name="Group 13">
+              <a:extLst>
+                <a:ext uri="{FF2B5EF4-FFF2-40B4-BE49-F238E27FC236}">
+                  <a16:creationId xmlns:a16="http://schemas.microsoft.com/office/drawing/2014/main" id="{CF99B1D7-71EB-E496-288D-D8E0582D3C14}"/>
+                </a:ext>
+              </a:extLst>
+            </p:cNvPr>
+            <p:cNvGrpSpPr/>
+            <p:nvPr/>
+          </p:nvGrpSpPr>
+          <p:grpSpPr>
+            <a:xfrm>
+              <a:off x="540489" y="274648"/>
+              <a:ext cx="1721392" cy="523220"/>
+              <a:chOff x="-130005" y="3475016"/>
+              <a:chExt cx="1721392" cy="523221"/>
+            </a:xfrm>
+          </p:grpSpPr>
+          <p:sp>
+            <p:nvSpPr>
+              <p:cNvPr id="15" name="TextBox 14">
+                <a:extLst>
+                  <a:ext uri="{FF2B5EF4-FFF2-40B4-BE49-F238E27FC236}">
+                    <a16:creationId xmlns:a16="http://schemas.microsoft.com/office/drawing/2014/main" id="{1F26C3E5-5F49-EEF2-7A70-013C462FCF7D}"/>
+                  </a:ext>
+                </a:extLst>
+              </p:cNvPr>
+              <p:cNvSpPr txBox="1"/>
+              <p:nvPr/>
+            </p:nvSpPr>
+            <p:spPr>
+              <a:xfrm>
+                <a:off x="-130005" y="3475016"/>
+                <a:ext cx="804900" cy="523221"/>
+              </a:xfrm>
+              <a:prstGeom prst="rect">
+                <a:avLst/>
+              </a:prstGeom>
+              <a:noFill/>
+            </p:spPr>
+            <p:txBody>
+              <a:bodyPr wrap="none" rtlCol="0">
+                <a:spAutoFit/>
+              </a:bodyPr>
+              <a:lstStyle/>
+              <a:p>
+                <a:r>
+                  <a:rPr lang="en-US" sz="1400" dirty="0">
+                    <a:solidFill>
+                      <a:schemeClr val="bg1">
+                        <a:lumMod val="65000"/>
+                      </a:schemeClr>
+                    </a:solidFill>
+                  </a:rPr>
+                  <a:t>Program</a:t>
+                </a:r>
+              </a:p>
+              <a:p>
+                <a:r>
+                  <a:rPr lang="en-US" sz="1400" dirty="0">
+                    <a:solidFill>
+                      <a:schemeClr val="bg1">
+                        <a:lumMod val="65000"/>
+                      </a:schemeClr>
+                    </a:solidFill>
+                  </a:rPr>
+                  <a:t>Counter</a:t>
+                </a:r>
+              </a:p>
+            </p:txBody>
+          </p:sp>
+          <p:sp>
+            <p:nvSpPr>
+              <p:cNvPr id="17" name="Rectangle 16">
+                <a:extLst>
+                  <a:ext uri="{FF2B5EF4-FFF2-40B4-BE49-F238E27FC236}">
+                    <a16:creationId xmlns:a16="http://schemas.microsoft.com/office/drawing/2014/main" id="{EB0EE411-0245-D51A-35B4-5FF329DF6E34}"/>
+                  </a:ext>
+                </a:extLst>
+              </p:cNvPr>
+              <p:cNvSpPr/>
+              <p:nvPr/>
+            </p:nvSpPr>
+            <p:spPr>
+              <a:xfrm>
+                <a:off x="737093" y="3620838"/>
+                <a:ext cx="854294" cy="307777"/>
+              </a:xfrm>
+              <a:custGeom>
+                <a:avLst/>
+                <a:gdLst>
+                  <a:gd name="connsiteX0" fmla="*/ 0 w 854294"/>
+                  <a:gd name="connsiteY0" fmla="*/ 0 h 307777"/>
+                  <a:gd name="connsiteX1" fmla="*/ 418604 w 854294"/>
+                  <a:gd name="connsiteY1" fmla="*/ 0 h 307777"/>
+                  <a:gd name="connsiteX2" fmla="*/ 854294 w 854294"/>
+                  <a:gd name="connsiteY2" fmla="*/ 0 h 307777"/>
+                  <a:gd name="connsiteX3" fmla="*/ 854294 w 854294"/>
+                  <a:gd name="connsiteY3" fmla="*/ 307777 h 307777"/>
+                  <a:gd name="connsiteX4" fmla="*/ 427147 w 854294"/>
+                  <a:gd name="connsiteY4" fmla="*/ 307777 h 307777"/>
+                  <a:gd name="connsiteX5" fmla="*/ 0 w 854294"/>
+                  <a:gd name="connsiteY5" fmla="*/ 307777 h 307777"/>
+                  <a:gd name="connsiteX6" fmla="*/ 0 w 854294"/>
+                  <a:gd name="connsiteY6" fmla="*/ 0 h 307777"/>
+                </a:gdLst>
+                <a:ahLst/>
+                <a:cxnLst>
+                  <a:cxn ang="0">
+                    <a:pos x="connsiteX0" y="connsiteY0"/>
+                  </a:cxn>
+                  <a:cxn ang="0">
+                    <a:pos x="connsiteX1" y="connsiteY1"/>
+                  </a:cxn>
+                  <a:cxn ang="0">
+                    <a:pos x="connsiteX2" y="connsiteY2"/>
+                  </a:cxn>
+                  <a:cxn ang="0">
+                    <a:pos x="connsiteX3" y="connsiteY3"/>
+                  </a:cxn>
+                  <a:cxn ang="0">
+                    <a:pos x="connsiteX4" y="connsiteY4"/>
+                  </a:cxn>
+                  <a:cxn ang="0">
+                    <a:pos x="connsiteX5" y="connsiteY5"/>
+                  </a:cxn>
+                  <a:cxn ang="0">
+                    <a:pos x="connsiteX6" y="connsiteY6"/>
+                  </a:cxn>
+                </a:cxnLst>
+                <a:rect l="l" t="t" r="r" b="b"/>
+                <a:pathLst>
+                  <a:path w="854294" h="307777" extrusionOk="0">
+                    <a:moveTo>
+                      <a:pt x="0" y="0"/>
+                    </a:moveTo>
+                    <a:cubicBezTo>
+                      <a:pt x="173209" y="4046"/>
+                      <a:pt x="303085" y="10214"/>
+                      <a:pt x="418604" y="0"/>
+                    </a:cubicBezTo>
+                    <a:cubicBezTo>
+                      <a:pt x="534123" y="-10214"/>
+                      <a:pt x="722488" y="-9036"/>
+                      <a:pt x="854294" y="0"/>
+                    </a:cubicBezTo>
+                    <a:cubicBezTo>
+                      <a:pt x="843460" y="62246"/>
+                      <a:pt x="843276" y="219189"/>
+                      <a:pt x="854294" y="307777"/>
+                    </a:cubicBezTo>
+                    <a:cubicBezTo>
+                      <a:pt x="762963" y="302806"/>
+                      <a:pt x="592541" y="323160"/>
+                      <a:pt x="427147" y="307777"/>
+                    </a:cubicBezTo>
+                    <a:cubicBezTo>
+                      <a:pt x="261753" y="292394"/>
+                      <a:pt x="133192" y="320592"/>
+                      <a:pt x="0" y="307777"/>
+                    </a:cubicBezTo>
+                    <a:cubicBezTo>
+                      <a:pt x="9866" y="171271"/>
+                      <a:pt x="-8953" y="65853"/>
+                      <a:pt x="0" y="0"/>
+                    </a:cubicBezTo>
+                    <a:close/>
+                  </a:path>
+                </a:pathLst>
+              </a:custGeom>
+              <a:noFill/>
+              <a:ln w="25400">
+                <a:solidFill>
+                  <a:schemeClr val="bg1">
+                    <a:lumMod val="65000"/>
+                  </a:schemeClr>
+                </a:solidFill>
+                <a:extLst>
+                  <a:ext uri="{C807C97D-BFC1-408E-A445-0C87EB9F89A2}">
+                    <ask:lineSketchStyleProps xmlns:ask="http://schemas.microsoft.com/office/drawing/2018/sketchyshapes" sd="1219033472">
+                      <a:prstGeom prst="rect">
+                        <a:avLst/>
+                      </a:prstGeom>
+                      <ask:type>
+                        <ask:lineSketchFreehand/>
+                      </ask:type>
+                    </ask:lineSketchStyleProps>
+                  </a:ext>
+                </a:extLst>
+              </a:ln>
+            </p:spPr>
+            <p:style>
+              <a:lnRef idx="2">
+                <a:schemeClr val="accent1">
+                  <a:shade val="15000"/>
+                </a:schemeClr>
+              </a:lnRef>
+              <a:fillRef idx="1">
+                <a:schemeClr val="accent1"/>
+              </a:fillRef>
+              <a:effectRef idx="0">
+                <a:schemeClr val="accent1"/>
+              </a:effectRef>
+              <a:fontRef idx="minor">
+                <a:schemeClr val="lt1"/>
+              </a:fontRef>
+            </p:style>
+            <p:txBody>
+              <a:bodyPr rtlCol="0" anchor="ctr"/>
+              <a:lstStyle/>
+              <a:p>
+                <a:pPr algn="ctr"/>
+                <a:endParaRPr lang="en-US">
+                  <a:solidFill>
+                    <a:schemeClr val="tx1"/>
+                  </a:solidFill>
+                </a:endParaRPr>
+              </a:p>
+            </p:txBody>
+          </p:sp>
+        </p:grpSp>
+        <p:sp>
+          <p:nvSpPr>
+            <p:cNvPr id="19" name="TextBox 18">
+              <a:extLst>
+                <a:ext uri="{FF2B5EF4-FFF2-40B4-BE49-F238E27FC236}">
+                  <a16:creationId xmlns:a16="http://schemas.microsoft.com/office/drawing/2014/main" id="{8256C8B2-FAA4-4876-FCF6-6BCE539AF519}"/>
+                </a:ext>
+              </a:extLst>
+            </p:cNvPr>
+            <p:cNvSpPr txBox="1"/>
+            <p:nvPr/>
+          </p:nvSpPr>
+          <p:spPr>
+            <a:xfrm>
+              <a:off x="1387767" y="385491"/>
+              <a:ext cx="854294" cy="369332"/>
+            </a:xfrm>
+            <a:prstGeom prst="rect">
+              <a:avLst/>
+            </a:prstGeom>
+            <a:noFill/>
+          </p:spPr>
+          <p:txBody>
+            <a:bodyPr wrap="square" rtlCol="0">
+              <a:spAutoFit/>
+            </a:bodyPr>
+            <a:lstStyle/>
+            <a:p>
+              <a:pPr algn="ctr"/>
+              <a:r>
+                <a:rPr lang="en-US" dirty="0">
+                  <a:solidFill>
+                    <a:schemeClr val="bg1">
+                      <a:lumMod val="65000"/>
+                    </a:schemeClr>
+                  </a:solidFill>
+                </a:rPr>
+                <a:t>END</a:t>
+              </a:r>
+            </a:p>
+          </p:txBody>
+        </p:sp>
+        <p:sp>
+          <p:nvSpPr>
+            <p:cNvPr id="38" name="Rectangle 37">
+              <a:extLst>
+                <a:ext uri="{FF2B5EF4-FFF2-40B4-BE49-F238E27FC236}">
+                  <a16:creationId xmlns:a16="http://schemas.microsoft.com/office/drawing/2014/main" id="{A6064B66-0AE2-BB50-3D9F-9AC965129215}"/>
+                </a:ext>
+              </a:extLst>
+            </p:cNvPr>
+            <p:cNvSpPr/>
+            <p:nvPr/>
+          </p:nvSpPr>
+          <p:spPr>
+            <a:xfrm>
+              <a:off x="243333" y="251717"/>
+              <a:ext cx="3005859" cy="1461786"/>
+            </a:xfrm>
+            <a:custGeom>
+              <a:avLst/>
+              <a:gdLst>
+                <a:gd name="connsiteX0" fmla="*/ 0 w 3005859"/>
+                <a:gd name="connsiteY0" fmla="*/ 0 h 1461786"/>
+                <a:gd name="connsiteX1" fmla="*/ 571113 w 3005859"/>
+                <a:gd name="connsiteY1" fmla="*/ 0 h 1461786"/>
+                <a:gd name="connsiteX2" fmla="*/ 1082109 w 3005859"/>
+                <a:gd name="connsiteY2" fmla="*/ 0 h 1461786"/>
+                <a:gd name="connsiteX3" fmla="*/ 1743398 w 3005859"/>
+                <a:gd name="connsiteY3" fmla="*/ 0 h 1461786"/>
+                <a:gd name="connsiteX4" fmla="*/ 2314511 w 3005859"/>
+                <a:gd name="connsiteY4" fmla="*/ 0 h 1461786"/>
+                <a:gd name="connsiteX5" fmla="*/ 3005859 w 3005859"/>
+                <a:gd name="connsiteY5" fmla="*/ 0 h 1461786"/>
+                <a:gd name="connsiteX6" fmla="*/ 3005859 w 3005859"/>
+                <a:gd name="connsiteY6" fmla="*/ 516498 h 1461786"/>
+                <a:gd name="connsiteX7" fmla="*/ 3005859 w 3005859"/>
+                <a:gd name="connsiteY7" fmla="*/ 1003760 h 1461786"/>
+                <a:gd name="connsiteX8" fmla="*/ 3005859 w 3005859"/>
+                <a:gd name="connsiteY8" fmla="*/ 1461786 h 1461786"/>
+                <a:gd name="connsiteX9" fmla="*/ 2464804 w 3005859"/>
+                <a:gd name="connsiteY9" fmla="*/ 1461786 h 1461786"/>
+                <a:gd name="connsiteX10" fmla="*/ 1863633 w 3005859"/>
+                <a:gd name="connsiteY10" fmla="*/ 1461786 h 1461786"/>
+                <a:gd name="connsiteX11" fmla="*/ 1262461 w 3005859"/>
+                <a:gd name="connsiteY11" fmla="*/ 1461786 h 1461786"/>
+                <a:gd name="connsiteX12" fmla="*/ 691348 w 3005859"/>
+                <a:gd name="connsiteY12" fmla="*/ 1461786 h 1461786"/>
+                <a:gd name="connsiteX13" fmla="*/ 0 w 3005859"/>
+                <a:gd name="connsiteY13" fmla="*/ 1461786 h 1461786"/>
+                <a:gd name="connsiteX14" fmla="*/ 0 w 3005859"/>
+                <a:gd name="connsiteY14" fmla="*/ 945288 h 1461786"/>
+                <a:gd name="connsiteX15" fmla="*/ 0 w 3005859"/>
+                <a:gd name="connsiteY15" fmla="*/ 428791 h 1461786"/>
+                <a:gd name="connsiteX16" fmla="*/ 0 w 3005859"/>
+                <a:gd name="connsiteY16" fmla="*/ 0 h 1461786"/>
+              </a:gdLst>
+              <a:ahLst/>
+              <a:cxnLst>
+                <a:cxn ang="0">
+                  <a:pos x="connsiteX0" y="connsiteY0"/>
+                </a:cxn>
+                <a:cxn ang="0">
+                  <a:pos x="connsiteX1" y="connsiteY1"/>
+                </a:cxn>
+                <a:cxn ang="0">
+                  <a:pos x="connsiteX2" y="connsiteY2"/>
+                </a:cxn>
+                <a:cxn ang="0">
+                  <a:pos x="connsiteX3" y="connsiteY3"/>
+                </a:cxn>
+                <a:cxn ang="0">
+                  <a:pos x="connsiteX4" y="connsiteY4"/>
+                </a:cxn>
+                <a:cxn ang="0">
+                  <a:pos x="connsiteX5" y="connsiteY5"/>
+                </a:cxn>
+                <a:cxn ang="0">
+                  <a:pos x="connsiteX6" y="connsiteY6"/>
+                </a:cxn>
+                <a:cxn ang="0">
+                  <a:pos x="connsiteX7" y="connsiteY7"/>
+                </a:cxn>
+                <a:cxn ang="0">
+                  <a:pos x="connsiteX8" y="connsiteY8"/>
+                </a:cxn>
+                <a:cxn ang="0">
+                  <a:pos x="connsiteX9" y="connsiteY9"/>
+                </a:cxn>
+                <a:cxn ang="0">
+                  <a:pos x="connsiteX10" y="connsiteY10"/>
+                </a:cxn>
+                <a:cxn ang="0">
+                  <a:pos x="connsiteX11" y="connsiteY11"/>
+                </a:cxn>
+                <a:cxn ang="0">
+                  <a:pos x="connsiteX12" y="connsiteY12"/>
+                </a:cxn>
+                <a:cxn ang="0">
+                  <a:pos x="connsiteX13" y="connsiteY13"/>
+                </a:cxn>
+                <a:cxn ang="0">
+                  <a:pos x="connsiteX14" y="connsiteY14"/>
+                </a:cxn>
+                <a:cxn ang="0">
+                  <a:pos x="connsiteX15" y="connsiteY15"/>
+                </a:cxn>
+                <a:cxn ang="0">
+                  <a:pos x="connsiteX16" y="connsiteY16"/>
+                </a:cxn>
+              </a:cxnLst>
+              <a:rect l="l" t="t" r="r" b="b"/>
+              <a:pathLst>
+                <a:path w="3005859" h="1461786" extrusionOk="0">
+                  <a:moveTo>
+                    <a:pt x="0" y="0"/>
+                  </a:moveTo>
+                  <a:cubicBezTo>
+                    <a:pt x="202126" y="629"/>
+                    <a:pt x="373438" y="-24313"/>
+                    <a:pt x="571113" y="0"/>
+                  </a:cubicBezTo>
+                  <a:cubicBezTo>
+                    <a:pt x="768788" y="24313"/>
+                    <a:pt x="943630" y="5247"/>
+                    <a:pt x="1082109" y="0"/>
+                  </a:cubicBezTo>
+                  <a:cubicBezTo>
+                    <a:pt x="1220588" y="-5247"/>
+                    <a:pt x="1567048" y="1888"/>
+                    <a:pt x="1743398" y="0"/>
+                  </a:cubicBezTo>
+                  <a:cubicBezTo>
+                    <a:pt x="1919748" y="-1888"/>
+                    <a:pt x="2096828" y="-18556"/>
+                    <a:pt x="2314511" y="0"/>
+                  </a:cubicBezTo>
+                  <a:cubicBezTo>
+                    <a:pt x="2532194" y="18556"/>
+                    <a:pt x="2773515" y="-30998"/>
+                    <a:pt x="3005859" y="0"/>
+                  </a:cubicBezTo>
+                  <a:cubicBezTo>
+                    <a:pt x="2987157" y="118191"/>
+                    <a:pt x="3002019" y="391306"/>
+                    <a:pt x="3005859" y="516498"/>
+                  </a:cubicBezTo>
+                  <a:cubicBezTo>
+                    <a:pt x="3009699" y="641690"/>
+                    <a:pt x="3008981" y="877810"/>
+                    <a:pt x="3005859" y="1003760"/>
+                  </a:cubicBezTo>
+                  <a:cubicBezTo>
+                    <a:pt x="3002737" y="1129710"/>
+                    <a:pt x="3025493" y="1335500"/>
+                    <a:pt x="3005859" y="1461786"/>
+                  </a:cubicBezTo>
+                  <a:cubicBezTo>
+                    <a:pt x="2840317" y="1474248"/>
+                    <a:pt x="2604091" y="1467429"/>
+                    <a:pt x="2464804" y="1461786"/>
+                  </a:cubicBezTo>
+                  <a:cubicBezTo>
+                    <a:pt x="2325518" y="1456143"/>
+                    <a:pt x="2096952" y="1457903"/>
+                    <a:pt x="1863633" y="1461786"/>
+                  </a:cubicBezTo>
+                  <a:cubicBezTo>
+                    <a:pt x="1630314" y="1465669"/>
+                    <a:pt x="1483968" y="1445477"/>
+                    <a:pt x="1262461" y="1461786"/>
+                  </a:cubicBezTo>
+                  <a:cubicBezTo>
+                    <a:pt x="1040954" y="1478095"/>
+                    <a:pt x="918307" y="1440121"/>
+                    <a:pt x="691348" y="1461786"/>
+                  </a:cubicBezTo>
+                  <a:cubicBezTo>
+                    <a:pt x="464389" y="1483451"/>
+                    <a:pt x="305996" y="1480305"/>
+                    <a:pt x="0" y="1461786"/>
+                  </a:cubicBezTo>
+                  <a:cubicBezTo>
+                    <a:pt x="-10709" y="1242757"/>
+                    <a:pt x="14520" y="1101216"/>
+                    <a:pt x="0" y="945288"/>
+                  </a:cubicBezTo>
+                  <a:cubicBezTo>
+                    <a:pt x="-14520" y="789360"/>
+                    <a:pt x="-13595" y="604217"/>
+                    <a:pt x="0" y="428791"/>
+                  </a:cubicBezTo>
+                  <a:cubicBezTo>
+                    <a:pt x="13595" y="253365"/>
+                    <a:pt x="-14699" y="160368"/>
+                    <a:pt x="0" y="0"/>
+                  </a:cubicBezTo>
+                  <a:close/>
+                </a:path>
+              </a:pathLst>
+            </a:custGeom>
+            <a:noFill/>
+            <a:ln w="25400">
+              <a:solidFill>
+                <a:schemeClr val="tx1"/>
+              </a:solidFill>
+              <a:extLst>
+                <a:ext uri="{C807C97D-BFC1-408E-A445-0C87EB9F89A2}">
+                  <ask:lineSketchStyleProps xmlns:ask="http://schemas.microsoft.com/office/drawing/2018/sketchyshapes" sd="1219033472">
+                    <a:prstGeom prst="rect">
+                      <a:avLst/>
+                    </a:prstGeom>
+                    <ask:type>
+                      <ask:lineSketchFreehand/>
+                    </ask:type>
+                  </ask:lineSketchStyleProps>
+                </a:ext>
+              </a:extLst>
+            </a:ln>
+          </p:spPr>
+          <p:style>
+            <a:lnRef idx="2">
+              <a:schemeClr val="accent1">
+                <a:shade val="15000"/>
+              </a:schemeClr>
+            </a:lnRef>
+            <a:fillRef idx="1">
+              <a:schemeClr val="accent1"/>
+            </a:fillRef>
+            <a:effectRef idx="0">
+              <a:schemeClr val="accent1"/>
+            </a:effectRef>
+            <a:fontRef idx="minor">
+              <a:schemeClr val="lt1"/>
+            </a:fontRef>
+          </p:style>
+          <p:txBody>
+            <a:bodyPr rtlCol="0" anchor="ctr"/>
+            <a:lstStyle/>
+            <a:p>
+              <a:pPr algn="ctr"/>
+              <a:endParaRPr lang="en-US" sz="2229" dirty="0"/>
+            </a:p>
+          </p:txBody>
+        </p:sp>
+        <p:sp>
+          <p:nvSpPr>
+            <p:cNvPr id="39" name="TextBox 38">
+              <a:extLst>
+                <a:ext uri="{FF2B5EF4-FFF2-40B4-BE49-F238E27FC236}">
+                  <a16:creationId xmlns:a16="http://schemas.microsoft.com/office/drawing/2014/main" id="{DFFB8246-5005-E1BE-7403-161BAE35F935}"/>
+                </a:ext>
+              </a:extLst>
+            </p:cNvPr>
+            <p:cNvSpPr txBox="1"/>
+            <p:nvPr/>
+          </p:nvSpPr>
+          <p:spPr>
+            <a:xfrm>
+              <a:off x="2492465" y="375300"/>
+              <a:ext cx="815005" cy="369332"/>
+            </a:xfrm>
+            <a:prstGeom prst="rect">
+              <a:avLst/>
+            </a:prstGeom>
+            <a:noFill/>
+          </p:spPr>
+          <p:txBody>
+            <a:bodyPr wrap="square" rtlCol="0">
+              <a:spAutoFit/>
+            </a:bodyPr>
+            <a:lstStyle/>
+            <a:p>
+              <a:endParaRPr lang="en-US" dirty="0"/>
+            </a:p>
+          </p:txBody>
+        </p:sp>
+        <p:pic>
+          <p:nvPicPr>
+            <p:cNvPr id="63" name="Picture 62">
+              <a:extLst>
+                <a:ext uri="{FF2B5EF4-FFF2-40B4-BE49-F238E27FC236}">
+                  <a16:creationId xmlns:a16="http://schemas.microsoft.com/office/drawing/2014/main" id="{329DC273-B102-9F5D-CEA3-63DE1E27CDEF}"/>
+                </a:ext>
+              </a:extLst>
+            </p:cNvPr>
+            <p:cNvPicPr>
+              <a:picLocks noChangeAspect="1"/>
+            </p:cNvPicPr>
+            <p:nvPr/>
+          </p:nvPicPr>
+          <p:blipFill>
+            <a:blip r:embed="rId4">
+              <a:alphaModFix/>
+            </a:blip>
+            <a:stretch>
+              <a:fillRect/>
+            </a:stretch>
+          </p:blipFill>
+          <p:spPr>
+            <a:xfrm>
+              <a:off x="3432106" y="294495"/>
+              <a:ext cx="426016" cy="152400"/>
+            </a:xfrm>
+            <a:prstGeom prst="rect">
+              <a:avLst/>
+            </a:prstGeom>
+          </p:spPr>
+        </p:pic>
+        <p:sp>
+          <p:nvSpPr>
+            <p:cNvPr id="11" name="TextBox 10">
+              <a:extLst>
+                <a:ext uri="{FF2B5EF4-FFF2-40B4-BE49-F238E27FC236}">
+                  <a16:creationId xmlns:a16="http://schemas.microsoft.com/office/drawing/2014/main" id="{6CB480FE-B0D2-3A3F-FD56-1E9784092FA6}"/>
+                </a:ext>
+              </a:extLst>
+            </p:cNvPr>
+            <p:cNvSpPr txBox="1"/>
+            <p:nvPr/>
+          </p:nvSpPr>
+          <p:spPr>
+            <a:xfrm>
+              <a:off x="6320882" y="-3073076"/>
+              <a:ext cx="923651" cy="369332"/>
+            </a:xfrm>
+            <a:prstGeom prst="rect">
+              <a:avLst/>
+            </a:prstGeom>
+            <a:noFill/>
+          </p:spPr>
+          <p:txBody>
+            <a:bodyPr wrap="none" rtlCol="0">
+              <a:spAutoFit/>
+            </a:bodyPr>
+            <a:lstStyle/>
+            <a:p>
+              <a:r>
+                <a:rPr lang="en-US" dirty="0">
+                  <a:latin typeface="Gaegu" pitchFamily="2" charset="0"/>
+                </a:rPr>
+                <a:t>Memory</a:t>
+              </a:r>
+            </a:p>
+          </p:txBody>
+        </p:sp>
+      </p:grpSp>
+      <p:sp>
+        <p:nvSpPr>
+          <p:cNvPr id="9" name="TextBox 8">
+            <a:extLst>
+              <a:ext uri="{FF2B5EF4-FFF2-40B4-BE49-F238E27FC236}">
+                <a16:creationId xmlns:a16="http://schemas.microsoft.com/office/drawing/2014/main" id="{9FB15B45-41EF-E496-562E-3898FB2B830C}"/>
+              </a:ext>
+            </a:extLst>
+          </p:cNvPr>
+          <p:cNvSpPr txBox="1"/>
+          <p:nvPr/>
+        </p:nvSpPr>
+        <p:spPr>
+          <a:xfrm>
+            <a:off x="3334412" y="3604371"/>
+            <a:ext cx="3793975" cy="1077218"/>
+          </a:xfrm>
+          <a:prstGeom prst="rect">
+            <a:avLst/>
+          </a:prstGeom>
+          <a:noFill/>
+        </p:spPr>
+        <p:txBody>
+          <a:bodyPr wrap="square" rtlCol="0">
+            <a:spAutoFit/>
+          </a:bodyPr>
+          <a:lstStyle/>
+          <a:p>
+            <a:r>
+              <a:rPr lang="en-AU" sz="1600" dirty="0">
+                <a:solidFill>
+                  <a:schemeClr val="bg1">
+                    <a:lumMod val="65000"/>
+                  </a:schemeClr>
+                </a:solidFill>
+              </a:rPr>
+              <a:t>Calling test return – the value 3 is returned</a:t>
+            </a:r>
+          </a:p>
+          <a:p>
+            <a:r>
+              <a:rPr lang="en-AU" sz="1600" dirty="0"/>
+              <a:t>[bash-prompt] echo $?</a:t>
+            </a:r>
+          </a:p>
+          <a:p>
+            <a:r>
+              <a:rPr lang="en-AU" sz="1600" dirty="0"/>
+              <a:t>0</a:t>
+            </a:r>
+          </a:p>
+          <a:p>
+            <a:r>
+              <a:rPr lang="en-AU" sz="1600" dirty="0"/>
+              <a:t>[bash-prompt]</a:t>
+            </a:r>
+            <a:endParaRPr lang="en-US" sz="1600" dirty="0"/>
+          </a:p>
+        </p:txBody>
+      </p:sp>
+      <p:sp>
+        <p:nvSpPr>
+          <p:cNvPr id="6" name="Oval 5">
+            <a:extLst>
+              <a:ext uri="{FF2B5EF4-FFF2-40B4-BE49-F238E27FC236}">
+                <a16:creationId xmlns:a16="http://schemas.microsoft.com/office/drawing/2014/main" id="{6EAAEFBE-EAB4-89FA-7506-CB5A0D4B8638}"/>
+              </a:ext>
+            </a:extLst>
+          </p:cNvPr>
+          <p:cNvSpPr/>
+          <p:nvPr/>
+        </p:nvSpPr>
+        <p:spPr>
+          <a:xfrm>
+            <a:off x="4601496" y="3843204"/>
+            <a:ext cx="875071" cy="354884"/>
+          </a:xfrm>
+          <a:prstGeom prst="ellipse">
+            <a:avLst/>
+          </a:prstGeom>
+          <a:solidFill>
+            <a:srgbClr val="C37050">
+              <a:alpha val="0"/>
+            </a:srgbClr>
+          </a:solidFill>
+          <a:ln w="28575">
+            <a:solidFill>
+              <a:srgbClr val="C37050"/>
+            </a:solidFill>
+          </a:ln>
+        </p:spPr>
+        <p:style>
+          <a:lnRef idx="2">
+            <a:schemeClr val="accent1">
+              <a:shade val="15000"/>
+            </a:schemeClr>
+          </a:lnRef>
+          <a:fillRef idx="1">
+            <a:schemeClr val="accent1"/>
+          </a:fillRef>
+          <a:effectRef idx="0">
+            <a:schemeClr val="accent1"/>
+          </a:effectRef>
+          <a:fontRef idx="minor">
+            <a:schemeClr val="lt1"/>
+          </a:fontRef>
+        </p:style>
+        <p:txBody>
+          <a:bodyPr rtlCol="0" anchor="ctr"/>
+          <a:lstStyle/>
+          <a:p>
+            <a:pPr algn="ctr"/>
+            <a:endParaRPr lang="en-US"/>
+          </a:p>
+        </p:txBody>
+      </p:sp>
+      <p:cxnSp>
+        <p:nvCxnSpPr>
+          <p:cNvPr id="7" name="Curved Connector 6">
+            <a:extLst>
+              <a:ext uri="{FF2B5EF4-FFF2-40B4-BE49-F238E27FC236}">
+                <a16:creationId xmlns:a16="http://schemas.microsoft.com/office/drawing/2014/main" id="{AB1EFBFE-F4F6-3816-23D6-DDC2F01FA0D0}"/>
+              </a:ext>
+            </a:extLst>
+          </p:cNvPr>
+          <p:cNvCxnSpPr>
+            <a:cxnSpLocks/>
+            <a:stCxn id="6" idx="4"/>
+          </p:cNvCxnSpPr>
+          <p:nvPr/>
+        </p:nvCxnSpPr>
+        <p:spPr>
+          <a:xfrm rot="5400000">
+            <a:off x="4259685" y="3517349"/>
+            <a:ext cx="98608" cy="1460087"/>
+          </a:xfrm>
+          <a:prstGeom prst="curvedConnector2">
+            <a:avLst/>
+          </a:prstGeom>
+          <a:ln w="38100">
+            <a:solidFill>
+              <a:schemeClr val="accent2">
+                <a:lumMod val="75000"/>
+              </a:schemeClr>
+            </a:solidFill>
+            <a:headEnd type="none"/>
+            <a:tailEnd type="arrow"/>
+          </a:ln>
+        </p:spPr>
+        <p:style>
+          <a:lnRef idx="1">
+            <a:schemeClr val="accent1"/>
+          </a:lnRef>
+          <a:fillRef idx="0">
+            <a:schemeClr val="accent1"/>
+          </a:fillRef>
+          <a:effectRef idx="0">
+            <a:schemeClr val="accent1"/>
+          </a:effectRef>
+          <a:fontRef idx="minor">
+            <a:schemeClr val="tx1"/>
+          </a:fontRef>
+        </p:style>
+      </p:cxnSp>
+    </p:spTree>
+    <p:extLst>
+      <p:ext uri="{BB962C8B-B14F-4D97-AF65-F5344CB8AC3E}">
+        <p14:creationId xmlns:p14="http://schemas.microsoft.com/office/powerpoint/2010/main" val="3182339373"/>
+      </p:ext>
+    </p:extLst>
+  </p:cSld>
+  <p:clrMapOvr>
+    <a:masterClrMapping/>
+  </p:clrMapOvr>
+</p:sld>
+</file>
+
 <file path=ppt/theme/theme1.xml><?xml version="1.0" encoding="utf-8"?>
 <a:theme xmlns:a="http://schemas.openxmlformats.org/drawingml/2006/main" name="Office 2013 - 2022 Theme">
   <a:themeElements>

</xml_diff>

<commit_message>
Edit P2C2 return concept
</commit_message>
<xml_diff>
--- a/resources/ppt-slides/slider-return.pptx
+++ b/resources/ppt-slides/slider-return.pptx
@@ -250,7 +250,7 @@
           <a:p>
             <a:fld id="{964302DC-9F53-934F-AE4D-0F1F197008C1}" type="datetimeFigureOut">
               <a:rPr lang="en-US" smtClean="0"/>
-              <a:t>12/1/23</a:t>
+              <a:t>2/20/24</a:t>
             </a:fld>
             <a:endParaRPr lang="en-US"/>
           </a:p>
@@ -420,7 +420,7 @@
           <a:p>
             <a:fld id="{964302DC-9F53-934F-AE4D-0F1F197008C1}" type="datetimeFigureOut">
               <a:rPr lang="en-US" smtClean="0"/>
-              <a:t>12/1/23</a:t>
+              <a:t>2/20/24</a:t>
             </a:fld>
             <a:endParaRPr lang="en-US"/>
           </a:p>
@@ -600,7 +600,7 @@
           <a:p>
             <a:fld id="{964302DC-9F53-934F-AE4D-0F1F197008C1}" type="datetimeFigureOut">
               <a:rPr lang="en-US" smtClean="0"/>
-              <a:t>12/1/23</a:t>
+              <a:t>2/20/24</a:t>
             </a:fld>
             <a:endParaRPr lang="en-US"/>
           </a:p>
@@ -770,7 +770,7 @@
           <a:p>
             <a:fld id="{964302DC-9F53-934F-AE4D-0F1F197008C1}" type="datetimeFigureOut">
               <a:rPr lang="en-US" smtClean="0"/>
-              <a:t>12/1/23</a:t>
+              <a:t>2/20/24</a:t>
             </a:fld>
             <a:endParaRPr lang="en-US"/>
           </a:p>
@@ -1014,7 +1014,7 @@
           <a:p>
             <a:fld id="{964302DC-9F53-934F-AE4D-0F1F197008C1}" type="datetimeFigureOut">
               <a:rPr lang="en-US" smtClean="0"/>
-              <a:t>12/1/23</a:t>
+              <a:t>2/20/24</a:t>
             </a:fld>
             <a:endParaRPr lang="en-US"/>
           </a:p>
@@ -1246,7 +1246,7 @@
           <a:p>
             <a:fld id="{964302DC-9F53-934F-AE4D-0F1F197008C1}" type="datetimeFigureOut">
               <a:rPr lang="en-US" smtClean="0"/>
-              <a:t>12/1/23</a:t>
+              <a:t>2/20/24</a:t>
             </a:fld>
             <a:endParaRPr lang="en-US"/>
           </a:p>
@@ -1613,7 +1613,7 @@
           <a:p>
             <a:fld id="{964302DC-9F53-934F-AE4D-0F1F197008C1}" type="datetimeFigureOut">
               <a:rPr lang="en-US" smtClean="0"/>
-              <a:t>12/1/23</a:t>
+              <a:t>2/20/24</a:t>
             </a:fld>
             <a:endParaRPr lang="en-US"/>
           </a:p>
@@ -1731,7 +1731,7 @@
           <a:p>
             <a:fld id="{964302DC-9F53-934F-AE4D-0F1F197008C1}" type="datetimeFigureOut">
               <a:rPr lang="en-US" smtClean="0"/>
-              <a:t>12/1/23</a:t>
+              <a:t>2/20/24</a:t>
             </a:fld>
             <a:endParaRPr lang="en-US"/>
           </a:p>
@@ -1826,7 +1826,7 @@
           <a:p>
             <a:fld id="{964302DC-9F53-934F-AE4D-0F1F197008C1}" type="datetimeFigureOut">
               <a:rPr lang="en-US" smtClean="0"/>
-              <a:t>12/1/23</a:t>
+              <a:t>2/20/24</a:t>
             </a:fld>
             <a:endParaRPr lang="en-US"/>
           </a:p>
@@ -2103,7 +2103,7 @@
           <a:p>
             <a:fld id="{964302DC-9F53-934F-AE4D-0F1F197008C1}" type="datetimeFigureOut">
               <a:rPr lang="en-US" smtClean="0"/>
-              <a:t>12/1/23</a:t>
+              <a:t>2/20/24</a:t>
             </a:fld>
             <a:endParaRPr lang="en-US"/>
           </a:p>
@@ -2360,7 +2360,7 @@
           <a:p>
             <a:fld id="{964302DC-9F53-934F-AE4D-0F1F197008C1}" type="datetimeFigureOut">
               <a:rPr lang="en-US" smtClean="0"/>
-              <a:t>12/1/23</a:t>
+              <a:t>2/20/24</a:t>
             </a:fld>
             <a:endParaRPr lang="en-US"/>
           </a:p>
@@ -2425,9 +2425,18 @@
 <p:sldMaster xmlns:a="http://schemas.openxmlformats.org/drawingml/2006/main" xmlns:r="http://schemas.openxmlformats.org/officeDocument/2006/relationships" xmlns:p="http://schemas.openxmlformats.org/presentationml/2006/main">
   <p:cSld>
     <p:bg>
-      <p:bgRef idx="1001">
-        <a:schemeClr val="bg1"/>
-      </p:bgRef>
+      <p:bgPr>
+        <a:blipFill dpi="0" rotWithShape="1">
+          <a:blip r:embed="rId13">
+            <a:lum/>
+          </a:blip>
+          <a:srcRect/>
+          <a:stretch>
+            <a:fillRect/>
+          </a:stretch>
+        </a:blipFill>
+        <a:effectLst/>
+      </p:bgPr>
     </p:bg>
     <p:spTree>
       <p:nvGrpSpPr>
@@ -2573,7 +2582,7 @@
           <a:p>
             <a:fld id="{964302DC-9F53-934F-AE4D-0F1F197008C1}" type="datetimeFigureOut">
               <a:rPr lang="en-US" smtClean="0"/>
-              <a:t>12/1/23</a:t>
+              <a:t>2/20/24</a:t>
             </a:fld>
             <a:endParaRPr lang="en-US"/>
           </a:p>
@@ -2964,20 +2973,6 @@
 <file path=ppt/slides/slide1.xml><?xml version="1.0" encoding="utf-8"?>
 <p:sld xmlns:a="http://schemas.openxmlformats.org/drawingml/2006/main" xmlns:r="http://schemas.openxmlformats.org/officeDocument/2006/relationships" xmlns:p="http://schemas.openxmlformats.org/presentationml/2006/main">
   <p:cSld>
-    <p:bg>
-      <p:bgPr>
-        <a:blipFill dpi="0" rotWithShape="1">
-          <a:blip r:embed="rId2">
-            <a:lum/>
-          </a:blip>
-          <a:srcRect/>
-          <a:stretch>
-            <a:fillRect/>
-          </a:stretch>
-        </a:blipFill>
-        <a:effectLst/>
-      </p:bgPr>
-    </p:bg>
     <p:spTree>
       <p:nvGrpSpPr>
         <p:cNvPr id="1" name=""/>
@@ -3083,7 +3078,7 @@
           <p:spPr>
             <a:xfrm>
               <a:off x="2253693" y="-2438525"/>
-              <a:ext cx="5046276" cy="2492990"/>
+              <a:ext cx="5046276" cy="2677656"/>
             </a:xfrm>
             <a:prstGeom prst="rect">
               <a:avLst/>
@@ -3102,7 +3097,17 @@
               </a:pPr>
               <a:r>
                 <a:rPr lang="en-AU" sz="1200" dirty="0"/>
-                <a:t>int main() {</a:t>
+                <a:t>int main()</a:t>
+              </a:r>
+            </a:p>
+            <a:p>
+              <a:pPr marL="228600" indent="-228600" rtl="0">
+                <a:buFont typeface="+mj-lt"/>
+                <a:buAutoNum type="arabicPeriod"/>
+              </a:pPr>
+              <a:r>
+                <a:rPr lang="en-AU" sz="1200" dirty="0"/>
+                <a:t>{</a:t>
               </a:r>
             </a:p>
             <a:p>
@@ -3118,7 +3123,7 @@
                     </a:schemeClr>
                   </a:solidFill>
                 </a:rPr>
-                <a:t>    </a:t>
+                <a:t>      </a:t>
               </a:r>
               <a:r>
                 <a:rPr lang="en-AU" sz="1200" dirty="0" err="1">
@@ -3198,15 +3203,9 @@
                     </a:schemeClr>
                   </a:solidFill>
                 </a:rPr>
-                <a:t>()) + " is returned\n");</a:t>
-              </a:r>
-            </a:p>
-            <a:p>
-              <a:pPr marL="228600" indent="-228600" rtl="0">
-                <a:buFont typeface="+mj-lt"/>
-                <a:buAutoNum type="arabicPeriod"/>
-              </a:pPr>
-              <a:r>
+                <a:t>()) + </a:t>
+              </a:r>
+              <a:br>
                 <a:rPr lang="en-AU" sz="1200" dirty="0">
                   <a:solidFill>
                     <a:schemeClr val="bg1">
@@ -3214,7 +3213,32 @@
                     </a:schemeClr>
                   </a:solidFill>
                 </a:rPr>
-                <a:t>    return 0;</a:t>
+              </a:br>
+              <a:r>
+                <a:rPr lang="en-AU" sz="1200" dirty="0">
+                  <a:solidFill>
+                    <a:schemeClr val="bg1">
+                      <a:lumMod val="65000"/>
+                    </a:schemeClr>
+                  </a:solidFill>
+                </a:rPr>
+                <a:t>	" is returned\n");</a:t>
+              </a:r>
+            </a:p>
+            <a:p>
+              <a:pPr marL="228600" indent="-228600" rtl="0">
+                <a:buFont typeface="+mj-lt"/>
+                <a:buAutoNum type="arabicPeriod"/>
+              </a:pPr>
+              <a:r>
+                <a:rPr lang="en-AU" sz="1200" dirty="0">
+                  <a:solidFill>
+                    <a:schemeClr val="bg1">
+                      <a:lumMod val="65000"/>
+                    </a:schemeClr>
+                  </a:solidFill>
+                </a:rPr>
+                <a:t>      return 0;</a:t>
               </a:r>
             </a:p>
             <a:p>
@@ -3314,7 +3338,7 @@
                     </a:schemeClr>
                   </a:solidFill>
                 </a:rPr>
-                <a:t>    </a:t>
+                <a:t>      </a:t>
               </a:r>
               <a:r>
                 <a:rPr lang="en-AU" sz="1200" dirty="0" err="1">
@@ -3350,7 +3374,7 @@
                     </a:schemeClr>
                   </a:solidFill>
                 </a:rPr>
-                <a:t>    return 3;</a:t>
+                <a:t>      return 3;</a:t>
               </a:r>
             </a:p>
             <a:p>
@@ -3366,7 +3390,7 @@
                     </a:schemeClr>
                   </a:solidFill>
                 </a:rPr>
-                <a:t>    </a:t>
+                <a:t>      </a:t>
               </a:r>
               <a:r>
                 <a:rPr lang="en-AU" sz="1200" dirty="0" err="1">
@@ -3452,7 +3476,7 @@
               <p:nvPr/>
             </p:nvPicPr>
             <p:blipFill>
-              <a:blip r:embed="rId3">
+              <a:blip r:embed="rId2">
                 <a:alphaModFix/>
               </a:blip>
               <a:stretch>
@@ -5221,7 +5245,7 @@
             <a:p>
               <a:r>
                 <a:rPr lang="en-US" dirty="0"/>
-                <a:t>2</a:t>
+                <a:t>2,3</a:t>
               </a:r>
             </a:p>
           </p:txBody>
@@ -5241,7 +5265,7 @@
             <p:nvPr/>
           </p:nvPicPr>
           <p:blipFill>
-            <a:blip r:embed="rId4">
+            <a:blip r:embed="rId3">
               <a:alphaModFix/>
             </a:blip>
             <a:stretch>
@@ -5518,20 +5542,6 @@
 <file path=ppt/slides/slide2.xml><?xml version="1.0" encoding="utf-8"?>
 <p:sld xmlns:a="http://schemas.openxmlformats.org/drawingml/2006/main" xmlns:r="http://schemas.openxmlformats.org/officeDocument/2006/relationships" xmlns:p="http://schemas.openxmlformats.org/presentationml/2006/main">
   <p:cSld>
-    <p:bg>
-      <p:bgPr>
-        <a:blipFill dpi="0" rotWithShape="1">
-          <a:blip r:embed="rId2">
-            <a:lum/>
-          </a:blip>
-          <a:srcRect/>
-          <a:stretch>
-            <a:fillRect/>
-          </a:stretch>
-        </a:blipFill>
-        <a:effectLst/>
-      </p:bgPr>
-    </p:bg>
     <p:spTree>
       <p:nvGrpSpPr>
         <p:cNvPr id="1" name=""/>
@@ -5581,7 +5591,7 @@
           <p:spPr>
             <a:xfrm>
               <a:off x="2253693" y="-2438525"/>
-              <a:ext cx="5046276" cy="2492990"/>
+              <a:ext cx="5046276" cy="2677656"/>
             </a:xfrm>
             <a:prstGeom prst="rect">
               <a:avLst/>
@@ -5606,49 +5616,7 @@
                     </a:schemeClr>
                   </a:solidFill>
                 </a:rPr>
-                <a:t>int main() {</a:t>
-              </a:r>
-            </a:p>
-            <a:p>
-              <a:pPr marL="228600" indent="-228600" rtl="0">
-                <a:buFont typeface="+mj-lt"/>
-                <a:buAutoNum type="arabicPeriod"/>
-              </a:pPr>
-              <a:r>
-                <a:rPr lang="en-AU" sz="1200" dirty="0"/>
-                <a:t>    </a:t>
-              </a:r>
-              <a:r>
-                <a:rPr lang="en-AU" sz="1200" dirty="0" err="1"/>
-                <a:t>write_line</a:t>
-              </a:r>
-              <a:r>
-                <a:rPr lang="en-AU" sz="1200" dirty="0"/>
-                <a:t>("Calling </a:t>
-              </a:r>
-              <a:r>
-                <a:rPr lang="en-AU" sz="1200" dirty="0" err="1"/>
-                <a:t>test_return</a:t>
-              </a:r>
-              <a:r>
-                <a:rPr lang="en-AU" sz="1200" dirty="0"/>
-                <a:t> - the value " + </a:t>
-              </a:r>
-              <a:r>
-                <a:rPr lang="en-AU" sz="1200" dirty="0" err="1"/>
-                <a:t>to_string</a:t>
-              </a:r>
-              <a:r>
-                <a:rPr lang="en-AU" sz="1200" dirty="0"/>
-                <a:t>(</a:t>
-              </a:r>
-              <a:r>
-                <a:rPr lang="en-AU" sz="1200" dirty="0" err="1"/>
-                <a:t>test_return</a:t>
-              </a:r>
-              <a:r>
-                <a:rPr lang="en-AU" sz="1200" dirty="0"/>
-                <a:t>()) + " is returned\n");</a:t>
+                <a:t>int main()</a:t>
               </a:r>
             </a:p>
             <a:p>
@@ -5664,7 +5632,72 @@
                     </a:schemeClr>
                   </a:solidFill>
                 </a:rPr>
-                <a:t>    return 0;</a:t>
+                <a:t>{</a:t>
+              </a:r>
+            </a:p>
+            <a:p>
+              <a:pPr marL="228600" indent="-228600" rtl="0">
+                <a:buFont typeface="+mj-lt"/>
+                <a:buAutoNum type="arabicPeriod"/>
+              </a:pPr>
+              <a:r>
+                <a:rPr lang="en-AU" sz="1200" dirty="0"/>
+                <a:t>      </a:t>
+              </a:r>
+              <a:r>
+                <a:rPr lang="en-AU" sz="1200" dirty="0" err="1"/>
+                <a:t>write_line</a:t>
+              </a:r>
+              <a:r>
+                <a:rPr lang="en-AU" sz="1200" dirty="0"/>
+                <a:t>("Calling </a:t>
+              </a:r>
+              <a:r>
+                <a:rPr lang="en-AU" sz="1200" dirty="0" err="1"/>
+                <a:t>test_return</a:t>
+              </a:r>
+              <a:r>
+                <a:rPr lang="en-AU" sz="1200" dirty="0"/>
+                <a:t> - the value " + </a:t>
+              </a:r>
+              <a:r>
+                <a:rPr lang="en-AU" sz="1200" dirty="0" err="1"/>
+                <a:t>to_string</a:t>
+              </a:r>
+              <a:r>
+                <a:rPr lang="en-AU" sz="1200" dirty="0"/>
+                <a:t>(</a:t>
+              </a:r>
+              <a:r>
+                <a:rPr lang="en-AU" sz="1200" dirty="0" err="1"/>
+                <a:t>test_return</a:t>
+              </a:r>
+              <a:r>
+                <a:rPr lang="en-AU" sz="1200" dirty="0"/>
+                <a:t>()) + </a:t>
+              </a:r>
+              <a:br>
+                <a:rPr lang="en-AU" sz="1200" dirty="0"/>
+              </a:br>
+              <a:r>
+                <a:rPr lang="en-AU" sz="1200" dirty="0"/>
+                <a:t>	" is returned\n");</a:t>
+              </a:r>
+            </a:p>
+            <a:p>
+              <a:pPr marL="228600" indent="-228600" rtl="0">
+                <a:buFont typeface="+mj-lt"/>
+                <a:buAutoNum type="arabicPeriod"/>
+              </a:pPr>
+              <a:r>
+                <a:rPr lang="en-AU" sz="1200" dirty="0">
+                  <a:solidFill>
+                    <a:schemeClr val="bg1">
+                      <a:lumMod val="65000"/>
+                    </a:schemeClr>
+                  </a:solidFill>
+                </a:rPr>
+                <a:t>      return 0;</a:t>
               </a:r>
             </a:p>
             <a:p>
@@ -5764,7 +5797,7 @@
                     </a:schemeClr>
                   </a:solidFill>
                 </a:rPr>
-                <a:t>    </a:t>
+                <a:t>      </a:t>
               </a:r>
               <a:r>
                 <a:rPr lang="en-AU" sz="1200" dirty="0" err="1">
@@ -5800,7 +5833,7 @@
                     </a:schemeClr>
                   </a:solidFill>
                 </a:rPr>
-                <a:t>    return 3;</a:t>
+                <a:t>      return 3;</a:t>
               </a:r>
             </a:p>
             <a:p>
@@ -5816,7 +5849,7 @@
                     </a:schemeClr>
                   </a:solidFill>
                 </a:rPr>
-                <a:t>    </a:t>
+                <a:t>      </a:t>
               </a:r>
               <a:r>
                 <a:rPr lang="en-AU" sz="1200" dirty="0" err="1">
@@ -5902,7 +5935,7 @@
               <p:nvPr/>
             </p:nvPicPr>
             <p:blipFill>
-              <a:blip r:embed="rId3">
+              <a:blip r:embed="rId2">
                 <a:alphaModFix/>
               </a:blip>
               <a:stretch>
@@ -7352,7 +7385,7 @@
               <a:pPr algn="ctr"/>
               <a:r>
                 <a:rPr lang="en-US" dirty="0"/>
-                <a:t>2</a:t>
+                <a:t>3</a:t>
               </a:r>
             </a:p>
           </p:txBody>
@@ -7680,7 +7713,7 @@
             <a:p>
               <a:r>
                 <a:rPr lang="en-US" dirty="0"/>
-                <a:t>5,6,7</a:t>
+                <a:t>6,7,8</a:t>
               </a:r>
             </a:p>
           </p:txBody>
@@ -7700,7 +7733,7 @@
             <p:nvPr/>
           </p:nvPicPr>
           <p:blipFill>
-            <a:blip r:embed="rId4">
+            <a:blip r:embed="rId3">
               <a:alphaModFix amt="30000"/>
             </a:blip>
             <a:stretch>
@@ -7769,8 +7802,8 @@
         </p:nvGrpSpPr>
         <p:grpSpPr>
           <a:xfrm>
-            <a:off x="1901041" y="1001487"/>
-            <a:ext cx="407468" cy="2903342"/>
+            <a:off x="1901041" y="1179399"/>
+            <a:ext cx="407468" cy="2725429"/>
             <a:chOff x="1668759" y="-13958058"/>
             <a:chExt cx="487848" cy="22198517"/>
           </a:xfrm>
@@ -7936,7 +7969,7 @@
         </p:nvSpPr>
         <p:spPr>
           <a:xfrm>
-            <a:off x="6066503" y="824044"/>
+            <a:off x="6142703" y="1001486"/>
             <a:ext cx="875071" cy="354884"/>
           </a:xfrm>
           <a:prstGeom prst="ellipse">
@@ -7994,20 +8027,6 @@
 <file path=ppt/slides/slide3.xml><?xml version="1.0" encoding="utf-8"?>
 <p:sld xmlns:a="http://schemas.openxmlformats.org/drawingml/2006/main" xmlns:r="http://schemas.openxmlformats.org/officeDocument/2006/relationships" xmlns:p="http://schemas.openxmlformats.org/presentationml/2006/main">
   <p:cSld>
-    <p:bg>
-      <p:bgPr>
-        <a:blipFill dpi="0" rotWithShape="1">
-          <a:blip r:embed="rId2">
-            <a:lum/>
-          </a:blip>
-          <a:srcRect/>
-          <a:stretch>
-            <a:fillRect/>
-          </a:stretch>
-        </a:blipFill>
-        <a:effectLst/>
-      </p:bgPr>
-    </p:bg>
     <p:spTree>
       <p:nvGrpSpPr>
         <p:cNvPr id="1" name=""/>
@@ -8057,7 +8076,7 @@
           <p:spPr>
             <a:xfrm>
               <a:off x="2253693" y="-2438525"/>
-              <a:ext cx="5046276" cy="2492990"/>
+              <a:ext cx="5046276" cy="2677656"/>
             </a:xfrm>
             <a:prstGeom prst="rect">
               <a:avLst/>
@@ -8082,7 +8101,7 @@
                     </a:schemeClr>
                   </a:solidFill>
                 </a:rPr>
-                <a:t>int main() {</a:t>
+                <a:t>int main()</a:t>
               </a:r>
             </a:p>
             <a:p>
@@ -8098,7 +8117,23 @@
                     </a:schemeClr>
                   </a:solidFill>
                 </a:rPr>
-                <a:t>    </a:t>
+                <a:t>{</a:t>
+              </a:r>
+            </a:p>
+            <a:p>
+              <a:pPr marL="228600" indent="-228600" rtl="0">
+                <a:buFont typeface="+mj-lt"/>
+                <a:buAutoNum type="arabicPeriod"/>
+              </a:pPr>
+              <a:r>
+                <a:rPr lang="en-AU" sz="1200" dirty="0">
+                  <a:solidFill>
+                    <a:schemeClr val="bg1">
+                      <a:lumMod val="65000"/>
+                    </a:schemeClr>
+                  </a:solidFill>
+                </a:rPr>
+                <a:t>      </a:t>
               </a:r>
               <a:r>
                 <a:rPr lang="en-AU" sz="1200" dirty="0" err="1">
@@ -8176,15 +8211,9 @@
                     </a:schemeClr>
                   </a:solidFill>
                 </a:rPr>
-                <a:t>) + " is returned\n");</a:t>
-              </a:r>
-            </a:p>
-            <a:p>
-              <a:pPr marL="228600" indent="-228600" rtl="0">
-                <a:buFont typeface="+mj-lt"/>
-                <a:buAutoNum type="arabicPeriod"/>
-              </a:pPr>
-              <a:r>
+                <a:t>) + </a:t>
+              </a:r>
+              <a:br>
                 <a:rPr lang="en-AU" sz="1200" dirty="0">
                   <a:solidFill>
                     <a:schemeClr val="bg1">
@@ -8192,7 +8221,32 @@
                     </a:schemeClr>
                   </a:solidFill>
                 </a:rPr>
-                <a:t>    return 0;</a:t>
+              </a:br>
+              <a:r>
+                <a:rPr lang="en-AU" sz="1200" dirty="0">
+                  <a:solidFill>
+                    <a:schemeClr val="bg1">
+                      <a:lumMod val="65000"/>
+                    </a:schemeClr>
+                  </a:solidFill>
+                </a:rPr>
+                <a:t>	" is returned\n");</a:t>
+              </a:r>
+            </a:p>
+            <a:p>
+              <a:pPr marL="228600" indent="-228600" rtl="0">
+                <a:buFont typeface="+mj-lt"/>
+                <a:buAutoNum type="arabicPeriod"/>
+              </a:pPr>
+              <a:r>
+                <a:rPr lang="en-AU" sz="1200" dirty="0">
+                  <a:solidFill>
+                    <a:schemeClr val="bg1">
+                      <a:lumMod val="65000"/>
+                    </a:schemeClr>
+                  </a:solidFill>
+                </a:rPr>
+                <a:t>      return 0;</a:t>
               </a:r>
             </a:p>
             <a:p>
@@ -8262,7 +8316,7 @@
               </a:pPr>
               <a:r>
                 <a:rPr lang="en-AU" sz="1200" dirty="0"/>
-                <a:t>    </a:t>
+                <a:t>      </a:t>
               </a:r>
               <a:r>
                 <a:rPr lang="en-AU" sz="1200" dirty="0" err="1"/>
@@ -8286,7 +8340,7 @@
                     </a:schemeClr>
                   </a:solidFill>
                 </a:rPr>
-                <a:t>    return 3;</a:t>
+                <a:t>      return 3;</a:t>
               </a:r>
             </a:p>
             <a:p>
@@ -8302,7 +8356,7 @@
                     </a:schemeClr>
                   </a:solidFill>
                 </a:rPr>
-                <a:t>    </a:t>
+                <a:t>      </a:t>
               </a:r>
               <a:r>
                 <a:rPr lang="en-AU" sz="1200" dirty="0" err="1">
@@ -8388,7 +8442,7 @@
               <p:nvPr/>
             </p:nvPicPr>
             <p:blipFill>
-              <a:blip r:embed="rId3">
+              <a:blip r:embed="rId2">
                 <a:alphaModFix/>
               </a:blip>
               <a:stretch>
@@ -9829,7 +9883,7 @@
               <a:pPr algn="ctr"/>
               <a:r>
                 <a:rPr lang="en-US" dirty="0"/>
-                <a:t>5,6,7</a:t>
+                <a:t>8</a:t>
               </a:r>
             </a:p>
           </p:txBody>
@@ -10157,7 +10211,7 @@
             <a:p>
               <a:r>
                 <a:rPr lang="en-US" dirty="0"/>
-                <a:t>8</a:t>
+                <a:t>9</a:t>
               </a:r>
             </a:p>
           </p:txBody>
@@ -10177,7 +10231,7 @@
             <p:nvPr/>
           </p:nvPicPr>
           <p:blipFill>
-            <a:blip r:embed="rId4">
+            <a:blip r:embed="rId3">
               <a:alphaModFix/>
             </a:blip>
             <a:stretch>
@@ -10246,8 +10300,8 @@
         </p:nvGrpSpPr>
         <p:grpSpPr>
           <a:xfrm>
-            <a:off x="1901041" y="2271251"/>
-            <a:ext cx="407468" cy="1461787"/>
+            <a:off x="1901041" y="2465351"/>
+            <a:ext cx="407468" cy="1267687"/>
             <a:chOff x="1668759" y="-13958058"/>
             <a:chExt cx="487848" cy="22198517"/>
           </a:xfrm>
@@ -10362,18 +10416,17 @@
           </p:cNvPr>
           <p:cNvCxnSpPr>
             <a:cxnSpLocks/>
+            <a:stCxn id="10" idx="4"/>
           </p:cNvCxnSpPr>
           <p:nvPr/>
         </p:nvCxnSpPr>
         <p:spPr>
-          <a:xfrm rot="10800000" flipV="1">
-            <a:off x="3628106" y="1178928"/>
-            <a:ext cx="2939843" cy="738360"/>
+          <a:xfrm rot="5400000">
+            <a:off x="4662170" y="259134"/>
+            <a:ext cx="743330" cy="2922951"/>
           </a:xfrm>
-          <a:prstGeom prst="curvedConnector3">
-            <a:avLst>
-              <a:gd name="adj1" fmla="val -167"/>
-            </a:avLst>
+          <a:prstGeom prst="curvedConnector2">
+            <a:avLst/>
           </a:prstGeom>
           <a:ln w="38100">
             <a:solidFill>
@@ -10462,7 +10515,7 @@
         </p:nvSpPr>
         <p:spPr>
           <a:xfrm>
-            <a:off x="6066503" y="824044"/>
+            <a:off x="6057774" y="994060"/>
             <a:ext cx="875071" cy="354884"/>
           </a:xfrm>
           <a:prstGeom prst="ellipse">
@@ -10520,20 +10573,6 @@
 <file path=ppt/slides/slide4.xml><?xml version="1.0" encoding="utf-8"?>
 <p:sld xmlns:a="http://schemas.openxmlformats.org/drawingml/2006/main" xmlns:r="http://schemas.openxmlformats.org/officeDocument/2006/relationships" xmlns:p="http://schemas.openxmlformats.org/presentationml/2006/main">
   <p:cSld>
-    <p:bg>
-      <p:bgPr>
-        <a:blipFill dpi="0" rotWithShape="1">
-          <a:blip r:embed="rId2">
-            <a:lum/>
-          </a:blip>
-          <a:srcRect/>
-          <a:stretch>
-            <a:fillRect/>
-          </a:stretch>
-        </a:blipFill>
-        <a:effectLst/>
-      </p:bgPr>
-    </p:bg>
     <p:spTree>
       <p:nvGrpSpPr>
         <p:cNvPr id="1" name=""/>
@@ -10583,7 +10622,7 @@
           <p:spPr>
             <a:xfrm>
               <a:off x="2253693" y="-2438525"/>
-              <a:ext cx="5046276" cy="2492990"/>
+              <a:ext cx="5046276" cy="2677656"/>
             </a:xfrm>
             <a:prstGeom prst="rect">
               <a:avLst/>
@@ -10608,7 +10647,7 @@
                     </a:schemeClr>
                   </a:solidFill>
                 </a:rPr>
-                <a:t>int main() {</a:t>
+                <a:t>int main()</a:t>
               </a:r>
             </a:p>
             <a:p>
@@ -10624,7 +10663,23 @@
                     </a:schemeClr>
                   </a:solidFill>
                 </a:rPr>
-                <a:t>    </a:t>
+                <a:t>{</a:t>
+              </a:r>
+            </a:p>
+            <a:p>
+              <a:pPr marL="228600" indent="-228600" rtl="0">
+                <a:buFont typeface="+mj-lt"/>
+                <a:buAutoNum type="arabicPeriod"/>
+              </a:pPr>
+              <a:r>
+                <a:rPr lang="en-AU" sz="1200" dirty="0">
+                  <a:solidFill>
+                    <a:schemeClr val="bg1">
+                      <a:lumMod val="65000"/>
+                    </a:schemeClr>
+                  </a:solidFill>
+                </a:rPr>
+                <a:t>      </a:t>
               </a:r>
               <a:r>
                 <a:rPr lang="en-AU" sz="1200" dirty="0" err="1">
@@ -10702,15 +10757,9 @@
                     </a:schemeClr>
                   </a:solidFill>
                 </a:rPr>
-                <a:t>) + " is returned\n");</a:t>
-              </a:r>
-            </a:p>
-            <a:p>
-              <a:pPr marL="228600" indent="-228600" rtl="0">
-                <a:buFont typeface="+mj-lt"/>
-                <a:buAutoNum type="arabicPeriod"/>
-              </a:pPr>
-              <a:r>
+                <a:t>) + </a:t>
+              </a:r>
+              <a:br>
                 <a:rPr lang="en-AU" sz="1200" dirty="0">
                   <a:solidFill>
                     <a:schemeClr val="bg1">
@@ -10718,7 +10767,32 @@
                     </a:schemeClr>
                   </a:solidFill>
                 </a:rPr>
-                <a:t>    return 0;</a:t>
+              </a:br>
+              <a:r>
+                <a:rPr lang="en-AU" sz="1200" dirty="0">
+                  <a:solidFill>
+                    <a:schemeClr val="bg1">
+                      <a:lumMod val="65000"/>
+                    </a:schemeClr>
+                  </a:solidFill>
+                </a:rPr>
+                <a:t>	" is returned\n");</a:t>
+              </a:r>
+            </a:p>
+            <a:p>
+              <a:pPr marL="228600" indent="-228600" rtl="0">
+                <a:buFont typeface="+mj-lt"/>
+                <a:buAutoNum type="arabicPeriod"/>
+              </a:pPr>
+              <a:r>
+                <a:rPr lang="en-AU" sz="1200" dirty="0">
+                  <a:solidFill>
+                    <a:schemeClr val="bg1">
+                      <a:lumMod val="65000"/>
+                    </a:schemeClr>
+                  </a:solidFill>
+                </a:rPr>
+                <a:t>      return 0;</a:t>
               </a:r>
             </a:p>
             <a:p>
@@ -10818,7 +10892,7 @@
                     </a:schemeClr>
                   </a:solidFill>
                 </a:rPr>
-                <a:t>    </a:t>
+                <a:t>      </a:t>
               </a:r>
               <a:r>
                 <a:rPr lang="en-AU" sz="1200" dirty="0" err="1">
@@ -10848,7 +10922,7 @@
               </a:pPr>
               <a:r>
                 <a:rPr lang="en-AU" sz="1200" dirty="0"/>
-                <a:t>    return 3;</a:t>
+                <a:t>      return 3;</a:t>
               </a:r>
             </a:p>
             <a:p>
@@ -10864,7 +10938,7 @@
                     </a:schemeClr>
                   </a:solidFill>
                 </a:rPr>
-                <a:t>    </a:t>
+                <a:t>      </a:t>
               </a:r>
               <a:r>
                 <a:rPr lang="en-AU" sz="1200" dirty="0" err="1">
@@ -10944,7 +11018,7 @@
               <p:nvPr/>
             </p:nvPicPr>
             <p:blipFill>
-              <a:blip r:embed="rId3">
+              <a:blip r:embed="rId2">
                 <a:alphaModFix/>
               </a:blip>
               <a:stretch>
@@ -12394,7 +12468,7 @@
               <a:pPr algn="ctr"/>
               <a:r>
                 <a:rPr lang="en-US" dirty="0"/>
-                <a:t>8</a:t>
+                <a:t>9</a:t>
               </a:r>
             </a:p>
           </p:txBody>
@@ -12722,7 +12796,7 @@
             <a:p>
               <a:r>
                 <a:rPr lang="en-US" dirty="0"/>
-                <a:t>10, 2</a:t>
+                <a:t>11, 3</a:t>
               </a:r>
             </a:p>
           </p:txBody>
@@ -12742,7 +12816,7 @@
             <p:nvPr/>
           </p:nvPicPr>
           <p:blipFill>
-            <a:blip r:embed="rId4">
+            <a:blip r:embed="rId3">
               <a:alphaModFix amt="30000"/>
             </a:blip>
             <a:stretch>
@@ -12811,8 +12885,8 @@
         </p:nvGrpSpPr>
         <p:grpSpPr>
           <a:xfrm>
-            <a:off x="1901041" y="2468120"/>
-            <a:ext cx="407468" cy="1205706"/>
+            <a:off x="1901041" y="2648550"/>
+            <a:ext cx="407468" cy="1025275"/>
             <a:chOff x="1668759" y="-13958058"/>
             <a:chExt cx="487848" cy="22198517"/>
           </a:xfrm>
@@ -12927,17 +13001,18 @@
           </p:cNvPr>
           <p:cNvCxnSpPr>
             <a:cxnSpLocks/>
+            <a:endCxn id="30" idx="2"/>
           </p:cNvCxnSpPr>
           <p:nvPr/>
         </p:nvCxnSpPr>
         <p:spPr>
           <a:xfrm flipV="1">
-            <a:off x="3297155" y="1179400"/>
-            <a:ext cx="3300290" cy="1288719"/>
+            <a:off x="3429878" y="1167589"/>
+            <a:ext cx="2642895" cy="1480962"/>
           </a:xfrm>
           <a:prstGeom prst="curvedConnector3">
             <a:avLst>
-              <a:gd name="adj1" fmla="val 100051"/>
+              <a:gd name="adj1" fmla="val 50000"/>
             </a:avLst>
           </a:prstGeom>
           <a:ln w="38100">
@@ -13039,7 +13114,7 @@
         </p:nvSpPr>
         <p:spPr>
           <a:xfrm>
-            <a:off x="6139795" y="1423725"/>
+            <a:off x="4774603" y="1408893"/>
             <a:ext cx="357718" cy="369333"/>
           </a:xfrm>
           <a:custGeom>
@@ -13195,7 +13270,7 @@
         </p:nvSpPr>
         <p:spPr>
           <a:xfrm>
-            <a:off x="6066503" y="824044"/>
+            <a:off x="6072773" y="990147"/>
             <a:ext cx="875071" cy="354884"/>
           </a:xfrm>
           <a:prstGeom prst="ellipse">
@@ -13253,20 +13328,6 @@
 <file path=ppt/slides/slide5.xml><?xml version="1.0" encoding="utf-8"?>
 <p:sld xmlns:a="http://schemas.openxmlformats.org/drawingml/2006/main" xmlns:r="http://schemas.openxmlformats.org/officeDocument/2006/relationships" xmlns:p="http://schemas.openxmlformats.org/presentationml/2006/main">
   <p:cSld>
-    <p:bg>
-      <p:bgPr>
-        <a:blipFill dpi="0" rotWithShape="1">
-          <a:blip r:embed="rId2">
-            <a:lum/>
-          </a:blip>
-          <a:srcRect/>
-          <a:stretch>
-            <a:fillRect/>
-          </a:stretch>
-        </a:blipFill>
-        <a:effectLst/>
-      </p:bgPr>
-    </p:bg>
     <p:spTree>
       <p:nvGrpSpPr>
         <p:cNvPr id="1" name=""/>
@@ -13295,7 +13356,7 @@
         </p:nvGrpSpPr>
         <p:grpSpPr>
           <a:xfrm>
-            <a:off x="229043" y="30592"/>
+            <a:off x="229043" y="30996"/>
             <a:ext cx="7101587" cy="4786579"/>
             <a:chOff x="231271" y="-3073076"/>
             <a:chExt cx="7101587" cy="4786579"/>
@@ -13316,7 +13377,7 @@
           <p:spPr>
             <a:xfrm>
               <a:off x="2253693" y="-2438525"/>
-              <a:ext cx="5046276" cy="2492990"/>
+              <a:ext cx="5046276" cy="2677656"/>
             </a:xfrm>
             <a:prstGeom prst="rect">
               <a:avLst/>
@@ -13341,49 +13402,7 @@
                     </a:schemeClr>
                   </a:solidFill>
                 </a:rPr>
-                <a:t>int main() {</a:t>
-              </a:r>
-            </a:p>
-            <a:p>
-              <a:pPr marL="228600" indent="-228600" rtl="0">
-                <a:buFont typeface="+mj-lt"/>
-                <a:buAutoNum type="arabicPeriod"/>
-              </a:pPr>
-              <a:r>
-                <a:rPr lang="en-AU" sz="1200" dirty="0"/>
-                <a:t>    </a:t>
-              </a:r>
-              <a:r>
-                <a:rPr lang="en-AU" sz="1200" dirty="0" err="1"/>
-                <a:t>write_line</a:t>
-              </a:r>
-              <a:r>
-                <a:rPr lang="en-AU" sz="1200" dirty="0"/>
-                <a:t>("Calling </a:t>
-              </a:r>
-              <a:r>
-                <a:rPr lang="en-AU" sz="1200" dirty="0" err="1"/>
-                <a:t>test_return</a:t>
-              </a:r>
-              <a:r>
-                <a:rPr lang="en-AU" sz="1200" dirty="0"/>
-                <a:t> - the value " + </a:t>
-              </a:r>
-              <a:r>
-                <a:rPr lang="en-AU" sz="1200" dirty="0" err="1"/>
-                <a:t>to_string</a:t>
-              </a:r>
-              <a:r>
-                <a:rPr lang="en-AU" sz="1200" dirty="0"/>
-                <a:t>(</a:t>
-              </a:r>
-              <a:r>
-                <a:rPr lang="en-AU" sz="1200" dirty="0" err="1"/>
-                <a:t>test_return</a:t>
-              </a:r>
-              <a:r>
-                <a:rPr lang="en-AU" sz="1200" dirty="0"/>
-                <a:t>()) + " is returned\n");</a:t>
+                <a:t>int main()</a:t>
               </a:r>
             </a:p>
             <a:p>
@@ -13399,7 +13418,72 @@
                     </a:schemeClr>
                   </a:solidFill>
                 </a:rPr>
-                <a:t>    return 0;</a:t>
+                <a:t>{</a:t>
+              </a:r>
+            </a:p>
+            <a:p>
+              <a:pPr marL="228600" indent="-228600" rtl="0">
+                <a:buFont typeface="+mj-lt"/>
+                <a:buAutoNum type="arabicPeriod"/>
+              </a:pPr>
+              <a:r>
+                <a:rPr lang="en-AU" sz="1200" dirty="0"/>
+                <a:t>      </a:t>
+              </a:r>
+              <a:r>
+                <a:rPr lang="en-AU" sz="1200" dirty="0" err="1"/>
+                <a:t>write_line</a:t>
+              </a:r>
+              <a:r>
+                <a:rPr lang="en-AU" sz="1200" dirty="0"/>
+                <a:t>("Calling </a:t>
+              </a:r>
+              <a:r>
+                <a:rPr lang="en-AU" sz="1200" dirty="0" err="1"/>
+                <a:t>test_return</a:t>
+              </a:r>
+              <a:r>
+                <a:rPr lang="en-AU" sz="1200" dirty="0"/>
+                <a:t> - the value " + </a:t>
+              </a:r>
+              <a:r>
+                <a:rPr lang="en-AU" sz="1200" dirty="0" err="1"/>
+                <a:t>to_string</a:t>
+              </a:r>
+              <a:r>
+                <a:rPr lang="en-AU" sz="1200" dirty="0"/>
+                <a:t>(</a:t>
+              </a:r>
+              <a:r>
+                <a:rPr lang="en-AU" sz="1200" dirty="0" err="1"/>
+                <a:t>test_return</a:t>
+              </a:r>
+              <a:r>
+                <a:rPr lang="en-AU" sz="1200" dirty="0"/>
+                <a:t>()) + </a:t>
+              </a:r>
+              <a:br>
+                <a:rPr lang="en-AU" sz="1200" dirty="0"/>
+              </a:br>
+              <a:r>
+                <a:rPr lang="en-AU" sz="1200" dirty="0"/>
+                <a:t>	" is returned\n");</a:t>
+              </a:r>
+            </a:p>
+            <a:p>
+              <a:pPr marL="228600" indent="-228600" rtl="0">
+                <a:buFont typeface="+mj-lt"/>
+                <a:buAutoNum type="arabicPeriod"/>
+              </a:pPr>
+              <a:r>
+                <a:rPr lang="en-AU" sz="1200" dirty="0">
+                  <a:solidFill>
+                    <a:schemeClr val="bg1">
+                      <a:lumMod val="65000"/>
+                    </a:schemeClr>
+                  </a:solidFill>
+                </a:rPr>
+                <a:t>      return 0;</a:t>
               </a:r>
             </a:p>
             <a:p>
@@ -13499,7 +13583,7 @@
                     </a:schemeClr>
                   </a:solidFill>
                 </a:rPr>
-                <a:t>    </a:t>
+                <a:t>      </a:t>
               </a:r>
               <a:r>
                 <a:rPr lang="en-AU" sz="1200" dirty="0" err="1">
@@ -13535,7 +13619,7 @@
                     </a:schemeClr>
                   </a:solidFill>
                 </a:rPr>
-                <a:t>    return 3;</a:t>
+                <a:t>      return 3;</a:t>
               </a:r>
             </a:p>
             <a:p>
@@ -13551,7 +13635,7 @@
                     </a:schemeClr>
                   </a:solidFill>
                 </a:rPr>
-                <a:t>    </a:t>
+                <a:t>      </a:t>
               </a:r>
               <a:r>
                 <a:rPr lang="en-AU" sz="1200" dirty="0" err="1">
@@ -13637,7 +13721,7 @@
               <p:nvPr/>
             </p:nvPicPr>
             <p:blipFill>
-              <a:blip r:embed="rId3">
+              <a:blip r:embed="rId2">
                 <a:alphaModFix/>
               </a:blip>
               <a:stretch>
@@ -15078,7 +15162,7 @@
               <a:pPr algn="ctr"/>
               <a:r>
                 <a:rPr lang="en-US" dirty="0"/>
-                <a:t>2</a:t>
+                <a:t>3</a:t>
               </a:r>
             </a:p>
           </p:txBody>
@@ -15406,7 +15490,7 @@
             <a:p>
               <a:r>
                 <a:rPr lang="en-US" dirty="0"/>
-                <a:t>3</a:t>
+                <a:t>4</a:t>
               </a:r>
             </a:p>
           </p:txBody>
@@ -15426,7 +15510,7 @@
             <p:nvPr/>
           </p:nvPicPr>
           <p:blipFill>
-            <a:blip r:embed="rId4">
+            <a:blip r:embed="rId3">
               <a:alphaModFix/>
             </a:blip>
             <a:stretch>
@@ -15495,8 +15579,8 @@
         </p:nvGrpSpPr>
         <p:grpSpPr>
           <a:xfrm>
-            <a:off x="1901041" y="995928"/>
-            <a:ext cx="407468" cy="2905608"/>
+            <a:off x="1944808" y="1193825"/>
+            <a:ext cx="407468" cy="2708115"/>
             <a:chOff x="1668759" y="-13958058"/>
             <a:chExt cx="487848" cy="22198517"/>
           </a:xfrm>
@@ -15614,7 +15698,7 @@
         </p:nvSpPr>
         <p:spPr>
           <a:xfrm>
-            <a:off x="3334412" y="3604371"/>
+            <a:off x="3334412" y="3635367"/>
             <a:ext cx="3907893" cy="830997"/>
           </a:xfrm>
           <a:prstGeom prst="rect">
@@ -15674,7 +15758,7 @@
         </p:nvSpPr>
         <p:spPr>
           <a:xfrm>
-            <a:off x="6422761" y="523718"/>
+            <a:off x="6318654" y="766432"/>
             <a:ext cx="357718" cy="369333"/>
           </a:xfrm>
           <a:custGeom>
@@ -15832,20 +15916,6 @@
 <file path=ppt/slides/slide6.xml><?xml version="1.0" encoding="utf-8"?>
 <p:sld xmlns:a="http://schemas.openxmlformats.org/drawingml/2006/main" xmlns:r="http://schemas.openxmlformats.org/officeDocument/2006/relationships" xmlns:p="http://schemas.openxmlformats.org/presentationml/2006/main">
   <p:cSld>
-    <p:bg>
-      <p:bgPr>
-        <a:blipFill dpi="0" rotWithShape="1">
-          <a:blip r:embed="rId2">
-            <a:lum/>
-          </a:blip>
-          <a:srcRect/>
-          <a:stretch>
-            <a:fillRect/>
-          </a:stretch>
-        </a:blipFill>
-        <a:effectLst/>
-      </p:bgPr>
-    </p:bg>
     <p:spTree>
       <p:nvGrpSpPr>
         <p:cNvPr id="1" name=""/>
@@ -15895,7 +15965,7 @@
           <p:spPr>
             <a:xfrm>
               <a:off x="2253693" y="-2438525"/>
-              <a:ext cx="5046276" cy="2492990"/>
+              <a:ext cx="5046276" cy="2677656"/>
             </a:xfrm>
             <a:prstGeom prst="rect">
               <a:avLst/>
@@ -15920,7 +15990,7 @@
                     </a:schemeClr>
                   </a:solidFill>
                 </a:rPr>
-                <a:t>int main() {</a:t>
+                <a:t>int main()</a:t>
               </a:r>
             </a:p>
             <a:p>
@@ -15936,7 +16006,23 @@
                     </a:schemeClr>
                   </a:solidFill>
                 </a:rPr>
-                <a:t>    </a:t>
+                <a:t>{</a:t>
+              </a:r>
+            </a:p>
+            <a:p>
+              <a:pPr marL="228600" indent="-228600" rtl="0">
+                <a:buFont typeface="+mj-lt"/>
+                <a:buAutoNum type="arabicPeriod"/>
+              </a:pPr>
+              <a:r>
+                <a:rPr lang="en-AU" sz="1200" dirty="0">
+                  <a:solidFill>
+                    <a:schemeClr val="bg1">
+                      <a:lumMod val="65000"/>
+                    </a:schemeClr>
+                  </a:solidFill>
+                </a:rPr>
+                <a:t>      </a:t>
               </a:r>
               <a:r>
                 <a:rPr lang="en-AU" sz="1200" dirty="0" err="1">
@@ -16016,7 +16102,26 @@
                     </a:schemeClr>
                   </a:solidFill>
                 </a:rPr>
-                <a:t>()) + " is returned\n");</a:t>
+                <a:t>()) + </a:t>
+              </a:r>
+              <a:br>
+                <a:rPr lang="en-AU" sz="1200" dirty="0">
+                  <a:solidFill>
+                    <a:schemeClr val="bg1">
+                      <a:lumMod val="65000"/>
+                    </a:schemeClr>
+                  </a:solidFill>
+                </a:rPr>
+              </a:br>
+              <a:r>
+                <a:rPr lang="en-AU" sz="1200" dirty="0">
+                  <a:solidFill>
+                    <a:schemeClr val="bg1">
+                      <a:lumMod val="65000"/>
+                    </a:schemeClr>
+                  </a:solidFill>
+                </a:rPr>
+                <a:t>	" is returned\n");</a:t>
               </a:r>
             </a:p>
             <a:p>
@@ -16026,7 +16131,7 @@
               </a:pPr>
               <a:r>
                 <a:rPr lang="en-AU" sz="1200" dirty="0"/>
-                <a:t>    return 0;</a:t>
+                <a:t>      return 0;</a:t>
               </a:r>
             </a:p>
             <a:p>
@@ -16126,7 +16231,7 @@
                     </a:schemeClr>
                   </a:solidFill>
                 </a:rPr>
-                <a:t>    </a:t>
+                <a:t>      </a:t>
               </a:r>
               <a:r>
                 <a:rPr lang="en-AU" sz="1200" dirty="0" err="1">
@@ -16162,7 +16267,7 @@
                     </a:schemeClr>
                   </a:solidFill>
                 </a:rPr>
-                <a:t>    return 3;</a:t>
+                <a:t>      return 3;</a:t>
               </a:r>
             </a:p>
             <a:p>
@@ -16178,7 +16283,7 @@
                     </a:schemeClr>
                   </a:solidFill>
                 </a:rPr>
-                <a:t>    </a:t>
+                <a:t>      </a:t>
               </a:r>
               <a:r>
                 <a:rPr lang="en-AU" sz="1200" dirty="0" err="1">
@@ -16264,7 +16369,7 @@
               <p:nvPr/>
             </p:nvPicPr>
             <p:blipFill>
-              <a:blip r:embed="rId3">
+              <a:blip r:embed="rId2">
                 <a:alphaModFix/>
               </a:blip>
               <a:stretch>
@@ -17714,7 +17819,7 @@
               <a:pPr algn="ctr"/>
               <a:r>
                 <a:rPr lang="en-US" dirty="0"/>
-                <a:t>3</a:t>
+                <a:t>4</a:t>
               </a:r>
             </a:p>
           </p:txBody>
@@ -18042,7 +18147,7 @@
             <a:p>
               <a:r>
                 <a:rPr lang="en-US" dirty="0"/>
-                <a:t>4, END</a:t>
+                <a:t>5, END</a:t>
               </a:r>
             </a:p>
           </p:txBody>
@@ -18062,7 +18167,7 @@
             <p:nvPr/>
           </p:nvPicPr>
           <p:blipFill>
-            <a:blip r:embed="rId4">
+            <a:blip r:embed="rId3">
               <a:alphaModFix amt="30000"/>
             </a:blip>
             <a:stretch>
@@ -18131,8 +18236,8 @@
         </p:nvGrpSpPr>
         <p:grpSpPr>
           <a:xfrm>
-            <a:off x="1901041" y="1366487"/>
-            <a:ext cx="407468" cy="2535049"/>
+            <a:off x="1901041" y="1551153"/>
+            <a:ext cx="407468" cy="2350383"/>
             <a:chOff x="1668759" y="-13958058"/>
             <a:chExt cx="487848" cy="22198517"/>
           </a:xfrm>
@@ -18324,20 +18429,6 @@
 <file path=ppt/slides/slide7.xml><?xml version="1.0" encoding="utf-8"?>
 <p:sld xmlns:a="http://schemas.openxmlformats.org/drawingml/2006/main" xmlns:r="http://schemas.openxmlformats.org/officeDocument/2006/relationships" xmlns:p="http://schemas.openxmlformats.org/presentationml/2006/main">
   <p:cSld>
-    <p:bg>
-      <p:bgPr>
-        <a:blipFill dpi="0" rotWithShape="1">
-          <a:blip r:embed="rId2">
-            <a:lum/>
-          </a:blip>
-          <a:srcRect/>
-          <a:stretch>
-            <a:fillRect/>
-          </a:stretch>
-        </a:blipFill>
-        <a:effectLst/>
-      </p:bgPr>
-    </p:bg>
     <p:spTree>
       <p:nvGrpSpPr>
         <p:cNvPr id="1" name=""/>
@@ -18387,7 +18478,7 @@
           <p:spPr>
             <a:xfrm>
               <a:off x="2253693" y="-2438525"/>
-              <a:ext cx="5046276" cy="2492990"/>
+              <a:ext cx="5046276" cy="2677656"/>
             </a:xfrm>
             <a:prstGeom prst="rect">
               <a:avLst/>
@@ -18412,7 +18503,7 @@
                     </a:schemeClr>
                   </a:solidFill>
                 </a:rPr>
-                <a:t>int main() {</a:t>
+                <a:t>int main()</a:t>
               </a:r>
             </a:p>
             <a:p>
@@ -18428,7 +18519,23 @@
                     </a:schemeClr>
                   </a:solidFill>
                 </a:rPr>
-                <a:t>    </a:t>
+                <a:t>{</a:t>
+              </a:r>
+            </a:p>
+            <a:p>
+              <a:pPr marL="228600" indent="-228600" rtl="0">
+                <a:buFont typeface="+mj-lt"/>
+                <a:buAutoNum type="arabicPeriod"/>
+              </a:pPr>
+              <a:r>
+                <a:rPr lang="en-AU" sz="1200" dirty="0">
+                  <a:solidFill>
+                    <a:schemeClr val="bg1">
+                      <a:lumMod val="65000"/>
+                    </a:schemeClr>
+                  </a:solidFill>
+                </a:rPr>
+                <a:t>      </a:t>
               </a:r>
               <a:r>
                 <a:rPr lang="en-AU" sz="1200" dirty="0" err="1">
@@ -18508,15 +18615,9 @@
                     </a:schemeClr>
                   </a:solidFill>
                 </a:rPr>
-                <a:t>()) + " is returned\n");</a:t>
-              </a:r>
-            </a:p>
-            <a:p>
-              <a:pPr marL="228600" indent="-228600" rtl="0">
-                <a:buFont typeface="+mj-lt"/>
-                <a:buAutoNum type="arabicPeriod"/>
-              </a:pPr>
-              <a:r>
+                <a:t>()) + </a:t>
+              </a:r>
+              <a:br>
                 <a:rPr lang="en-AU" sz="1200" dirty="0">
                   <a:solidFill>
                     <a:schemeClr val="bg1">
@@ -18524,7 +18625,32 @@
                     </a:schemeClr>
                   </a:solidFill>
                 </a:rPr>
-                <a:t>    return 0;</a:t>
+              </a:br>
+              <a:r>
+                <a:rPr lang="en-AU" sz="1200" dirty="0">
+                  <a:solidFill>
+                    <a:schemeClr val="bg1">
+                      <a:lumMod val="65000"/>
+                    </a:schemeClr>
+                  </a:solidFill>
+                </a:rPr>
+                <a:t>	" is returned\n");</a:t>
+              </a:r>
+            </a:p>
+            <a:p>
+              <a:pPr marL="228600" indent="-228600" rtl="0">
+                <a:buFont typeface="+mj-lt"/>
+                <a:buAutoNum type="arabicPeriod"/>
+              </a:pPr>
+              <a:r>
+                <a:rPr lang="en-AU" sz="1200" dirty="0">
+                  <a:solidFill>
+                    <a:schemeClr val="bg1">
+                      <a:lumMod val="65000"/>
+                    </a:schemeClr>
+                  </a:solidFill>
+                </a:rPr>
+                <a:t>      return 0;</a:t>
               </a:r>
             </a:p>
             <a:p>
@@ -18618,7 +18744,7 @@
                     </a:schemeClr>
                   </a:solidFill>
                 </a:rPr>
-                <a:t>    </a:t>
+                <a:t>      </a:t>
               </a:r>
               <a:r>
                 <a:rPr lang="en-AU" sz="1200" dirty="0" err="1">
@@ -18654,7 +18780,7 @@
                     </a:schemeClr>
                   </a:solidFill>
                 </a:rPr>
-                <a:t>    return 3;</a:t>
+                <a:t>      return 3;</a:t>
               </a:r>
             </a:p>
             <a:p>
@@ -18670,7 +18796,7 @@
                     </a:schemeClr>
                   </a:solidFill>
                 </a:rPr>
-                <a:t>    </a:t>
+                <a:t>      </a:t>
               </a:r>
               <a:r>
                 <a:rPr lang="en-AU" sz="1200" dirty="0" err="1">
@@ -18756,7 +18882,7 @@
               <p:nvPr/>
             </p:nvPicPr>
             <p:blipFill>
-              <a:blip r:embed="rId3">
+              <a:blip r:embed="rId2">
                 <a:alphaModFix/>
               </a:blip>
               <a:stretch>
@@ -20545,7 +20671,7 @@
             <p:nvPr/>
           </p:nvPicPr>
           <p:blipFill>
-            <a:blip r:embed="rId4">
+            <a:blip r:embed="rId3">
               <a:alphaModFix/>
             </a:blip>
             <a:stretch>
@@ -20614,8 +20740,8 @@
         </p:nvGrpSpPr>
         <p:grpSpPr>
           <a:xfrm>
-            <a:off x="1901041" y="1551154"/>
-            <a:ext cx="407468" cy="2307338"/>
+            <a:off x="1901041" y="1684926"/>
+            <a:ext cx="407468" cy="2173565"/>
             <a:chOff x="1668759" y="-13958058"/>
             <a:chExt cx="487848" cy="22198517"/>
           </a:xfrm>
@@ -20856,20 +20982,6 @@
 <file path=ppt/slides/slide8.xml><?xml version="1.0" encoding="utf-8"?>
 <p:sld xmlns:a="http://schemas.openxmlformats.org/drawingml/2006/main" xmlns:r="http://schemas.openxmlformats.org/officeDocument/2006/relationships" xmlns:p="http://schemas.openxmlformats.org/presentationml/2006/main">
   <p:cSld>
-    <p:bg>
-      <p:bgPr>
-        <a:blipFill dpi="0" rotWithShape="1">
-          <a:blip r:embed="rId2">
-            <a:lum/>
-          </a:blip>
-          <a:srcRect/>
-          <a:stretch>
-            <a:fillRect/>
-          </a:stretch>
-        </a:blipFill>
-        <a:effectLst/>
-      </p:bgPr>
-    </p:bg>
     <p:spTree>
       <p:nvGrpSpPr>
         <p:cNvPr id="1" name=""/>
@@ -20919,7 +21031,7 @@
           <p:spPr>
             <a:xfrm>
               <a:off x="2253693" y="-2438525"/>
-              <a:ext cx="5046276" cy="2492990"/>
+              <a:ext cx="5046276" cy="2677656"/>
             </a:xfrm>
             <a:prstGeom prst="rect">
               <a:avLst/>
@@ -20944,7 +21056,7 @@
                     </a:schemeClr>
                   </a:solidFill>
                 </a:rPr>
-                <a:t>int main() {</a:t>
+                <a:t>int main()</a:t>
               </a:r>
             </a:p>
             <a:p>
@@ -20960,7 +21072,23 @@
                     </a:schemeClr>
                   </a:solidFill>
                 </a:rPr>
-                <a:t>    </a:t>
+                <a:t>{</a:t>
+              </a:r>
+            </a:p>
+            <a:p>
+              <a:pPr marL="228600" indent="-228600" rtl="0">
+                <a:buFont typeface="+mj-lt"/>
+                <a:buAutoNum type="arabicPeriod"/>
+              </a:pPr>
+              <a:r>
+                <a:rPr lang="en-AU" sz="1200" dirty="0">
+                  <a:solidFill>
+                    <a:schemeClr val="bg1">
+                      <a:lumMod val="65000"/>
+                    </a:schemeClr>
+                  </a:solidFill>
+                </a:rPr>
+                <a:t>      </a:t>
               </a:r>
               <a:r>
                 <a:rPr lang="en-AU" sz="1200" dirty="0" err="1">
@@ -21040,15 +21168,9 @@
                     </a:schemeClr>
                   </a:solidFill>
                 </a:rPr>
-                <a:t>()) + " is returned\n");</a:t>
-              </a:r>
-            </a:p>
-            <a:p>
-              <a:pPr marL="228600" indent="-228600" rtl="0">
-                <a:buFont typeface="+mj-lt"/>
-                <a:buAutoNum type="arabicPeriod"/>
-              </a:pPr>
-              <a:r>
+                <a:t>()) + </a:t>
+              </a:r>
+              <a:br>
                 <a:rPr lang="en-AU" sz="1200" dirty="0">
                   <a:solidFill>
                     <a:schemeClr val="bg1">
@@ -21056,7 +21178,32 @@
                     </a:schemeClr>
                   </a:solidFill>
                 </a:rPr>
-                <a:t>    return 0;</a:t>
+              </a:br>
+              <a:r>
+                <a:rPr lang="en-AU" sz="1200" dirty="0">
+                  <a:solidFill>
+                    <a:schemeClr val="bg1">
+                      <a:lumMod val="65000"/>
+                    </a:schemeClr>
+                  </a:solidFill>
+                </a:rPr>
+                <a:t>	" is returned\n");</a:t>
+              </a:r>
+            </a:p>
+            <a:p>
+              <a:pPr marL="228600" indent="-228600" rtl="0">
+                <a:buFont typeface="+mj-lt"/>
+                <a:buAutoNum type="arabicPeriod"/>
+              </a:pPr>
+              <a:r>
+                <a:rPr lang="en-AU" sz="1200" dirty="0">
+                  <a:solidFill>
+                    <a:schemeClr val="bg1">
+                      <a:lumMod val="65000"/>
+                    </a:schemeClr>
+                  </a:solidFill>
+                </a:rPr>
+                <a:t>      return 0;</a:t>
               </a:r>
             </a:p>
             <a:p>
@@ -21156,7 +21303,7 @@
                     </a:schemeClr>
                   </a:solidFill>
                 </a:rPr>
-                <a:t>    </a:t>
+                <a:t>      </a:t>
               </a:r>
               <a:r>
                 <a:rPr lang="en-AU" sz="1200" dirty="0" err="1">
@@ -21192,7 +21339,7 @@
                     </a:schemeClr>
                   </a:solidFill>
                 </a:rPr>
-                <a:t>    return 3;</a:t>
+                <a:t>      return 3;</a:t>
               </a:r>
             </a:p>
             <a:p>
@@ -21208,7 +21355,7 @@
                     </a:schemeClr>
                   </a:solidFill>
                 </a:rPr>
-                <a:t>    </a:t>
+                <a:t>      </a:t>
               </a:r>
               <a:r>
                 <a:rPr lang="en-AU" sz="1200" dirty="0" err="1">
@@ -21294,7 +21441,7 @@
               <p:nvPr/>
             </p:nvPicPr>
             <p:blipFill>
-              <a:blip r:embed="rId3">
+              <a:blip r:embed="rId2">
                 <a:alphaModFix/>
               </a:blip>
               <a:stretch>
@@ -23050,7 +23197,7 @@
             <p:nvPr/>
           </p:nvPicPr>
           <p:blipFill>
-            <a:blip r:embed="rId4">
+            <a:blip r:embed="rId3">
               <a:alphaModFix/>
             </a:blip>
             <a:stretch>

</xml_diff>